<commit_message>
added database images, tuplespace, start overlap
</commit_message>
<xml_diff>
--- a/bigraphspace/docs/images/Cookbook_diagrams.pptx
+++ b/bigraphspace/docs/images/Cookbook_diagrams.pptx
@@ -23,6 +23,12 @@
     <p:sldId id="271" r:id="rId17"/>
     <p:sldId id="272" r:id="rId18"/>
     <p:sldId id="273" r:id="rId19"/>
+    <p:sldId id="274" r:id="rId20"/>
+    <p:sldId id="275" r:id="rId21"/>
+    <p:sldId id="276" r:id="rId22"/>
+    <p:sldId id="277" r:id="rId23"/>
+    <p:sldId id="278" r:id="rId24"/>
+    <p:sldId id="279" r:id="rId25"/>
   </p:sldIdLst>
   <p:sldSz cx="9144000" cy="6858000" type="screen4x3"/>
   <p:notesSz cx="6858000" cy="9144000"/>
@@ -306,7 +312,7 @@
             <a:fld id="{1D8BD707-D9CF-40AE-B4C6-C98DA3205C09}" type="datetimeFigureOut">
               <a:rPr lang="en-US" smtClean="0"/>
               <a:pPr/>
-              <a:t>7/25/2009</a:t>
+              <a:t>7/27/2009</a:t>
             </a:fld>
             <a:endParaRPr lang="en-US"/>
           </a:p>
@@ -473,7 +479,7 @@
             <a:fld id="{1D8BD707-D9CF-40AE-B4C6-C98DA3205C09}" type="datetimeFigureOut">
               <a:rPr lang="en-US" smtClean="0"/>
               <a:pPr/>
-              <a:t>7/25/2009</a:t>
+              <a:t>7/27/2009</a:t>
             </a:fld>
             <a:endParaRPr lang="en-US"/>
           </a:p>
@@ -650,7 +656,7 @@
             <a:fld id="{1D8BD707-D9CF-40AE-B4C6-C98DA3205C09}" type="datetimeFigureOut">
               <a:rPr lang="en-US" smtClean="0"/>
               <a:pPr/>
-              <a:t>7/25/2009</a:t>
+              <a:t>7/27/2009</a:t>
             </a:fld>
             <a:endParaRPr lang="en-US"/>
           </a:p>
@@ -817,7 +823,7 @@
             <a:fld id="{1D8BD707-D9CF-40AE-B4C6-C98DA3205C09}" type="datetimeFigureOut">
               <a:rPr lang="en-US" smtClean="0"/>
               <a:pPr/>
-              <a:t>7/25/2009</a:t>
+              <a:t>7/27/2009</a:t>
             </a:fld>
             <a:endParaRPr lang="en-US"/>
           </a:p>
@@ -1060,7 +1066,7 @@
             <a:fld id="{1D8BD707-D9CF-40AE-B4C6-C98DA3205C09}" type="datetimeFigureOut">
               <a:rPr lang="en-US" smtClean="0"/>
               <a:pPr/>
-              <a:t>7/25/2009</a:t>
+              <a:t>7/27/2009</a:t>
             </a:fld>
             <a:endParaRPr lang="en-US"/>
           </a:p>
@@ -1345,7 +1351,7 @@
             <a:fld id="{1D8BD707-D9CF-40AE-B4C6-C98DA3205C09}" type="datetimeFigureOut">
               <a:rPr lang="en-US" smtClean="0"/>
               <a:pPr/>
-              <a:t>7/25/2009</a:t>
+              <a:t>7/27/2009</a:t>
             </a:fld>
             <a:endParaRPr lang="en-US"/>
           </a:p>
@@ -1764,7 +1770,7 @@
             <a:fld id="{1D8BD707-D9CF-40AE-B4C6-C98DA3205C09}" type="datetimeFigureOut">
               <a:rPr lang="en-US" smtClean="0"/>
               <a:pPr/>
-              <a:t>7/25/2009</a:t>
+              <a:t>7/27/2009</a:t>
             </a:fld>
             <a:endParaRPr lang="en-US"/>
           </a:p>
@@ -1879,7 +1885,7 @@
             <a:fld id="{1D8BD707-D9CF-40AE-B4C6-C98DA3205C09}" type="datetimeFigureOut">
               <a:rPr lang="en-US" smtClean="0"/>
               <a:pPr/>
-              <a:t>7/25/2009</a:t>
+              <a:t>7/27/2009</a:t>
             </a:fld>
             <a:endParaRPr lang="en-US"/>
           </a:p>
@@ -1971,7 +1977,7 @@
             <a:fld id="{1D8BD707-D9CF-40AE-B4C6-C98DA3205C09}" type="datetimeFigureOut">
               <a:rPr lang="en-US" smtClean="0"/>
               <a:pPr/>
-              <a:t>7/25/2009</a:t>
+              <a:t>7/27/2009</a:t>
             </a:fld>
             <a:endParaRPr lang="en-US"/>
           </a:p>
@@ -2245,7 +2251,7 @@
             <a:fld id="{1D8BD707-D9CF-40AE-B4C6-C98DA3205C09}" type="datetimeFigureOut">
               <a:rPr lang="en-US" smtClean="0"/>
               <a:pPr/>
-              <a:t>7/25/2009</a:t>
+              <a:t>7/27/2009</a:t>
             </a:fld>
             <a:endParaRPr lang="en-US"/>
           </a:p>
@@ -2495,7 +2501,7 @@
             <a:fld id="{1D8BD707-D9CF-40AE-B4C6-C98DA3205C09}" type="datetimeFigureOut">
               <a:rPr lang="en-US" smtClean="0"/>
               <a:pPr/>
-              <a:t>7/25/2009</a:t>
+              <a:t>7/27/2009</a:t>
             </a:fld>
             <a:endParaRPr lang="en-US"/>
           </a:p>
@@ -2705,7 +2711,7 @@
             <a:fld id="{1D8BD707-D9CF-40AE-B4C6-C98DA3205C09}" type="datetimeFigureOut">
               <a:rPr lang="en-US" smtClean="0"/>
               <a:pPr/>
-              <a:t>7/25/2009</a:t>
+              <a:t>7/27/2009</a:t>
             </a:fld>
             <a:endParaRPr lang="en-US"/>
           </a:p>
@@ -7774,6 +7780,612 @@
 </p:sld>
 </file>
 
+<file path=ppt/slides/slide19.xml><?xml version="1.0" encoding="utf-8"?>
+<p:sld xmlns:a="http://schemas.openxmlformats.org/drawingml/2006/main" xmlns:r="http://schemas.openxmlformats.org/officeDocument/2006/relationships" xmlns:p="http://schemas.openxmlformats.org/presentationml/2006/main">
+  <p:cSld>
+    <p:spTree>
+      <p:nvGrpSpPr>
+        <p:cNvPr id="1" name=""/>
+        <p:cNvGrpSpPr/>
+        <p:nvPr/>
+      </p:nvGrpSpPr>
+      <p:grpSpPr>
+        <a:xfrm>
+          <a:off x="0" y="0"/>
+          <a:ext cx="0" cy="0"/>
+          <a:chOff x="0" y="0"/>
+          <a:chExt cx="0" cy="0"/>
+        </a:xfrm>
+      </p:grpSpPr>
+      <p:sp>
+        <p:nvSpPr>
+          <p:cNvPr id="4" name="Title 3"/>
+          <p:cNvSpPr>
+            <a:spLocks noGrp="1"/>
+          </p:cNvSpPr>
+          <p:nvPr>
+            <p:ph type="title"/>
+          </p:nvPr>
+        </p:nvSpPr>
+        <p:spPr/>
+        <p:txBody>
+          <a:bodyPr/>
+          <a:lstStyle/>
+          <a:p>
+            <a:r>
+              <a:rPr lang="en-GB" dirty="0" smtClean="0"/>
+              <a:t>Relational database</a:t>
+            </a:r>
+            <a:endParaRPr lang="en-GB" dirty="0"/>
+          </a:p>
+        </p:txBody>
+      </p:sp>
+      <p:sp>
+        <p:nvSpPr>
+          <p:cNvPr id="7" name="Rounded Rectangle 6"/>
+          <p:cNvSpPr/>
+          <p:nvPr/>
+        </p:nvSpPr>
+        <p:spPr>
+          <a:xfrm>
+            <a:off x="2514600" y="2743200"/>
+            <a:ext cx="4343400" cy="1828800"/>
+          </a:xfrm>
+          <a:prstGeom prst="roundRect">
+            <a:avLst/>
+          </a:prstGeom>
+          <a:solidFill>
+            <a:schemeClr val="bg1"/>
+          </a:solidFill>
+          <a:ln>
+            <a:solidFill>
+              <a:schemeClr val="tx1"/>
+            </a:solidFill>
+          </a:ln>
+        </p:spPr>
+        <p:style>
+          <a:lnRef idx="2">
+            <a:schemeClr val="accent1">
+              <a:shade val="50000"/>
+            </a:schemeClr>
+          </a:lnRef>
+          <a:fillRef idx="1">
+            <a:schemeClr val="accent1"/>
+          </a:fillRef>
+          <a:effectRef idx="0">
+            <a:schemeClr val="accent1"/>
+          </a:effectRef>
+          <a:fontRef idx="minor">
+            <a:schemeClr val="lt1"/>
+          </a:fontRef>
+        </p:style>
+        <p:txBody>
+          <a:bodyPr rtlCol="0" anchor="ctr"/>
+          <a:lstStyle/>
+          <a:p>
+            <a:pPr algn="ctr"/>
+            <a:endParaRPr lang="en-GB" dirty="0">
+              <a:solidFill>
+                <a:schemeClr val="tx1"/>
+              </a:solidFill>
+            </a:endParaRPr>
+          </a:p>
+        </p:txBody>
+      </p:sp>
+      <p:sp>
+        <p:nvSpPr>
+          <p:cNvPr id="13" name="Rectangle 12"/>
+          <p:cNvSpPr/>
+          <p:nvPr/>
+        </p:nvSpPr>
+        <p:spPr>
+          <a:xfrm>
+            <a:off x="2667000" y="2362200"/>
+            <a:ext cx="1230017" cy="369332"/>
+          </a:xfrm>
+          <a:prstGeom prst="rect">
+            <a:avLst/>
+          </a:prstGeom>
+        </p:spPr>
+        <p:txBody>
+          <a:bodyPr wrap="none">
+            <a:spAutoFit/>
+          </a:bodyPr>
+          <a:lstStyle/>
+          <a:p>
+            <a:pPr algn="ctr"/>
+            <a:r>
+              <a:rPr lang="en-GB" dirty="0" smtClean="0"/>
+              <a:t>PersonRow</a:t>
+            </a:r>
+            <a:endParaRPr lang="en-GB" dirty="0"/>
+          </a:p>
+        </p:txBody>
+      </p:sp>
+      <p:sp>
+        <p:nvSpPr>
+          <p:cNvPr id="15" name="Rounded Rectangle 14"/>
+          <p:cNvSpPr/>
+          <p:nvPr/>
+        </p:nvSpPr>
+        <p:spPr>
+          <a:xfrm>
+            <a:off x="2971800" y="3124200"/>
+            <a:ext cx="1447800" cy="1295400"/>
+          </a:xfrm>
+          <a:prstGeom prst="roundRect">
+            <a:avLst/>
+          </a:prstGeom>
+          <a:solidFill>
+            <a:schemeClr val="bg1"/>
+          </a:solidFill>
+          <a:ln>
+            <a:solidFill>
+              <a:schemeClr val="tx1"/>
+            </a:solidFill>
+          </a:ln>
+        </p:spPr>
+        <p:style>
+          <a:lnRef idx="2">
+            <a:schemeClr val="accent1">
+              <a:shade val="50000"/>
+            </a:schemeClr>
+          </a:lnRef>
+          <a:fillRef idx="1">
+            <a:schemeClr val="accent1"/>
+          </a:fillRef>
+          <a:effectRef idx="0">
+            <a:schemeClr val="accent1"/>
+          </a:effectRef>
+          <a:fontRef idx="minor">
+            <a:schemeClr val="lt1"/>
+          </a:fontRef>
+        </p:style>
+        <p:txBody>
+          <a:bodyPr rtlCol="0" anchor="ctr"/>
+          <a:lstStyle/>
+          <a:p>
+            <a:pPr algn="ctr"/>
+            <a:endParaRPr lang="en-GB" dirty="0">
+              <a:solidFill>
+                <a:schemeClr val="tx1"/>
+              </a:solidFill>
+            </a:endParaRPr>
+          </a:p>
+        </p:txBody>
+      </p:sp>
+      <p:sp>
+        <p:nvSpPr>
+          <p:cNvPr id="16" name="Rectangle 15"/>
+          <p:cNvSpPr/>
+          <p:nvPr/>
+        </p:nvSpPr>
+        <p:spPr>
+          <a:xfrm>
+            <a:off x="2917206" y="2754868"/>
+            <a:ext cx="359394" cy="369332"/>
+          </a:xfrm>
+          <a:prstGeom prst="rect">
+            <a:avLst/>
+          </a:prstGeom>
+        </p:spPr>
+        <p:txBody>
+          <a:bodyPr wrap="none">
+            <a:spAutoFit/>
+          </a:bodyPr>
+          <a:lstStyle/>
+          <a:p>
+            <a:pPr algn="ctr"/>
+            <a:r>
+              <a:rPr lang="en-GB" dirty="0" smtClean="0"/>
+              <a:t>id</a:t>
+            </a:r>
+            <a:endParaRPr lang="en-GB" dirty="0"/>
+          </a:p>
+        </p:txBody>
+      </p:sp>
+      <p:sp>
+        <p:nvSpPr>
+          <p:cNvPr id="18" name="Oval 17"/>
+          <p:cNvSpPr/>
+          <p:nvPr/>
+        </p:nvSpPr>
+        <p:spPr>
+          <a:xfrm>
+            <a:off x="3276600" y="3352800"/>
+            <a:ext cx="914400" cy="838200"/>
+          </a:xfrm>
+          <a:prstGeom prst="ellipse">
+            <a:avLst/>
+          </a:prstGeom>
+          <a:solidFill>
+            <a:schemeClr val="bg1"/>
+          </a:solidFill>
+          <a:ln>
+            <a:solidFill>
+              <a:schemeClr val="tx1"/>
+            </a:solidFill>
+          </a:ln>
+        </p:spPr>
+        <p:style>
+          <a:lnRef idx="2">
+            <a:schemeClr val="accent1">
+              <a:shade val="50000"/>
+            </a:schemeClr>
+          </a:lnRef>
+          <a:fillRef idx="1">
+            <a:schemeClr val="accent1"/>
+          </a:fillRef>
+          <a:effectRef idx="0">
+            <a:schemeClr val="accent1"/>
+          </a:effectRef>
+          <a:fontRef idx="minor">
+            <a:schemeClr val="lt1"/>
+          </a:fontRef>
+        </p:style>
+        <p:txBody>
+          <a:bodyPr lIns="0" rIns="0" rtlCol="0" anchor="ctr"/>
+          <a:lstStyle/>
+          <a:p>
+            <a:pPr algn="ctr"/>
+            <a:r>
+              <a:rPr lang="en-GB" dirty="0" smtClean="0">
+                <a:solidFill>
+                  <a:schemeClr val="tx1"/>
+                </a:solidFill>
+              </a:rPr>
+              <a:t>N_143</a:t>
+            </a:r>
+            <a:endParaRPr lang="en-GB" dirty="0">
+              <a:solidFill>
+                <a:schemeClr val="tx1"/>
+              </a:solidFill>
+            </a:endParaRPr>
+          </a:p>
+        </p:txBody>
+      </p:sp>
+      <p:sp>
+        <p:nvSpPr>
+          <p:cNvPr id="8" name="Rounded Rectangle 7"/>
+          <p:cNvSpPr/>
+          <p:nvPr/>
+        </p:nvSpPr>
+        <p:spPr>
+          <a:xfrm>
+            <a:off x="4783687" y="3112532"/>
+            <a:ext cx="1447800" cy="1295400"/>
+          </a:xfrm>
+          <a:prstGeom prst="roundRect">
+            <a:avLst/>
+          </a:prstGeom>
+          <a:solidFill>
+            <a:schemeClr val="bg1"/>
+          </a:solidFill>
+          <a:ln>
+            <a:solidFill>
+              <a:schemeClr val="tx1"/>
+            </a:solidFill>
+          </a:ln>
+        </p:spPr>
+        <p:style>
+          <a:lnRef idx="2">
+            <a:schemeClr val="accent1">
+              <a:shade val="50000"/>
+            </a:schemeClr>
+          </a:lnRef>
+          <a:fillRef idx="1">
+            <a:schemeClr val="accent1"/>
+          </a:fillRef>
+          <a:effectRef idx="0">
+            <a:schemeClr val="accent1"/>
+          </a:effectRef>
+          <a:fontRef idx="minor">
+            <a:schemeClr val="lt1"/>
+          </a:fontRef>
+        </p:style>
+        <p:txBody>
+          <a:bodyPr rtlCol="0" anchor="ctr"/>
+          <a:lstStyle/>
+          <a:p>
+            <a:pPr algn="ctr"/>
+            <a:endParaRPr lang="en-GB" dirty="0">
+              <a:solidFill>
+                <a:schemeClr val="tx1"/>
+              </a:solidFill>
+            </a:endParaRPr>
+          </a:p>
+        </p:txBody>
+      </p:sp>
+      <p:sp>
+        <p:nvSpPr>
+          <p:cNvPr id="9" name="Rectangle 8"/>
+          <p:cNvSpPr/>
+          <p:nvPr/>
+        </p:nvSpPr>
+        <p:spPr>
+          <a:xfrm>
+            <a:off x="4648200" y="2743200"/>
+            <a:ext cx="716863" cy="369332"/>
+          </a:xfrm>
+          <a:prstGeom prst="rect">
+            <a:avLst/>
+          </a:prstGeom>
+        </p:spPr>
+        <p:txBody>
+          <a:bodyPr wrap="none">
+            <a:spAutoFit/>
+          </a:bodyPr>
+          <a:lstStyle/>
+          <a:p>
+            <a:pPr algn="ctr"/>
+            <a:r>
+              <a:rPr lang="en-GB" dirty="0" smtClean="0"/>
+              <a:t>name</a:t>
+            </a:r>
+            <a:endParaRPr lang="en-GB" dirty="0"/>
+          </a:p>
+        </p:txBody>
+      </p:sp>
+      <p:sp>
+        <p:nvSpPr>
+          <p:cNvPr id="10" name="Oval 9"/>
+          <p:cNvSpPr/>
+          <p:nvPr/>
+        </p:nvSpPr>
+        <p:spPr>
+          <a:xfrm>
+            <a:off x="5029200" y="3341132"/>
+            <a:ext cx="1007513" cy="838200"/>
+          </a:xfrm>
+          <a:prstGeom prst="ellipse">
+            <a:avLst/>
+          </a:prstGeom>
+          <a:solidFill>
+            <a:schemeClr val="bg1"/>
+          </a:solidFill>
+          <a:ln>
+            <a:solidFill>
+              <a:schemeClr val="tx1"/>
+            </a:solidFill>
+          </a:ln>
+        </p:spPr>
+        <p:style>
+          <a:lnRef idx="2">
+            <a:schemeClr val="accent1">
+              <a:shade val="50000"/>
+            </a:schemeClr>
+          </a:lnRef>
+          <a:fillRef idx="1">
+            <a:schemeClr val="accent1"/>
+          </a:fillRef>
+          <a:effectRef idx="0">
+            <a:schemeClr val="accent1"/>
+          </a:effectRef>
+          <a:fontRef idx="minor">
+            <a:schemeClr val="lt1"/>
+          </a:fontRef>
+        </p:style>
+        <p:txBody>
+          <a:bodyPr lIns="0" rIns="0" rtlCol="0" anchor="ctr"/>
+          <a:lstStyle/>
+          <a:p>
+            <a:pPr algn="ctr"/>
+            <a:r>
+              <a:rPr lang="en-GB" dirty="0" smtClean="0">
+                <a:solidFill>
+                  <a:schemeClr val="tx1"/>
+                </a:solidFill>
+              </a:rPr>
+              <a:t>S_Chris</a:t>
+            </a:r>
+            <a:endParaRPr lang="en-GB" dirty="0">
+              <a:solidFill>
+                <a:schemeClr val="tx1"/>
+              </a:solidFill>
+            </a:endParaRPr>
+          </a:p>
+        </p:txBody>
+      </p:sp>
+      <p:sp>
+        <p:nvSpPr>
+          <p:cNvPr id="11" name="Rounded Rectangle 10"/>
+          <p:cNvSpPr/>
+          <p:nvPr/>
+        </p:nvSpPr>
+        <p:spPr>
+          <a:xfrm>
+            <a:off x="2057400" y="2209800"/>
+            <a:ext cx="5181600" cy="3124200"/>
+          </a:xfrm>
+          <a:prstGeom prst="roundRect">
+            <a:avLst/>
+          </a:prstGeom>
+          <a:noFill/>
+          <a:ln w="9525">
+            <a:solidFill>
+              <a:schemeClr val="tx1"/>
+            </a:solidFill>
+            <a:prstDash val="solid"/>
+          </a:ln>
+        </p:spPr>
+        <p:style>
+          <a:lnRef idx="2">
+            <a:schemeClr val="accent1">
+              <a:shade val="50000"/>
+            </a:schemeClr>
+          </a:lnRef>
+          <a:fillRef idx="1">
+            <a:schemeClr val="accent1"/>
+          </a:fillRef>
+          <a:effectRef idx="0">
+            <a:schemeClr val="accent1"/>
+          </a:effectRef>
+          <a:fontRef idx="minor">
+            <a:schemeClr val="lt1"/>
+          </a:fontRef>
+        </p:style>
+        <p:txBody>
+          <a:bodyPr rtlCol="0" anchor="ctr"/>
+          <a:lstStyle/>
+          <a:p>
+            <a:pPr algn="ctr"/>
+            <a:endParaRPr lang="en-GB" dirty="0">
+              <a:solidFill>
+                <a:schemeClr val="tx1"/>
+              </a:solidFill>
+            </a:endParaRPr>
+          </a:p>
+        </p:txBody>
+      </p:sp>
+      <p:sp>
+        <p:nvSpPr>
+          <p:cNvPr id="12" name="Rectangle 11"/>
+          <p:cNvSpPr/>
+          <p:nvPr/>
+        </p:nvSpPr>
+        <p:spPr>
+          <a:xfrm>
+            <a:off x="2057400" y="1828800"/>
+            <a:ext cx="2292231" cy="369332"/>
+          </a:xfrm>
+          <a:prstGeom prst="rect">
+            <a:avLst/>
+          </a:prstGeom>
+        </p:spPr>
+        <p:txBody>
+          <a:bodyPr wrap="none">
+            <a:spAutoFit/>
+          </a:bodyPr>
+          <a:lstStyle/>
+          <a:p>
+            <a:pPr algn="ctr"/>
+            <a:r>
+              <a:rPr lang="en-GB" dirty="0" smtClean="0"/>
+              <a:t>PersonTable (optional)</a:t>
+            </a:r>
+            <a:endParaRPr lang="en-GB" dirty="0"/>
+          </a:p>
+        </p:txBody>
+      </p:sp>
+      <p:sp>
+        <p:nvSpPr>
+          <p:cNvPr id="14" name="Rounded Rectangle 13"/>
+          <p:cNvSpPr/>
+          <p:nvPr/>
+        </p:nvSpPr>
+        <p:spPr>
+          <a:xfrm>
+            <a:off x="1676400" y="1752600"/>
+            <a:ext cx="5943600" cy="3810000"/>
+          </a:xfrm>
+          <a:prstGeom prst="roundRect">
+            <a:avLst/>
+          </a:prstGeom>
+          <a:noFill/>
+          <a:ln w="9525">
+            <a:solidFill>
+              <a:schemeClr val="tx1"/>
+            </a:solidFill>
+            <a:prstDash val="solid"/>
+          </a:ln>
+        </p:spPr>
+        <p:style>
+          <a:lnRef idx="2">
+            <a:schemeClr val="accent1">
+              <a:shade val="50000"/>
+            </a:schemeClr>
+          </a:lnRef>
+          <a:fillRef idx="1">
+            <a:schemeClr val="accent1"/>
+          </a:fillRef>
+          <a:effectRef idx="0">
+            <a:schemeClr val="accent1"/>
+          </a:effectRef>
+          <a:fontRef idx="minor">
+            <a:schemeClr val="lt1"/>
+          </a:fontRef>
+        </p:style>
+        <p:txBody>
+          <a:bodyPr rtlCol="0" anchor="ctr"/>
+          <a:lstStyle/>
+          <a:p>
+            <a:pPr algn="ctr"/>
+            <a:endParaRPr lang="en-GB" dirty="0">
+              <a:solidFill>
+                <a:schemeClr val="tx1"/>
+              </a:solidFill>
+            </a:endParaRPr>
+          </a:p>
+        </p:txBody>
+      </p:sp>
+      <p:sp>
+        <p:nvSpPr>
+          <p:cNvPr id="17" name="Rectangle 16"/>
+          <p:cNvSpPr/>
+          <p:nvPr/>
+        </p:nvSpPr>
+        <p:spPr>
+          <a:xfrm>
+            <a:off x="1676400" y="1371600"/>
+            <a:ext cx="2031775" cy="369332"/>
+          </a:xfrm>
+          <a:prstGeom prst="rect">
+            <a:avLst/>
+          </a:prstGeom>
+        </p:spPr>
+        <p:txBody>
+          <a:bodyPr wrap="none">
+            <a:spAutoFit/>
+          </a:bodyPr>
+          <a:lstStyle/>
+          <a:p>
+            <a:pPr algn="ctr"/>
+            <a:r>
+              <a:rPr lang="en-GB" dirty="0" smtClean="0"/>
+              <a:t>Database (optional)</a:t>
+            </a:r>
+            <a:endParaRPr lang="en-GB" dirty="0"/>
+          </a:p>
+        </p:txBody>
+      </p:sp>
+      <p:sp>
+        <p:nvSpPr>
+          <p:cNvPr id="19" name="Rectangle 18"/>
+          <p:cNvSpPr/>
+          <p:nvPr/>
+        </p:nvSpPr>
+        <p:spPr>
+          <a:xfrm>
+            <a:off x="4572000" y="4724400"/>
+            <a:ext cx="343363" cy="369332"/>
+          </a:xfrm>
+          <a:prstGeom prst="rect">
+            <a:avLst/>
+          </a:prstGeom>
+        </p:spPr>
+        <p:txBody>
+          <a:bodyPr wrap="none">
+            <a:spAutoFit/>
+          </a:bodyPr>
+          <a:lstStyle/>
+          <a:p>
+            <a:pPr algn="ctr"/>
+            <a:r>
+              <a:rPr lang="en-GB" dirty="0" smtClean="0"/>
+              <a:t>…</a:t>
+            </a:r>
+            <a:endParaRPr lang="en-GB" dirty="0"/>
+          </a:p>
+        </p:txBody>
+      </p:sp>
+    </p:spTree>
+  </p:cSld>
+  <p:clrMapOvr>
+    <a:masterClrMapping/>
+  </p:clrMapOvr>
+</p:sld>
+</file>
+
 <file path=ppt/slides/slide2.xml><?xml version="1.0" encoding="utf-8"?>
 <p:sld xmlns:a="http://schemas.openxmlformats.org/drawingml/2006/main" xmlns:r="http://schemas.openxmlformats.org/officeDocument/2006/relationships" xmlns:p="http://schemas.openxmlformats.org/presentationml/2006/main">
   <p:cSld>
@@ -7808,11 +8420,7 @@
           <a:p>
             <a:r>
               <a:rPr lang="en-GB" dirty="0" smtClean="0"/>
-              <a:t>Numbers as “constant” </a:t>
-            </a:r>
-            <a:r>
-              <a:rPr lang="en-GB" dirty="0" smtClean="0"/>
-              <a:t>links (2)</a:t>
+              <a:t>Numbers as “constant” links (2)</a:t>
             </a:r>
             <a:endParaRPr lang="en-GB" dirty="0"/>
           </a:p>
@@ -8216,6 +8824,3549 @@
           <a:p>
             <a:pPr algn="ctr"/>
             <a:endParaRPr lang="en-GB"/>
+          </a:p>
+        </p:txBody>
+      </p:sp>
+    </p:spTree>
+  </p:cSld>
+  <p:clrMapOvr>
+    <a:masterClrMapping/>
+  </p:clrMapOvr>
+</p:sld>
+</file>
+
+<file path=ppt/slides/slide20.xml><?xml version="1.0" encoding="utf-8"?>
+<p:sld xmlns:a="http://schemas.openxmlformats.org/drawingml/2006/main" xmlns:r="http://schemas.openxmlformats.org/officeDocument/2006/relationships" xmlns:p="http://schemas.openxmlformats.org/presentationml/2006/main">
+  <p:cSld>
+    <p:spTree>
+      <p:nvGrpSpPr>
+        <p:cNvPr id="1" name=""/>
+        <p:cNvGrpSpPr/>
+        <p:nvPr/>
+      </p:nvGrpSpPr>
+      <p:grpSpPr>
+        <a:xfrm>
+          <a:off x="0" y="0"/>
+          <a:ext cx="0" cy="0"/>
+          <a:chOff x="0" y="0"/>
+          <a:chExt cx="0" cy="0"/>
+        </a:xfrm>
+      </p:grpSpPr>
+      <p:sp>
+        <p:nvSpPr>
+          <p:cNvPr id="4" name="Title 3"/>
+          <p:cNvSpPr>
+            <a:spLocks noGrp="1"/>
+          </p:cNvSpPr>
+          <p:nvPr>
+            <p:ph type="title"/>
+          </p:nvPr>
+        </p:nvSpPr>
+        <p:spPr/>
+        <p:txBody>
+          <a:bodyPr>
+            <a:normAutofit fontScale="90000"/>
+          </a:bodyPr>
+          <a:lstStyle/>
+          <a:p>
+            <a:r>
+              <a:rPr lang="en-GB" dirty="0" smtClean="0"/>
+              <a:t>Relational database – join constant link</a:t>
+            </a:r>
+            <a:endParaRPr lang="en-GB" dirty="0"/>
+          </a:p>
+        </p:txBody>
+      </p:sp>
+      <p:sp>
+        <p:nvSpPr>
+          <p:cNvPr id="7" name="Rounded Rectangle 6"/>
+          <p:cNvSpPr/>
+          <p:nvPr/>
+        </p:nvSpPr>
+        <p:spPr>
+          <a:xfrm>
+            <a:off x="1295400" y="3124200"/>
+            <a:ext cx="2743200" cy="1066800"/>
+          </a:xfrm>
+          <a:prstGeom prst="roundRect">
+            <a:avLst/>
+          </a:prstGeom>
+          <a:solidFill>
+            <a:schemeClr val="bg1"/>
+          </a:solidFill>
+          <a:ln>
+            <a:solidFill>
+              <a:schemeClr val="tx1"/>
+            </a:solidFill>
+          </a:ln>
+        </p:spPr>
+        <p:style>
+          <a:lnRef idx="2">
+            <a:schemeClr val="accent1">
+              <a:shade val="50000"/>
+            </a:schemeClr>
+          </a:lnRef>
+          <a:fillRef idx="1">
+            <a:schemeClr val="accent1"/>
+          </a:fillRef>
+          <a:effectRef idx="0">
+            <a:schemeClr val="accent1"/>
+          </a:effectRef>
+          <a:fontRef idx="minor">
+            <a:schemeClr val="lt1"/>
+          </a:fontRef>
+        </p:style>
+        <p:txBody>
+          <a:bodyPr rtlCol="0" anchor="ctr"/>
+          <a:lstStyle/>
+          <a:p>
+            <a:pPr algn="ctr"/>
+            <a:endParaRPr lang="en-GB" dirty="0">
+              <a:solidFill>
+                <a:schemeClr val="tx1"/>
+              </a:solidFill>
+            </a:endParaRPr>
+          </a:p>
+        </p:txBody>
+      </p:sp>
+      <p:sp>
+        <p:nvSpPr>
+          <p:cNvPr id="13" name="Rectangle 12"/>
+          <p:cNvSpPr/>
+          <p:nvPr/>
+        </p:nvSpPr>
+        <p:spPr>
+          <a:xfrm>
+            <a:off x="1295400" y="2743200"/>
+            <a:ext cx="1230017" cy="369332"/>
+          </a:xfrm>
+          <a:prstGeom prst="rect">
+            <a:avLst/>
+          </a:prstGeom>
+        </p:spPr>
+        <p:txBody>
+          <a:bodyPr wrap="none">
+            <a:spAutoFit/>
+          </a:bodyPr>
+          <a:lstStyle/>
+          <a:p>
+            <a:pPr algn="ctr"/>
+            <a:r>
+              <a:rPr lang="en-GB" dirty="0" smtClean="0"/>
+              <a:t>PersonRow</a:t>
+            </a:r>
+            <a:endParaRPr lang="en-GB" dirty="0"/>
+          </a:p>
+        </p:txBody>
+      </p:sp>
+      <p:sp>
+        <p:nvSpPr>
+          <p:cNvPr id="15" name="Rounded Rectangle 14"/>
+          <p:cNvSpPr/>
+          <p:nvPr/>
+        </p:nvSpPr>
+        <p:spPr>
+          <a:xfrm>
+            <a:off x="1752600" y="3505200"/>
+            <a:ext cx="1447800" cy="457200"/>
+          </a:xfrm>
+          <a:prstGeom prst="roundRect">
+            <a:avLst/>
+          </a:prstGeom>
+          <a:solidFill>
+            <a:schemeClr val="bg1"/>
+          </a:solidFill>
+          <a:ln>
+            <a:solidFill>
+              <a:schemeClr val="tx1"/>
+            </a:solidFill>
+          </a:ln>
+        </p:spPr>
+        <p:style>
+          <a:lnRef idx="2">
+            <a:schemeClr val="accent1">
+              <a:shade val="50000"/>
+            </a:schemeClr>
+          </a:lnRef>
+          <a:fillRef idx="1">
+            <a:schemeClr val="accent1"/>
+          </a:fillRef>
+          <a:effectRef idx="0">
+            <a:schemeClr val="accent1"/>
+          </a:effectRef>
+          <a:fontRef idx="minor">
+            <a:schemeClr val="lt1"/>
+          </a:fontRef>
+        </p:style>
+        <p:txBody>
+          <a:bodyPr rtlCol="0" anchor="ctr"/>
+          <a:lstStyle/>
+          <a:p>
+            <a:pPr algn="ctr"/>
+            <a:endParaRPr lang="en-GB" dirty="0">
+              <a:solidFill>
+                <a:schemeClr val="tx1"/>
+              </a:solidFill>
+            </a:endParaRPr>
+          </a:p>
+        </p:txBody>
+      </p:sp>
+      <p:sp>
+        <p:nvSpPr>
+          <p:cNvPr id="16" name="Rectangle 15"/>
+          <p:cNvSpPr/>
+          <p:nvPr/>
+        </p:nvSpPr>
+        <p:spPr>
+          <a:xfrm>
+            <a:off x="1698006" y="3135868"/>
+            <a:ext cx="359394" cy="369332"/>
+          </a:xfrm>
+          <a:prstGeom prst="rect">
+            <a:avLst/>
+          </a:prstGeom>
+        </p:spPr>
+        <p:txBody>
+          <a:bodyPr wrap="none">
+            <a:spAutoFit/>
+          </a:bodyPr>
+          <a:lstStyle/>
+          <a:p>
+            <a:pPr algn="ctr"/>
+            <a:r>
+              <a:rPr lang="en-GB" dirty="0" smtClean="0"/>
+              <a:t>id</a:t>
+            </a:r>
+            <a:endParaRPr lang="en-GB" dirty="0"/>
+          </a:p>
+        </p:txBody>
+      </p:sp>
+      <p:sp>
+        <p:nvSpPr>
+          <p:cNvPr id="9" name="Rectangle 8"/>
+          <p:cNvSpPr/>
+          <p:nvPr/>
+        </p:nvSpPr>
+        <p:spPr>
+          <a:xfrm>
+            <a:off x="3429000" y="3581400"/>
+            <a:ext cx="343363" cy="369332"/>
+          </a:xfrm>
+          <a:prstGeom prst="rect">
+            <a:avLst/>
+          </a:prstGeom>
+        </p:spPr>
+        <p:txBody>
+          <a:bodyPr wrap="none">
+            <a:spAutoFit/>
+          </a:bodyPr>
+          <a:lstStyle/>
+          <a:p>
+            <a:pPr algn="ctr"/>
+            <a:r>
+              <a:rPr lang="en-GB" dirty="0" smtClean="0"/>
+              <a:t>…</a:t>
+            </a:r>
+            <a:endParaRPr lang="en-GB" dirty="0"/>
+          </a:p>
+        </p:txBody>
+      </p:sp>
+      <p:sp>
+        <p:nvSpPr>
+          <p:cNvPr id="14" name="Rounded Rectangle 13"/>
+          <p:cNvSpPr/>
+          <p:nvPr/>
+        </p:nvSpPr>
+        <p:spPr>
+          <a:xfrm>
+            <a:off x="990600" y="2590800"/>
+            <a:ext cx="6553200" cy="2133600"/>
+          </a:xfrm>
+          <a:prstGeom prst="roundRect">
+            <a:avLst/>
+          </a:prstGeom>
+          <a:noFill/>
+          <a:ln w="9525">
+            <a:solidFill>
+              <a:schemeClr val="tx1"/>
+            </a:solidFill>
+            <a:prstDash val="solid"/>
+          </a:ln>
+        </p:spPr>
+        <p:style>
+          <a:lnRef idx="2">
+            <a:schemeClr val="accent1">
+              <a:shade val="50000"/>
+            </a:schemeClr>
+          </a:lnRef>
+          <a:fillRef idx="1">
+            <a:schemeClr val="accent1"/>
+          </a:fillRef>
+          <a:effectRef idx="0">
+            <a:schemeClr val="accent1"/>
+          </a:effectRef>
+          <a:fontRef idx="minor">
+            <a:schemeClr val="lt1"/>
+          </a:fontRef>
+        </p:style>
+        <p:txBody>
+          <a:bodyPr rtlCol="0" anchor="ctr"/>
+          <a:lstStyle/>
+          <a:p>
+            <a:pPr algn="ctr"/>
+            <a:endParaRPr lang="en-GB" dirty="0">
+              <a:solidFill>
+                <a:schemeClr val="tx1"/>
+              </a:solidFill>
+            </a:endParaRPr>
+          </a:p>
+        </p:txBody>
+      </p:sp>
+      <p:sp>
+        <p:nvSpPr>
+          <p:cNvPr id="17" name="Rectangle 16"/>
+          <p:cNvSpPr/>
+          <p:nvPr/>
+        </p:nvSpPr>
+        <p:spPr>
+          <a:xfrm>
+            <a:off x="1219200" y="2209800"/>
+            <a:ext cx="2031775" cy="369332"/>
+          </a:xfrm>
+          <a:prstGeom prst="rect">
+            <a:avLst/>
+          </a:prstGeom>
+        </p:spPr>
+        <p:txBody>
+          <a:bodyPr wrap="none">
+            <a:spAutoFit/>
+          </a:bodyPr>
+          <a:lstStyle/>
+          <a:p>
+            <a:pPr algn="ctr"/>
+            <a:r>
+              <a:rPr lang="en-GB" dirty="0" smtClean="0"/>
+              <a:t>Database (optional)</a:t>
+            </a:r>
+            <a:endParaRPr lang="en-GB" dirty="0"/>
+          </a:p>
+        </p:txBody>
+      </p:sp>
+      <p:sp>
+        <p:nvSpPr>
+          <p:cNvPr id="19" name="Rectangle 18"/>
+          <p:cNvSpPr/>
+          <p:nvPr/>
+        </p:nvSpPr>
+        <p:spPr>
+          <a:xfrm>
+            <a:off x="2514600" y="4343400"/>
+            <a:ext cx="343363" cy="369332"/>
+          </a:xfrm>
+          <a:prstGeom prst="rect">
+            <a:avLst/>
+          </a:prstGeom>
+        </p:spPr>
+        <p:txBody>
+          <a:bodyPr wrap="none">
+            <a:spAutoFit/>
+          </a:bodyPr>
+          <a:lstStyle/>
+          <a:p>
+            <a:pPr algn="ctr"/>
+            <a:r>
+              <a:rPr lang="en-GB" dirty="0" smtClean="0"/>
+              <a:t>…</a:t>
+            </a:r>
+            <a:endParaRPr lang="en-GB" dirty="0"/>
+          </a:p>
+        </p:txBody>
+      </p:sp>
+      <p:sp>
+        <p:nvSpPr>
+          <p:cNvPr id="20" name="Rounded Rectangle 19"/>
+          <p:cNvSpPr/>
+          <p:nvPr/>
+        </p:nvSpPr>
+        <p:spPr>
+          <a:xfrm>
+            <a:off x="4495800" y="3124200"/>
+            <a:ext cx="2743200" cy="1143000"/>
+          </a:xfrm>
+          <a:prstGeom prst="roundRect">
+            <a:avLst/>
+          </a:prstGeom>
+          <a:solidFill>
+            <a:schemeClr val="bg1"/>
+          </a:solidFill>
+          <a:ln>
+            <a:solidFill>
+              <a:schemeClr val="tx1"/>
+            </a:solidFill>
+          </a:ln>
+        </p:spPr>
+        <p:style>
+          <a:lnRef idx="2">
+            <a:schemeClr val="accent1">
+              <a:shade val="50000"/>
+            </a:schemeClr>
+          </a:lnRef>
+          <a:fillRef idx="1">
+            <a:schemeClr val="accent1"/>
+          </a:fillRef>
+          <a:effectRef idx="0">
+            <a:schemeClr val="accent1"/>
+          </a:effectRef>
+          <a:fontRef idx="minor">
+            <a:schemeClr val="lt1"/>
+          </a:fontRef>
+        </p:style>
+        <p:txBody>
+          <a:bodyPr rtlCol="0" anchor="ctr"/>
+          <a:lstStyle/>
+          <a:p>
+            <a:pPr algn="ctr"/>
+            <a:endParaRPr lang="en-GB" dirty="0">
+              <a:solidFill>
+                <a:schemeClr val="tx1"/>
+              </a:solidFill>
+            </a:endParaRPr>
+          </a:p>
+        </p:txBody>
+      </p:sp>
+      <p:sp>
+        <p:nvSpPr>
+          <p:cNvPr id="21" name="Rectangle 20"/>
+          <p:cNvSpPr/>
+          <p:nvPr/>
+        </p:nvSpPr>
+        <p:spPr>
+          <a:xfrm>
+            <a:off x="4495800" y="2743200"/>
+            <a:ext cx="989759" cy="369332"/>
+          </a:xfrm>
+          <a:prstGeom prst="rect">
+            <a:avLst/>
+          </a:prstGeom>
+        </p:spPr>
+        <p:txBody>
+          <a:bodyPr wrap="none">
+            <a:spAutoFit/>
+          </a:bodyPr>
+          <a:lstStyle/>
+          <a:p>
+            <a:pPr algn="ctr"/>
+            <a:r>
+              <a:rPr lang="en-GB" dirty="0" smtClean="0"/>
+              <a:t>TaskRow</a:t>
+            </a:r>
+            <a:endParaRPr lang="en-GB" dirty="0"/>
+          </a:p>
+        </p:txBody>
+      </p:sp>
+      <p:sp>
+        <p:nvSpPr>
+          <p:cNvPr id="22" name="Rounded Rectangle 21"/>
+          <p:cNvSpPr/>
+          <p:nvPr/>
+        </p:nvSpPr>
+        <p:spPr>
+          <a:xfrm>
+            <a:off x="4953000" y="3505200"/>
+            <a:ext cx="1447800" cy="457200"/>
+          </a:xfrm>
+          <a:prstGeom prst="roundRect">
+            <a:avLst/>
+          </a:prstGeom>
+          <a:solidFill>
+            <a:schemeClr val="bg1"/>
+          </a:solidFill>
+          <a:ln>
+            <a:solidFill>
+              <a:schemeClr val="tx1"/>
+            </a:solidFill>
+          </a:ln>
+        </p:spPr>
+        <p:style>
+          <a:lnRef idx="2">
+            <a:schemeClr val="accent1">
+              <a:shade val="50000"/>
+            </a:schemeClr>
+          </a:lnRef>
+          <a:fillRef idx="1">
+            <a:schemeClr val="accent1"/>
+          </a:fillRef>
+          <a:effectRef idx="0">
+            <a:schemeClr val="accent1"/>
+          </a:effectRef>
+          <a:fontRef idx="minor">
+            <a:schemeClr val="lt1"/>
+          </a:fontRef>
+        </p:style>
+        <p:txBody>
+          <a:bodyPr rtlCol="0" anchor="ctr"/>
+          <a:lstStyle/>
+          <a:p>
+            <a:pPr algn="ctr"/>
+            <a:endParaRPr lang="en-GB" dirty="0">
+              <a:solidFill>
+                <a:schemeClr val="tx1"/>
+              </a:solidFill>
+            </a:endParaRPr>
+          </a:p>
+        </p:txBody>
+      </p:sp>
+      <p:sp>
+        <p:nvSpPr>
+          <p:cNvPr id="23" name="Rectangle 22"/>
+          <p:cNvSpPr/>
+          <p:nvPr/>
+        </p:nvSpPr>
+        <p:spPr>
+          <a:xfrm>
+            <a:off x="4898406" y="3135868"/>
+            <a:ext cx="1006238" cy="369332"/>
+          </a:xfrm>
+          <a:prstGeom prst="rect">
+            <a:avLst/>
+          </a:prstGeom>
+        </p:spPr>
+        <p:txBody>
+          <a:bodyPr wrap="none">
+            <a:spAutoFit/>
+          </a:bodyPr>
+          <a:lstStyle/>
+          <a:p>
+            <a:pPr algn="ctr"/>
+            <a:r>
+              <a:rPr lang="en-GB" dirty="0" smtClean="0"/>
+              <a:t>personid</a:t>
+            </a:r>
+            <a:endParaRPr lang="en-GB" dirty="0"/>
+          </a:p>
+        </p:txBody>
+      </p:sp>
+      <p:sp>
+        <p:nvSpPr>
+          <p:cNvPr id="25" name="Rectangle 24"/>
+          <p:cNvSpPr/>
+          <p:nvPr/>
+        </p:nvSpPr>
+        <p:spPr>
+          <a:xfrm>
+            <a:off x="6629400" y="3581400"/>
+            <a:ext cx="343363" cy="369332"/>
+          </a:xfrm>
+          <a:prstGeom prst="rect">
+            <a:avLst/>
+          </a:prstGeom>
+        </p:spPr>
+        <p:txBody>
+          <a:bodyPr wrap="none">
+            <a:spAutoFit/>
+          </a:bodyPr>
+          <a:lstStyle/>
+          <a:p>
+            <a:pPr algn="ctr"/>
+            <a:r>
+              <a:rPr lang="en-GB" dirty="0" smtClean="0"/>
+              <a:t>…</a:t>
+            </a:r>
+            <a:endParaRPr lang="en-GB" dirty="0"/>
+          </a:p>
+        </p:txBody>
+      </p:sp>
+      <p:sp>
+        <p:nvSpPr>
+          <p:cNvPr id="28" name="Rectangle 27"/>
+          <p:cNvSpPr/>
+          <p:nvPr/>
+        </p:nvSpPr>
+        <p:spPr>
+          <a:xfrm>
+            <a:off x="5715000" y="4343400"/>
+            <a:ext cx="343363" cy="369332"/>
+          </a:xfrm>
+          <a:prstGeom prst="rect">
+            <a:avLst/>
+          </a:prstGeom>
+        </p:spPr>
+        <p:txBody>
+          <a:bodyPr wrap="none">
+            <a:spAutoFit/>
+          </a:bodyPr>
+          <a:lstStyle/>
+          <a:p>
+            <a:pPr algn="ctr"/>
+            <a:r>
+              <a:rPr lang="en-GB" dirty="0" smtClean="0"/>
+              <a:t>…</a:t>
+            </a:r>
+            <a:endParaRPr lang="en-GB" dirty="0"/>
+          </a:p>
+        </p:txBody>
+      </p:sp>
+      <p:sp>
+        <p:nvSpPr>
+          <p:cNvPr id="29" name="Rectangle 28"/>
+          <p:cNvSpPr/>
+          <p:nvPr/>
+        </p:nvSpPr>
+        <p:spPr>
+          <a:xfrm>
+            <a:off x="4762381" y="1840468"/>
+            <a:ext cx="800219" cy="369332"/>
+          </a:xfrm>
+          <a:prstGeom prst="rect">
+            <a:avLst/>
+          </a:prstGeom>
+        </p:spPr>
+        <p:txBody>
+          <a:bodyPr wrap="none">
+            <a:spAutoFit/>
+          </a:bodyPr>
+          <a:lstStyle/>
+          <a:p>
+            <a:pPr algn="ctr"/>
+            <a:r>
+              <a:rPr lang="en-GB" dirty="0" smtClean="0"/>
+              <a:t>N_143</a:t>
+            </a:r>
+            <a:endParaRPr lang="en-GB" dirty="0"/>
+          </a:p>
+        </p:txBody>
+      </p:sp>
+      <p:sp>
+        <p:nvSpPr>
+          <p:cNvPr id="30" name="Oval 29"/>
+          <p:cNvSpPr/>
+          <p:nvPr/>
+        </p:nvSpPr>
+        <p:spPr>
+          <a:xfrm>
+            <a:off x="2419290" y="3352800"/>
+            <a:ext cx="152400" cy="152400"/>
+          </a:xfrm>
+          <a:prstGeom prst="ellipse">
+            <a:avLst/>
+          </a:prstGeom>
+          <a:solidFill>
+            <a:schemeClr val="tx1"/>
+          </a:solidFill>
+          <a:ln>
+            <a:solidFill>
+              <a:schemeClr val="tx1"/>
+            </a:solidFill>
+          </a:ln>
+        </p:spPr>
+        <p:style>
+          <a:lnRef idx="2">
+            <a:schemeClr val="accent1">
+              <a:shade val="50000"/>
+            </a:schemeClr>
+          </a:lnRef>
+          <a:fillRef idx="1">
+            <a:schemeClr val="accent1"/>
+          </a:fillRef>
+          <a:effectRef idx="0">
+            <a:schemeClr val="accent1"/>
+          </a:effectRef>
+          <a:fontRef idx="minor">
+            <a:schemeClr val="lt1"/>
+          </a:fontRef>
+        </p:style>
+        <p:txBody>
+          <a:bodyPr rtlCol="0" anchor="ctr"/>
+          <a:lstStyle/>
+          <a:p>
+            <a:pPr algn="ctr"/>
+            <a:endParaRPr lang="en-GB"/>
+          </a:p>
+        </p:txBody>
+      </p:sp>
+      <p:cxnSp>
+        <p:nvCxnSpPr>
+          <p:cNvPr id="31" name="Curved Connector 30"/>
+          <p:cNvCxnSpPr>
+            <a:stCxn id="30" idx="0"/>
+            <a:endCxn id="29" idx="2"/>
+          </p:cNvCxnSpPr>
+          <p:nvPr/>
+        </p:nvCxnSpPr>
+        <p:spPr>
+          <a:xfrm rot="5400000" flipH="1" flipV="1">
+            <a:off x="3257490" y="1447800"/>
+            <a:ext cx="1143000" cy="2667001"/>
+          </a:xfrm>
+          <a:prstGeom prst="curvedConnector3">
+            <a:avLst>
+              <a:gd name="adj1" fmla="val 50000"/>
+            </a:avLst>
+          </a:prstGeom>
+          <a:ln>
+            <a:solidFill>
+              <a:schemeClr val="tx1"/>
+            </a:solidFill>
+          </a:ln>
+        </p:spPr>
+        <p:style>
+          <a:lnRef idx="1">
+            <a:schemeClr val="accent1"/>
+          </a:lnRef>
+          <a:fillRef idx="0">
+            <a:schemeClr val="accent1"/>
+          </a:fillRef>
+          <a:effectRef idx="0">
+            <a:schemeClr val="accent1"/>
+          </a:effectRef>
+          <a:fontRef idx="minor">
+            <a:schemeClr val="tx1"/>
+          </a:fontRef>
+        </p:style>
+      </p:cxnSp>
+      <p:sp>
+        <p:nvSpPr>
+          <p:cNvPr id="34" name="Oval 33"/>
+          <p:cNvSpPr/>
+          <p:nvPr/>
+        </p:nvSpPr>
+        <p:spPr>
+          <a:xfrm>
+            <a:off x="6019800" y="3364468"/>
+            <a:ext cx="152400" cy="152400"/>
+          </a:xfrm>
+          <a:prstGeom prst="ellipse">
+            <a:avLst/>
+          </a:prstGeom>
+          <a:solidFill>
+            <a:schemeClr val="tx1"/>
+          </a:solidFill>
+          <a:ln>
+            <a:solidFill>
+              <a:schemeClr val="tx1"/>
+            </a:solidFill>
+          </a:ln>
+        </p:spPr>
+        <p:style>
+          <a:lnRef idx="2">
+            <a:schemeClr val="accent1">
+              <a:shade val="50000"/>
+            </a:schemeClr>
+          </a:lnRef>
+          <a:fillRef idx="1">
+            <a:schemeClr val="accent1"/>
+          </a:fillRef>
+          <a:effectRef idx="0">
+            <a:schemeClr val="accent1"/>
+          </a:effectRef>
+          <a:fontRef idx="minor">
+            <a:schemeClr val="lt1"/>
+          </a:fontRef>
+        </p:style>
+        <p:txBody>
+          <a:bodyPr rtlCol="0" anchor="ctr"/>
+          <a:lstStyle/>
+          <a:p>
+            <a:pPr algn="ctr"/>
+            <a:endParaRPr lang="en-GB"/>
+          </a:p>
+        </p:txBody>
+      </p:sp>
+      <p:cxnSp>
+        <p:nvCxnSpPr>
+          <p:cNvPr id="35" name="Curved Connector 34"/>
+          <p:cNvCxnSpPr>
+            <a:stCxn id="34" idx="0"/>
+            <a:endCxn id="29" idx="2"/>
+          </p:cNvCxnSpPr>
+          <p:nvPr/>
+        </p:nvCxnSpPr>
+        <p:spPr>
+          <a:xfrm rot="16200000" flipV="1">
+            <a:off x="5051912" y="2320379"/>
+            <a:ext cx="1154668" cy="933509"/>
+          </a:xfrm>
+          <a:prstGeom prst="curvedConnector3">
+            <a:avLst>
+              <a:gd name="adj1" fmla="val 50000"/>
+            </a:avLst>
+          </a:prstGeom>
+          <a:ln>
+            <a:solidFill>
+              <a:schemeClr val="tx1"/>
+            </a:solidFill>
+          </a:ln>
+        </p:spPr>
+        <p:style>
+          <a:lnRef idx="1">
+            <a:schemeClr val="accent1"/>
+          </a:lnRef>
+          <a:fillRef idx="0">
+            <a:schemeClr val="accent1"/>
+          </a:fillRef>
+          <a:effectRef idx="0">
+            <a:schemeClr val="accent1"/>
+          </a:effectRef>
+          <a:fontRef idx="minor">
+            <a:schemeClr val="tx1"/>
+          </a:fontRef>
+        </p:style>
+      </p:cxnSp>
+    </p:spTree>
+  </p:cSld>
+  <p:clrMapOvr>
+    <a:masterClrMapping/>
+  </p:clrMapOvr>
+</p:sld>
+</file>
+
+<file path=ppt/slides/slide21.xml><?xml version="1.0" encoding="utf-8"?>
+<p:sld xmlns:a="http://schemas.openxmlformats.org/drawingml/2006/main" xmlns:r="http://schemas.openxmlformats.org/officeDocument/2006/relationships" xmlns:p="http://schemas.openxmlformats.org/presentationml/2006/main">
+  <p:cSld>
+    <p:spTree>
+      <p:nvGrpSpPr>
+        <p:cNvPr id="1" name=""/>
+        <p:cNvGrpSpPr/>
+        <p:nvPr/>
+      </p:nvGrpSpPr>
+      <p:grpSpPr>
+        <a:xfrm>
+          <a:off x="0" y="0"/>
+          <a:ext cx="0" cy="0"/>
+          <a:chOff x="0" y="0"/>
+          <a:chExt cx="0" cy="0"/>
+        </a:xfrm>
+      </p:grpSpPr>
+      <p:sp>
+        <p:nvSpPr>
+          <p:cNvPr id="4" name="Title 3"/>
+          <p:cNvSpPr>
+            <a:spLocks noGrp="1"/>
+          </p:cNvSpPr>
+          <p:nvPr>
+            <p:ph type="title"/>
+          </p:nvPr>
+        </p:nvSpPr>
+        <p:spPr/>
+        <p:txBody>
+          <a:bodyPr>
+            <a:normAutofit/>
+          </a:bodyPr>
+          <a:lstStyle/>
+          <a:p>
+            <a:r>
+              <a:rPr lang="en-GB" dirty="0" smtClean="0"/>
+              <a:t>Relational database – join link</a:t>
+            </a:r>
+            <a:endParaRPr lang="en-GB" dirty="0"/>
+          </a:p>
+        </p:txBody>
+      </p:sp>
+      <p:sp>
+        <p:nvSpPr>
+          <p:cNvPr id="7" name="Rounded Rectangle 6"/>
+          <p:cNvSpPr/>
+          <p:nvPr/>
+        </p:nvSpPr>
+        <p:spPr>
+          <a:xfrm>
+            <a:off x="1295400" y="3124200"/>
+            <a:ext cx="2743200" cy="1828800"/>
+          </a:xfrm>
+          <a:prstGeom prst="roundRect">
+            <a:avLst/>
+          </a:prstGeom>
+          <a:solidFill>
+            <a:schemeClr val="bg1"/>
+          </a:solidFill>
+          <a:ln>
+            <a:solidFill>
+              <a:schemeClr val="tx1"/>
+            </a:solidFill>
+          </a:ln>
+        </p:spPr>
+        <p:style>
+          <a:lnRef idx="2">
+            <a:schemeClr val="accent1">
+              <a:shade val="50000"/>
+            </a:schemeClr>
+          </a:lnRef>
+          <a:fillRef idx="1">
+            <a:schemeClr val="accent1"/>
+          </a:fillRef>
+          <a:effectRef idx="0">
+            <a:schemeClr val="accent1"/>
+          </a:effectRef>
+          <a:fontRef idx="minor">
+            <a:schemeClr val="lt1"/>
+          </a:fontRef>
+        </p:style>
+        <p:txBody>
+          <a:bodyPr rtlCol="0" anchor="ctr"/>
+          <a:lstStyle/>
+          <a:p>
+            <a:pPr algn="ctr"/>
+            <a:endParaRPr lang="en-GB" dirty="0">
+              <a:solidFill>
+                <a:schemeClr val="tx1"/>
+              </a:solidFill>
+            </a:endParaRPr>
+          </a:p>
+        </p:txBody>
+      </p:sp>
+      <p:sp>
+        <p:nvSpPr>
+          <p:cNvPr id="13" name="Rectangle 12"/>
+          <p:cNvSpPr/>
+          <p:nvPr/>
+        </p:nvSpPr>
+        <p:spPr>
+          <a:xfrm>
+            <a:off x="1295400" y="2743200"/>
+            <a:ext cx="1230017" cy="369332"/>
+          </a:xfrm>
+          <a:prstGeom prst="rect">
+            <a:avLst/>
+          </a:prstGeom>
+        </p:spPr>
+        <p:txBody>
+          <a:bodyPr wrap="none">
+            <a:spAutoFit/>
+          </a:bodyPr>
+          <a:lstStyle/>
+          <a:p>
+            <a:pPr algn="ctr"/>
+            <a:r>
+              <a:rPr lang="en-GB" dirty="0" smtClean="0"/>
+              <a:t>PersonRow</a:t>
+            </a:r>
+            <a:endParaRPr lang="en-GB" dirty="0"/>
+          </a:p>
+        </p:txBody>
+      </p:sp>
+      <p:sp>
+        <p:nvSpPr>
+          <p:cNvPr id="15" name="Rounded Rectangle 14"/>
+          <p:cNvSpPr/>
+          <p:nvPr/>
+        </p:nvSpPr>
+        <p:spPr>
+          <a:xfrm>
+            <a:off x="1752600" y="3505200"/>
+            <a:ext cx="1447800" cy="1295400"/>
+          </a:xfrm>
+          <a:prstGeom prst="roundRect">
+            <a:avLst/>
+          </a:prstGeom>
+          <a:solidFill>
+            <a:schemeClr val="bg1"/>
+          </a:solidFill>
+          <a:ln>
+            <a:solidFill>
+              <a:schemeClr val="tx1"/>
+            </a:solidFill>
+          </a:ln>
+        </p:spPr>
+        <p:style>
+          <a:lnRef idx="2">
+            <a:schemeClr val="accent1">
+              <a:shade val="50000"/>
+            </a:schemeClr>
+          </a:lnRef>
+          <a:fillRef idx="1">
+            <a:schemeClr val="accent1"/>
+          </a:fillRef>
+          <a:effectRef idx="0">
+            <a:schemeClr val="accent1"/>
+          </a:effectRef>
+          <a:fontRef idx="minor">
+            <a:schemeClr val="lt1"/>
+          </a:fontRef>
+        </p:style>
+        <p:txBody>
+          <a:bodyPr rtlCol="0" anchor="ctr"/>
+          <a:lstStyle/>
+          <a:p>
+            <a:pPr algn="ctr"/>
+            <a:endParaRPr lang="en-GB" dirty="0">
+              <a:solidFill>
+                <a:schemeClr val="tx1"/>
+              </a:solidFill>
+            </a:endParaRPr>
+          </a:p>
+        </p:txBody>
+      </p:sp>
+      <p:sp>
+        <p:nvSpPr>
+          <p:cNvPr id="16" name="Rectangle 15"/>
+          <p:cNvSpPr/>
+          <p:nvPr/>
+        </p:nvSpPr>
+        <p:spPr>
+          <a:xfrm>
+            <a:off x="1698006" y="3135868"/>
+            <a:ext cx="359394" cy="369332"/>
+          </a:xfrm>
+          <a:prstGeom prst="rect">
+            <a:avLst/>
+          </a:prstGeom>
+        </p:spPr>
+        <p:txBody>
+          <a:bodyPr wrap="none">
+            <a:spAutoFit/>
+          </a:bodyPr>
+          <a:lstStyle/>
+          <a:p>
+            <a:pPr algn="ctr"/>
+            <a:r>
+              <a:rPr lang="en-GB" dirty="0" smtClean="0"/>
+              <a:t>id</a:t>
+            </a:r>
+            <a:endParaRPr lang="en-GB" dirty="0"/>
+          </a:p>
+        </p:txBody>
+      </p:sp>
+      <p:sp>
+        <p:nvSpPr>
+          <p:cNvPr id="18" name="Oval 17"/>
+          <p:cNvSpPr/>
+          <p:nvPr/>
+        </p:nvSpPr>
+        <p:spPr>
+          <a:xfrm>
+            <a:off x="2057400" y="3733800"/>
+            <a:ext cx="914400" cy="838200"/>
+          </a:xfrm>
+          <a:prstGeom prst="ellipse">
+            <a:avLst/>
+          </a:prstGeom>
+          <a:solidFill>
+            <a:schemeClr val="bg1"/>
+          </a:solidFill>
+          <a:ln>
+            <a:solidFill>
+              <a:schemeClr val="tx1"/>
+            </a:solidFill>
+          </a:ln>
+        </p:spPr>
+        <p:style>
+          <a:lnRef idx="2">
+            <a:schemeClr val="accent1">
+              <a:shade val="50000"/>
+            </a:schemeClr>
+          </a:lnRef>
+          <a:fillRef idx="1">
+            <a:schemeClr val="accent1"/>
+          </a:fillRef>
+          <a:effectRef idx="0">
+            <a:schemeClr val="accent1"/>
+          </a:effectRef>
+          <a:fontRef idx="minor">
+            <a:schemeClr val="lt1"/>
+          </a:fontRef>
+        </p:style>
+        <p:txBody>
+          <a:bodyPr lIns="0" rIns="0" rtlCol="0" anchor="ctr"/>
+          <a:lstStyle/>
+          <a:p>
+            <a:pPr algn="ctr"/>
+            <a:r>
+              <a:rPr lang="en-GB" dirty="0" smtClean="0">
+                <a:solidFill>
+                  <a:schemeClr val="tx1"/>
+                </a:solidFill>
+              </a:rPr>
+              <a:t>N_143</a:t>
+            </a:r>
+            <a:endParaRPr lang="en-GB" dirty="0">
+              <a:solidFill>
+                <a:schemeClr val="tx1"/>
+              </a:solidFill>
+            </a:endParaRPr>
+          </a:p>
+        </p:txBody>
+      </p:sp>
+      <p:sp>
+        <p:nvSpPr>
+          <p:cNvPr id="9" name="Rectangle 8"/>
+          <p:cNvSpPr/>
+          <p:nvPr/>
+        </p:nvSpPr>
+        <p:spPr>
+          <a:xfrm>
+            <a:off x="3429000" y="3810000"/>
+            <a:ext cx="343363" cy="369332"/>
+          </a:xfrm>
+          <a:prstGeom prst="rect">
+            <a:avLst/>
+          </a:prstGeom>
+        </p:spPr>
+        <p:txBody>
+          <a:bodyPr wrap="none">
+            <a:spAutoFit/>
+          </a:bodyPr>
+          <a:lstStyle/>
+          <a:p>
+            <a:pPr algn="ctr"/>
+            <a:r>
+              <a:rPr lang="en-GB" dirty="0" smtClean="0"/>
+              <a:t>…</a:t>
+            </a:r>
+            <a:endParaRPr lang="en-GB" dirty="0"/>
+          </a:p>
+        </p:txBody>
+      </p:sp>
+      <p:sp>
+        <p:nvSpPr>
+          <p:cNvPr id="14" name="Rounded Rectangle 13"/>
+          <p:cNvSpPr/>
+          <p:nvPr/>
+        </p:nvSpPr>
+        <p:spPr>
+          <a:xfrm>
+            <a:off x="990600" y="2362200"/>
+            <a:ext cx="6553200" cy="3124200"/>
+          </a:xfrm>
+          <a:prstGeom prst="roundRect">
+            <a:avLst/>
+          </a:prstGeom>
+          <a:noFill/>
+          <a:ln w="9525">
+            <a:solidFill>
+              <a:schemeClr val="tx1"/>
+            </a:solidFill>
+            <a:prstDash val="solid"/>
+          </a:ln>
+        </p:spPr>
+        <p:style>
+          <a:lnRef idx="2">
+            <a:schemeClr val="accent1">
+              <a:shade val="50000"/>
+            </a:schemeClr>
+          </a:lnRef>
+          <a:fillRef idx="1">
+            <a:schemeClr val="accent1"/>
+          </a:fillRef>
+          <a:effectRef idx="0">
+            <a:schemeClr val="accent1"/>
+          </a:effectRef>
+          <a:fontRef idx="minor">
+            <a:schemeClr val="lt1"/>
+          </a:fontRef>
+        </p:style>
+        <p:txBody>
+          <a:bodyPr rtlCol="0" anchor="ctr"/>
+          <a:lstStyle/>
+          <a:p>
+            <a:pPr algn="ctr"/>
+            <a:endParaRPr lang="en-GB" dirty="0">
+              <a:solidFill>
+                <a:schemeClr val="tx1"/>
+              </a:solidFill>
+            </a:endParaRPr>
+          </a:p>
+        </p:txBody>
+      </p:sp>
+      <p:sp>
+        <p:nvSpPr>
+          <p:cNvPr id="17" name="Rectangle 16"/>
+          <p:cNvSpPr/>
+          <p:nvPr/>
+        </p:nvSpPr>
+        <p:spPr>
+          <a:xfrm>
+            <a:off x="1295400" y="1992868"/>
+            <a:ext cx="2031775" cy="369332"/>
+          </a:xfrm>
+          <a:prstGeom prst="rect">
+            <a:avLst/>
+          </a:prstGeom>
+        </p:spPr>
+        <p:txBody>
+          <a:bodyPr wrap="none">
+            <a:spAutoFit/>
+          </a:bodyPr>
+          <a:lstStyle/>
+          <a:p>
+            <a:pPr algn="ctr"/>
+            <a:r>
+              <a:rPr lang="en-GB" dirty="0" smtClean="0"/>
+              <a:t>Database (optional)</a:t>
+            </a:r>
+            <a:endParaRPr lang="en-GB" dirty="0"/>
+          </a:p>
+        </p:txBody>
+      </p:sp>
+      <p:sp>
+        <p:nvSpPr>
+          <p:cNvPr id="19" name="Rectangle 18"/>
+          <p:cNvSpPr/>
+          <p:nvPr/>
+        </p:nvSpPr>
+        <p:spPr>
+          <a:xfrm>
+            <a:off x="2514600" y="5105400"/>
+            <a:ext cx="343363" cy="369332"/>
+          </a:xfrm>
+          <a:prstGeom prst="rect">
+            <a:avLst/>
+          </a:prstGeom>
+        </p:spPr>
+        <p:txBody>
+          <a:bodyPr wrap="none">
+            <a:spAutoFit/>
+          </a:bodyPr>
+          <a:lstStyle/>
+          <a:p>
+            <a:pPr algn="ctr"/>
+            <a:r>
+              <a:rPr lang="en-GB" dirty="0" smtClean="0"/>
+              <a:t>…</a:t>
+            </a:r>
+            <a:endParaRPr lang="en-GB" dirty="0"/>
+          </a:p>
+        </p:txBody>
+      </p:sp>
+      <p:sp>
+        <p:nvSpPr>
+          <p:cNvPr id="20" name="Rounded Rectangle 19"/>
+          <p:cNvSpPr/>
+          <p:nvPr/>
+        </p:nvSpPr>
+        <p:spPr>
+          <a:xfrm>
+            <a:off x="4495800" y="3124200"/>
+            <a:ext cx="2743200" cy="1828800"/>
+          </a:xfrm>
+          <a:prstGeom prst="roundRect">
+            <a:avLst/>
+          </a:prstGeom>
+          <a:solidFill>
+            <a:schemeClr val="bg1"/>
+          </a:solidFill>
+          <a:ln>
+            <a:solidFill>
+              <a:schemeClr val="tx1"/>
+            </a:solidFill>
+          </a:ln>
+        </p:spPr>
+        <p:style>
+          <a:lnRef idx="2">
+            <a:schemeClr val="accent1">
+              <a:shade val="50000"/>
+            </a:schemeClr>
+          </a:lnRef>
+          <a:fillRef idx="1">
+            <a:schemeClr val="accent1"/>
+          </a:fillRef>
+          <a:effectRef idx="0">
+            <a:schemeClr val="accent1"/>
+          </a:effectRef>
+          <a:fontRef idx="minor">
+            <a:schemeClr val="lt1"/>
+          </a:fontRef>
+        </p:style>
+        <p:txBody>
+          <a:bodyPr rtlCol="0" anchor="ctr"/>
+          <a:lstStyle/>
+          <a:p>
+            <a:pPr algn="ctr"/>
+            <a:endParaRPr lang="en-GB" dirty="0">
+              <a:solidFill>
+                <a:schemeClr val="tx1"/>
+              </a:solidFill>
+            </a:endParaRPr>
+          </a:p>
+        </p:txBody>
+      </p:sp>
+      <p:sp>
+        <p:nvSpPr>
+          <p:cNvPr id="21" name="Rectangle 20"/>
+          <p:cNvSpPr/>
+          <p:nvPr/>
+        </p:nvSpPr>
+        <p:spPr>
+          <a:xfrm>
+            <a:off x="4495800" y="2743200"/>
+            <a:ext cx="989759" cy="369332"/>
+          </a:xfrm>
+          <a:prstGeom prst="rect">
+            <a:avLst/>
+          </a:prstGeom>
+        </p:spPr>
+        <p:txBody>
+          <a:bodyPr wrap="none">
+            <a:spAutoFit/>
+          </a:bodyPr>
+          <a:lstStyle/>
+          <a:p>
+            <a:pPr algn="ctr"/>
+            <a:r>
+              <a:rPr lang="en-GB" dirty="0" smtClean="0"/>
+              <a:t>TaskRow</a:t>
+            </a:r>
+            <a:endParaRPr lang="en-GB" dirty="0"/>
+          </a:p>
+        </p:txBody>
+      </p:sp>
+      <p:sp>
+        <p:nvSpPr>
+          <p:cNvPr id="22" name="Rounded Rectangle 21"/>
+          <p:cNvSpPr/>
+          <p:nvPr/>
+        </p:nvSpPr>
+        <p:spPr>
+          <a:xfrm>
+            <a:off x="4953000" y="3505200"/>
+            <a:ext cx="1447800" cy="1295400"/>
+          </a:xfrm>
+          <a:prstGeom prst="roundRect">
+            <a:avLst/>
+          </a:prstGeom>
+          <a:solidFill>
+            <a:schemeClr val="bg1"/>
+          </a:solidFill>
+          <a:ln>
+            <a:solidFill>
+              <a:schemeClr val="tx1"/>
+            </a:solidFill>
+          </a:ln>
+        </p:spPr>
+        <p:style>
+          <a:lnRef idx="2">
+            <a:schemeClr val="accent1">
+              <a:shade val="50000"/>
+            </a:schemeClr>
+          </a:lnRef>
+          <a:fillRef idx="1">
+            <a:schemeClr val="accent1"/>
+          </a:fillRef>
+          <a:effectRef idx="0">
+            <a:schemeClr val="accent1"/>
+          </a:effectRef>
+          <a:fontRef idx="minor">
+            <a:schemeClr val="lt1"/>
+          </a:fontRef>
+        </p:style>
+        <p:txBody>
+          <a:bodyPr rtlCol="0" anchor="ctr"/>
+          <a:lstStyle/>
+          <a:p>
+            <a:pPr algn="ctr"/>
+            <a:endParaRPr lang="en-GB" dirty="0">
+              <a:solidFill>
+                <a:schemeClr val="tx1"/>
+              </a:solidFill>
+            </a:endParaRPr>
+          </a:p>
+        </p:txBody>
+      </p:sp>
+      <p:sp>
+        <p:nvSpPr>
+          <p:cNvPr id="23" name="Rectangle 22"/>
+          <p:cNvSpPr/>
+          <p:nvPr/>
+        </p:nvSpPr>
+        <p:spPr>
+          <a:xfrm>
+            <a:off x="4898406" y="3135868"/>
+            <a:ext cx="1006238" cy="369332"/>
+          </a:xfrm>
+          <a:prstGeom prst="rect">
+            <a:avLst/>
+          </a:prstGeom>
+        </p:spPr>
+        <p:txBody>
+          <a:bodyPr wrap="none">
+            <a:spAutoFit/>
+          </a:bodyPr>
+          <a:lstStyle/>
+          <a:p>
+            <a:pPr algn="ctr"/>
+            <a:r>
+              <a:rPr lang="en-GB" dirty="0" smtClean="0"/>
+              <a:t>personid</a:t>
+            </a:r>
+            <a:endParaRPr lang="en-GB" dirty="0"/>
+          </a:p>
+        </p:txBody>
+      </p:sp>
+      <p:sp>
+        <p:nvSpPr>
+          <p:cNvPr id="24" name="Oval 23"/>
+          <p:cNvSpPr/>
+          <p:nvPr/>
+        </p:nvSpPr>
+        <p:spPr>
+          <a:xfrm>
+            <a:off x="5257800" y="3733800"/>
+            <a:ext cx="914400" cy="838200"/>
+          </a:xfrm>
+          <a:prstGeom prst="ellipse">
+            <a:avLst/>
+          </a:prstGeom>
+          <a:solidFill>
+            <a:schemeClr val="bg1"/>
+          </a:solidFill>
+          <a:ln>
+            <a:solidFill>
+              <a:schemeClr val="tx1"/>
+            </a:solidFill>
+          </a:ln>
+        </p:spPr>
+        <p:style>
+          <a:lnRef idx="2">
+            <a:schemeClr val="accent1">
+              <a:shade val="50000"/>
+            </a:schemeClr>
+          </a:lnRef>
+          <a:fillRef idx="1">
+            <a:schemeClr val="accent1"/>
+          </a:fillRef>
+          <a:effectRef idx="0">
+            <a:schemeClr val="accent1"/>
+          </a:effectRef>
+          <a:fontRef idx="minor">
+            <a:schemeClr val="lt1"/>
+          </a:fontRef>
+        </p:style>
+        <p:txBody>
+          <a:bodyPr lIns="0" rIns="0" rtlCol="0" anchor="ctr"/>
+          <a:lstStyle/>
+          <a:p>
+            <a:pPr algn="ctr"/>
+            <a:r>
+              <a:rPr lang="en-GB" dirty="0" smtClean="0">
+                <a:solidFill>
+                  <a:schemeClr val="tx1"/>
+                </a:solidFill>
+              </a:rPr>
+              <a:t>N_143</a:t>
+            </a:r>
+            <a:endParaRPr lang="en-GB" dirty="0">
+              <a:solidFill>
+                <a:schemeClr val="tx1"/>
+              </a:solidFill>
+            </a:endParaRPr>
+          </a:p>
+        </p:txBody>
+      </p:sp>
+      <p:sp>
+        <p:nvSpPr>
+          <p:cNvPr id="25" name="Rectangle 24"/>
+          <p:cNvSpPr/>
+          <p:nvPr/>
+        </p:nvSpPr>
+        <p:spPr>
+          <a:xfrm>
+            <a:off x="6629400" y="3810000"/>
+            <a:ext cx="343363" cy="369332"/>
+          </a:xfrm>
+          <a:prstGeom prst="rect">
+            <a:avLst/>
+          </a:prstGeom>
+        </p:spPr>
+        <p:txBody>
+          <a:bodyPr wrap="none">
+            <a:spAutoFit/>
+          </a:bodyPr>
+          <a:lstStyle/>
+          <a:p>
+            <a:pPr algn="ctr"/>
+            <a:r>
+              <a:rPr lang="en-GB" dirty="0" smtClean="0"/>
+              <a:t>…</a:t>
+            </a:r>
+            <a:endParaRPr lang="en-GB" dirty="0"/>
+          </a:p>
+        </p:txBody>
+      </p:sp>
+      <p:sp>
+        <p:nvSpPr>
+          <p:cNvPr id="28" name="Rectangle 27"/>
+          <p:cNvSpPr/>
+          <p:nvPr/>
+        </p:nvSpPr>
+        <p:spPr>
+          <a:xfrm>
+            <a:off x="5715000" y="5105400"/>
+            <a:ext cx="343363" cy="369332"/>
+          </a:xfrm>
+          <a:prstGeom prst="rect">
+            <a:avLst/>
+          </a:prstGeom>
+        </p:spPr>
+        <p:txBody>
+          <a:bodyPr wrap="none">
+            <a:spAutoFit/>
+          </a:bodyPr>
+          <a:lstStyle/>
+          <a:p>
+            <a:pPr algn="ctr"/>
+            <a:r>
+              <a:rPr lang="en-GB" dirty="0" smtClean="0"/>
+              <a:t>…</a:t>
+            </a:r>
+            <a:endParaRPr lang="en-GB" dirty="0"/>
+          </a:p>
+        </p:txBody>
+      </p:sp>
+      <p:sp>
+        <p:nvSpPr>
+          <p:cNvPr id="30" name="Oval 29"/>
+          <p:cNvSpPr/>
+          <p:nvPr/>
+        </p:nvSpPr>
+        <p:spPr>
+          <a:xfrm>
+            <a:off x="2419290" y="3352800"/>
+            <a:ext cx="152400" cy="152400"/>
+          </a:xfrm>
+          <a:prstGeom prst="ellipse">
+            <a:avLst/>
+          </a:prstGeom>
+          <a:solidFill>
+            <a:schemeClr val="tx1"/>
+          </a:solidFill>
+          <a:ln>
+            <a:solidFill>
+              <a:schemeClr val="tx1"/>
+            </a:solidFill>
+          </a:ln>
+        </p:spPr>
+        <p:style>
+          <a:lnRef idx="2">
+            <a:schemeClr val="accent1">
+              <a:shade val="50000"/>
+            </a:schemeClr>
+          </a:lnRef>
+          <a:fillRef idx="1">
+            <a:schemeClr val="accent1"/>
+          </a:fillRef>
+          <a:effectRef idx="0">
+            <a:schemeClr val="accent1"/>
+          </a:effectRef>
+          <a:fontRef idx="minor">
+            <a:schemeClr val="lt1"/>
+          </a:fontRef>
+        </p:style>
+        <p:txBody>
+          <a:bodyPr rtlCol="0" anchor="ctr"/>
+          <a:lstStyle/>
+          <a:p>
+            <a:pPr algn="ctr"/>
+            <a:endParaRPr lang="en-GB"/>
+          </a:p>
+        </p:txBody>
+      </p:sp>
+      <p:cxnSp>
+        <p:nvCxnSpPr>
+          <p:cNvPr id="31" name="Curved Connector 30"/>
+          <p:cNvCxnSpPr>
+            <a:stCxn id="30" idx="0"/>
+            <a:endCxn id="34" idx="7"/>
+          </p:cNvCxnSpPr>
+          <p:nvPr/>
+        </p:nvCxnSpPr>
+        <p:spPr>
+          <a:xfrm rot="16200000" flipH="1">
+            <a:off x="4267593" y="1580697"/>
+            <a:ext cx="33986" cy="3578192"/>
+          </a:xfrm>
+          <a:prstGeom prst="curvedConnector3">
+            <a:avLst>
+              <a:gd name="adj1" fmla="val -2438284"/>
+            </a:avLst>
+          </a:prstGeom>
+          <a:ln>
+            <a:solidFill>
+              <a:schemeClr val="tx1"/>
+            </a:solidFill>
+          </a:ln>
+        </p:spPr>
+        <p:style>
+          <a:lnRef idx="1">
+            <a:schemeClr val="accent1"/>
+          </a:lnRef>
+          <a:fillRef idx="0">
+            <a:schemeClr val="accent1"/>
+          </a:fillRef>
+          <a:effectRef idx="0">
+            <a:schemeClr val="accent1"/>
+          </a:effectRef>
+          <a:fontRef idx="minor">
+            <a:schemeClr val="tx1"/>
+          </a:fontRef>
+        </p:style>
+      </p:cxnSp>
+      <p:sp>
+        <p:nvSpPr>
+          <p:cNvPr id="34" name="Oval 33"/>
+          <p:cNvSpPr/>
+          <p:nvPr/>
+        </p:nvSpPr>
+        <p:spPr>
+          <a:xfrm>
+            <a:off x="5943600" y="3364468"/>
+            <a:ext cx="152400" cy="152400"/>
+          </a:xfrm>
+          <a:prstGeom prst="ellipse">
+            <a:avLst/>
+          </a:prstGeom>
+          <a:solidFill>
+            <a:schemeClr val="tx1"/>
+          </a:solidFill>
+          <a:ln>
+            <a:solidFill>
+              <a:schemeClr val="tx1"/>
+            </a:solidFill>
+          </a:ln>
+        </p:spPr>
+        <p:style>
+          <a:lnRef idx="2">
+            <a:schemeClr val="accent1">
+              <a:shade val="50000"/>
+            </a:schemeClr>
+          </a:lnRef>
+          <a:fillRef idx="1">
+            <a:schemeClr val="accent1"/>
+          </a:fillRef>
+          <a:effectRef idx="0">
+            <a:schemeClr val="accent1"/>
+          </a:effectRef>
+          <a:fontRef idx="minor">
+            <a:schemeClr val="lt1"/>
+          </a:fontRef>
+        </p:style>
+        <p:txBody>
+          <a:bodyPr rtlCol="0" anchor="ctr"/>
+          <a:lstStyle/>
+          <a:p>
+            <a:pPr algn="ctr"/>
+            <a:endParaRPr lang="en-GB"/>
+          </a:p>
+        </p:txBody>
+      </p:sp>
+    </p:spTree>
+  </p:cSld>
+  <p:clrMapOvr>
+    <a:masterClrMapping/>
+  </p:clrMapOvr>
+</p:sld>
+</file>
+
+<file path=ppt/slides/slide22.xml><?xml version="1.0" encoding="utf-8"?>
+<p:sld xmlns:a="http://schemas.openxmlformats.org/drawingml/2006/main" xmlns:r="http://schemas.openxmlformats.org/officeDocument/2006/relationships" xmlns:p="http://schemas.openxmlformats.org/presentationml/2006/main">
+  <p:cSld>
+    <p:spTree>
+      <p:nvGrpSpPr>
+        <p:cNvPr id="1" name=""/>
+        <p:cNvGrpSpPr/>
+        <p:nvPr/>
+      </p:nvGrpSpPr>
+      <p:grpSpPr>
+        <a:xfrm>
+          <a:off x="0" y="0"/>
+          <a:ext cx="0" cy="0"/>
+          <a:chOff x="0" y="0"/>
+          <a:chExt cx="0" cy="0"/>
+        </a:xfrm>
+      </p:grpSpPr>
+      <p:sp>
+        <p:nvSpPr>
+          <p:cNvPr id="4" name="Title 3"/>
+          <p:cNvSpPr>
+            <a:spLocks noGrp="1"/>
+          </p:cNvSpPr>
+          <p:nvPr>
+            <p:ph type="title"/>
+          </p:nvPr>
+        </p:nvSpPr>
+        <p:spPr/>
+        <p:txBody>
+          <a:bodyPr>
+            <a:normAutofit/>
+          </a:bodyPr>
+          <a:lstStyle/>
+          <a:p>
+            <a:r>
+              <a:rPr lang="en-GB" dirty="0" smtClean="0"/>
+              <a:t>Relational database – no link</a:t>
+            </a:r>
+            <a:endParaRPr lang="en-GB" dirty="0"/>
+          </a:p>
+        </p:txBody>
+      </p:sp>
+      <p:sp>
+        <p:nvSpPr>
+          <p:cNvPr id="7" name="Rounded Rectangle 6"/>
+          <p:cNvSpPr/>
+          <p:nvPr/>
+        </p:nvSpPr>
+        <p:spPr>
+          <a:xfrm>
+            <a:off x="1295400" y="3124200"/>
+            <a:ext cx="2743200" cy="1828800"/>
+          </a:xfrm>
+          <a:prstGeom prst="roundRect">
+            <a:avLst/>
+          </a:prstGeom>
+          <a:solidFill>
+            <a:schemeClr val="bg1"/>
+          </a:solidFill>
+          <a:ln>
+            <a:solidFill>
+              <a:schemeClr val="tx1"/>
+            </a:solidFill>
+          </a:ln>
+        </p:spPr>
+        <p:style>
+          <a:lnRef idx="2">
+            <a:schemeClr val="accent1">
+              <a:shade val="50000"/>
+            </a:schemeClr>
+          </a:lnRef>
+          <a:fillRef idx="1">
+            <a:schemeClr val="accent1"/>
+          </a:fillRef>
+          <a:effectRef idx="0">
+            <a:schemeClr val="accent1"/>
+          </a:effectRef>
+          <a:fontRef idx="minor">
+            <a:schemeClr val="lt1"/>
+          </a:fontRef>
+        </p:style>
+        <p:txBody>
+          <a:bodyPr rtlCol="0" anchor="ctr"/>
+          <a:lstStyle/>
+          <a:p>
+            <a:pPr algn="ctr"/>
+            <a:endParaRPr lang="en-GB" dirty="0">
+              <a:solidFill>
+                <a:schemeClr val="tx1"/>
+              </a:solidFill>
+            </a:endParaRPr>
+          </a:p>
+        </p:txBody>
+      </p:sp>
+      <p:sp>
+        <p:nvSpPr>
+          <p:cNvPr id="13" name="Rectangle 12"/>
+          <p:cNvSpPr/>
+          <p:nvPr/>
+        </p:nvSpPr>
+        <p:spPr>
+          <a:xfrm>
+            <a:off x="1295400" y="2743200"/>
+            <a:ext cx="1230017" cy="369332"/>
+          </a:xfrm>
+          <a:prstGeom prst="rect">
+            <a:avLst/>
+          </a:prstGeom>
+        </p:spPr>
+        <p:txBody>
+          <a:bodyPr wrap="none">
+            <a:spAutoFit/>
+          </a:bodyPr>
+          <a:lstStyle/>
+          <a:p>
+            <a:pPr algn="ctr"/>
+            <a:r>
+              <a:rPr lang="en-GB" dirty="0" smtClean="0"/>
+              <a:t>PersonRow</a:t>
+            </a:r>
+            <a:endParaRPr lang="en-GB" dirty="0"/>
+          </a:p>
+        </p:txBody>
+      </p:sp>
+      <p:sp>
+        <p:nvSpPr>
+          <p:cNvPr id="15" name="Rounded Rectangle 14"/>
+          <p:cNvSpPr/>
+          <p:nvPr/>
+        </p:nvSpPr>
+        <p:spPr>
+          <a:xfrm>
+            <a:off x="1752600" y="3505200"/>
+            <a:ext cx="1447800" cy="1295400"/>
+          </a:xfrm>
+          <a:prstGeom prst="roundRect">
+            <a:avLst/>
+          </a:prstGeom>
+          <a:solidFill>
+            <a:schemeClr val="bg1"/>
+          </a:solidFill>
+          <a:ln>
+            <a:solidFill>
+              <a:schemeClr val="tx1"/>
+            </a:solidFill>
+          </a:ln>
+        </p:spPr>
+        <p:style>
+          <a:lnRef idx="2">
+            <a:schemeClr val="accent1">
+              <a:shade val="50000"/>
+            </a:schemeClr>
+          </a:lnRef>
+          <a:fillRef idx="1">
+            <a:schemeClr val="accent1"/>
+          </a:fillRef>
+          <a:effectRef idx="0">
+            <a:schemeClr val="accent1"/>
+          </a:effectRef>
+          <a:fontRef idx="minor">
+            <a:schemeClr val="lt1"/>
+          </a:fontRef>
+        </p:style>
+        <p:txBody>
+          <a:bodyPr rtlCol="0" anchor="ctr"/>
+          <a:lstStyle/>
+          <a:p>
+            <a:pPr algn="ctr"/>
+            <a:endParaRPr lang="en-GB" dirty="0">
+              <a:solidFill>
+                <a:schemeClr val="tx1"/>
+              </a:solidFill>
+            </a:endParaRPr>
+          </a:p>
+        </p:txBody>
+      </p:sp>
+      <p:sp>
+        <p:nvSpPr>
+          <p:cNvPr id="16" name="Rectangle 15"/>
+          <p:cNvSpPr/>
+          <p:nvPr/>
+        </p:nvSpPr>
+        <p:spPr>
+          <a:xfrm>
+            <a:off x="1698006" y="3135868"/>
+            <a:ext cx="359394" cy="369332"/>
+          </a:xfrm>
+          <a:prstGeom prst="rect">
+            <a:avLst/>
+          </a:prstGeom>
+        </p:spPr>
+        <p:txBody>
+          <a:bodyPr wrap="none">
+            <a:spAutoFit/>
+          </a:bodyPr>
+          <a:lstStyle/>
+          <a:p>
+            <a:pPr algn="ctr"/>
+            <a:r>
+              <a:rPr lang="en-GB" dirty="0" smtClean="0"/>
+              <a:t>id</a:t>
+            </a:r>
+            <a:endParaRPr lang="en-GB" dirty="0"/>
+          </a:p>
+        </p:txBody>
+      </p:sp>
+      <p:sp>
+        <p:nvSpPr>
+          <p:cNvPr id="18" name="Oval 17"/>
+          <p:cNvSpPr/>
+          <p:nvPr/>
+        </p:nvSpPr>
+        <p:spPr>
+          <a:xfrm>
+            <a:off x="2057400" y="3733800"/>
+            <a:ext cx="914400" cy="838200"/>
+          </a:xfrm>
+          <a:prstGeom prst="ellipse">
+            <a:avLst/>
+          </a:prstGeom>
+          <a:solidFill>
+            <a:schemeClr val="bg1"/>
+          </a:solidFill>
+          <a:ln>
+            <a:solidFill>
+              <a:schemeClr val="tx1"/>
+            </a:solidFill>
+          </a:ln>
+        </p:spPr>
+        <p:style>
+          <a:lnRef idx="2">
+            <a:schemeClr val="accent1">
+              <a:shade val="50000"/>
+            </a:schemeClr>
+          </a:lnRef>
+          <a:fillRef idx="1">
+            <a:schemeClr val="accent1"/>
+          </a:fillRef>
+          <a:effectRef idx="0">
+            <a:schemeClr val="accent1"/>
+          </a:effectRef>
+          <a:fontRef idx="minor">
+            <a:schemeClr val="lt1"/>
+          </a:fontRef>
+        </p:style>
+        <p:txBody>
+          <a:bodyPr lIns="0" rIns="0" rtlCol="0" anchor="ctr"/>
+          <a:lstStyle/>
+          <a:p>
+            <a:pPr algn="ctr"/>
+            <a:r>
+              <a:rPr lang="en-GB" dirty="0" smtClean="0">
+                <a:solidFill>
+                  <a:schemeClr val="tx1"/>
+                </a:solidFill>
+              </a:rPr>
+              <a:t>N_143</a:t>
+            </a:r>
+            <a:endParaRPr lang="en-GB" dirty="0">
+              <a:solidFill>
+                <a:schemeClr val="tx1"/>
+              </a:solidFill>
+            </a:endParaRPr>
+          </a:p>
+        </p:txBody>
+      </p:sp>
+      <p:sp>
+        <p:nvSpPr>
+          <p:cNvPr id="9" name="Rectangle 8"/>
+          <p:cNvSpPr/>
+          <p:nvPr/>
+        </p:nvSpPr>
+        <p:spPr>
+          <a:xfrm>
+            <a:off x="3429000" y="3810000"/>
+            <a:ext cx="343363" cy="369332"/>
+          </a:xfrm>
+          <a:prstGeom prst="rect">
+            <a:avLst/>
+          </a:prstGeom>
+        </p:spPr>
+        <p:txBody>
+          <a:bodyPr wrap="none">
+            <a:spAutoFit/>
+          </a:bodyPr>
+          <a:lstStyle/>
+          <a:p>
+            <a:pPr algn="ctr"/>
+            <a:r>
+              <a:rPr lang="en-GB" dirty="0" smtClean="0"/>
+              <a:t>…</a:t>
+            </a:r>
+            <a:endParaRPr lang="en-GB" dirty="0"/>
+          </a:p>
+        </p:txBody>
+      </p:sp>
+      <p:sp>
+        <p:nvSpPr>
+          <p:cNvPr id="14" name="Rounded Rectangle 13"/>
+          <p:cNvSpPr/>
+          <p:nvPr/>
+        </p:nvSpPr>
+        <p:spPr>
+          <a:xfrm>
+            <a:off x="990600" y="2362200"/>
+            <a:ext cx="6553200" cy="3124200"/>
+          </a:xfrm>
+          <a:prstGeom prst="roundRect">
+            <a:avLst/>
+          </a:prstGeom>
+          <a:noFill/>
+          <a:ln w="9525">
+            <a:solidFill>
+              <a:schemeClr val="tx1"/>
+            </a:solidFill>
+            <a:prstDash val="solid"/>
+          </a:ln>
+        </p:spPr>
+        <p:style>
+          <a:lnRef idx="2">
+            <a:schemeClr val="accent1">
+              <a:shade val="50000"/>
+            </a:schemeClr>
+          </a:lnRef>
+          <a:fillRef idx="1">
+            <a:schemeClr val="accent1"/>
+          </a:fillRef>
+          <a:effectRef idx="0">
+            <a:schemeClr val="accent1"/>
+          </a:effectRef>
+          <a:fontRef idx="minor">
+            <a:schemeClr val="lt1"/>
+          </a:fontRef>
+        </p:style>
+        <p:txBody>
+          <a:bodyPr rtlCol="0" anchor="ctr"/>
+          <a:lstStyle/>
+          <a:p>
+            <a:pPr algn="ctr"/>
+            <a:endParaRPr lang="en-GB" dirty="0">
+              <a:solidFill>
+                <a:schemeClr val="tx1"/>
+              </a:solidFill>
+            </a:endParaRPr>
+          </a:p>
+        </p:txBody>
+      </p:sp>
+      <p:sp>
+        <p:nvSpPr>
+          <p:cNvPr id="17" name="Rectangle 16"/>
+          <p:cNvSpPr/>
+          <p:nvPr/>
+        </p:nvSpPr>
+        <p:spPr>
+          <a:xfrm>
+            <a:off x="1295400" y="1992868"/>
+            <a:ext cx="2031775" cy="369332"/>
+          </a:xfrm>
+          <a:prstGeom prst="rect">
+            <a:avLst/>
+          </a:prstGeom>
+        </p:spPr>
+        <p:txBody>
+          <a:bodyPr wrap="none">
+            <a:spAutoFit/>
+          </a:bodyPr>
+          <a:lstStyle/>
+          <a:p>
+            <a:pPr algn="ctr"/>
+            <a:r>
+              <a:rPr lang="en-GB" dirty="0" smtClean="0"/>
+              <a:t>Database (optional)</a:t>
+            </a:r>
+            <a:endParaRPr lang="en-GB" dirty="0"/>
+          </a:p>
+        </p:txBody>
+      </p:sp>
+      <p:sp>
+        <p:nvSpPr>
+          <p:cNvPr id="19" name="Rectangle 18"/>
+          <p:cNvSpPr/>
+          <p:nvPr/>
+        </p:nvSpPr>
+        <p:spPr>
+          <a:xfrm>
+            <a:off x="2514600" y="5105400"/>
+            <a:ext cx="343363" cy="369332"/>
+          </a:xfrm>
+          <a:prstGeom prst="rect">
+            <a:avLst/>
+          </a:prstGeom>
+        </p:spPr>
+        <p:txBody>
+          <a:bodyPr wrap="none">
+            <a:spAutoFit/>
+          </a:bodyPr>
+          <a:lstStyle/>
+          <a:p>
+            <a:pPr algn="ctr"/>
+            <a:r>
+              <a:rPr lang="en-GB" dirty="0" smtClean="0"/>
+              <a:t>…</a:t>
+            </a:r>
+            <a:endParaRPr lang="en-GB" dirty="0"/>
+          </a:p>
+        </p:txBody>
+      </p:sp>
+      <p:sp>
+        <p:nvSpPr>
+          <p:cNvPr id="20" name="Rounded Rectangle 19"/>
+          <p:cNvSpPr/>
+          <p:nvPr/>
+        </p:nvSpPr>
+        <p:spPr>
+          <a:xfrm>
+            <a:off x="4495800" y="3124200"/>
+            <a:ext cx="2743200" cy="1828800"/>
+          </a:xfrm>
+          <a:prstGeom prst="roundRect">
+            <a:avLst/>
+          </a:prstGeom>
+          <a:solidFill>
+            <a:schemeClr val="bg1"/>
+          </a:solidFill>
+          <a:ln>
+            <a:solidFill>
+              <a:schemeClr val="tx1"/>
+            </a:solidFill>
+          </a:ln>
+        </p:spPr>
+        <p:style>
+          <a:lnRef idx="2">
+            <a:schemeClr val="accent1">
+              <a:shade val="50000"/>
+            </a:schemeClr>
+          </a:lnRef>
+          <a:fillRef idx="1">
+            <a:schemeClr val="accent1"/>
+          </a:fillRef>
+          <a:effectRef idx="0">
+            <a:schemeClr val="accent1"/>
+          </a:effectRef>
+          <a:fontRef idx="minor">
+            <a:schemeClr val="lt1"/>
+          </a:fontRef>
+        </p:style>
+        <p:txBody>
+          <a:bodyPr rtlCol="0" anchor="ctr"/>
+          <a:lstStyle/>
+          <a:p>
+            <a:pPr algn="ctr"/>
+            <a:endParaRPr lang="en-GB" dirty="0">
+              <a:solidFill>
+                <a:schemeClr val="tx1"/>
+              </a:solidFill>
+            </a:endParaRPr>
+          </a:p>
+        </p:txBody>
+      </p:sp>
+      <p:sp>
+        <p:nvSpPr>
+          <p:cNvPr id="21" name="Rectangle 20"/>
+          <p:cNvSpPr/>
+          <p:nvPr/>
+        </p:nvSpPr>
+        <p:spPr>
+          <a:xfrm>
+            <a:off x="4495800" y="2743200"/>
+            <a:ext cx="989759" cy="369332"/>
+          </a:xfrm>
+          <a:prstGeom prst="rect">
+            <a:avLst/>
+          </a:prstGeom>
+        </p:spPr>
+        <p:txBody>
+          <a:bodyPr wrap="none">
+            <a:spAutoFit/>
+          </a:bodyPr>
+          <a:lstStyle/>
+          <a:p>
+            <a:pPr algn="ctr"/>
+            <a:r>
+              <a:rPr lang="en-GB" dirty="0" smtClean="0"/>
+              <a:t>TaskRow</a:t>
+            </a:r>
+            <a:endParaRPr lang="en-GB" dirty="0"/>
+          </a:p>
+        </p:txBody>
+      </p:sp>
+      <p:sp>
+        <p:nvSpPr>
+          <p:cNvPr id="22" name="Rounded Rectangle 21"/>
+          <p:cNvSpPr/>
+          <p:nvPr/>
+        </p:nvSpPr>
+        <p:spPr>
+          <a:xfrm>
+            <a:off x="4953000" y="3505200"/>
+            <a:ext cx="1447800" cy="1295400"/>
+          </a:xfrm>
+          <a:prstGeom prst="roundRect">
+            <a:avLst/>
+          </a:prstGeom>
+          <a:solidFill>
+            <a:schemeClr val="bg1"/>
+          </a:solidFill>
+          <a:ln>
+            <a:solidFill>
+              <a:schemeClr val="tx1"/>
+            </a:solidFill>
+          </a:ln>
+        </p:spPr>
+        <p:style>
+          <a:lnRef idx="2">
+            <a:schemeClr val="accent1">
+              <a:shade val="50000"/>
+            </a:schemeClr>
+          </a:lnRef>
+          <a:fillRef idx="1">
+            <a:schemeClr val="accent1"/>
+          </a:fillRef>
+          <a:effectRef idx="0">
+            <a:schemeClr val="accent1"/>
+          </a:effectRef>
+          <a:fontRef idx="minor">
+            <a:schemeClr val="lt1"/>
+          </a:fontRef>
+        </p:style>
+        <p:txBody>
+          <a:bodyPr rtlCol="0" anchor="ctr"/>
+          <a:lstStyle/>
+          <a:p>
+            <a:pPr algn="ctr"/>
+            <a:endParaRPr lang="en-GB" dirty="0">
+              <a:solidFill>
+                <a:schemeClr val="tx1"/>
+              </a:solidFill>
+            </a:endParaRPr>
+          </a:p>
+        </p:txBody>
+      </p:sp>
+      <p:sp>
+        <p:nvSpPr>
+          <p:cNvPr id="23" name="Rectangle 22"/>
+          <p:cNvSpPr/>
+          <p:nvPr/>
+        </p:nvSpPr>
+        <p:spPr>
+          <a:xfrm>
+            <a:off x="4898406" y="3135868"/>
+            <a:ext cx="1006238" cy="369332"/>
+          </a:xfrm>
+          <a:prstGeom prst="rect">
+            <a:avLst/>
+          </a:prstGeom>
+        </p:spPr>
+        <p:txBody>
+          <a:bodyPr wrap="none">
+            <a:spAutoFit/>
+          </a:bodyPr>
+          <a:lstStyle/>
+          <a:p>
+            <a:pPr algn="ctr"/>
+            <a:r>
+              <a:rPr lang="en-GB" dirty="0" smtClean="0"/>
+              <a:t>personid</a:t>
+            </a:r>
+            <a:endParaRPr lang="en-GB" dirty="0"/>
+          </a:p>
+        </p:txBody>
+      </p:sp>
+      <p:sp>
+        <p:nvSpPr>
+          <p:cNvPr id="24" name="Oval 23"/>
+          <p:cNvSpPr/>
+          <p:nvPr/>
+        </p:nvSpPr>
+        <p:spPr>
+          <a:xfrm>
+            <a:off x="5257800" y="3733800"/>
+            <a:ext cx="914400" cy="838200"/>
+          </a:xfrm>
+          <a:prstGeom prst="ellipse">
+            <a:avLst/>
+          </a:prstGeom>
+          <a:solidFill>
+            <a:schemeClr val="bg1"/>
+          </a:solidFill>
+          <a:ln>
+            <a:solidFill>
+              <a:schemeClr val="tx1"/>
+            </a:solidFill>
+          </a:ln>
+        </p:spPr>
+        <p:style>
+          <a:lnRef idx="2">
+            <a:schemeClr val="accent1">
+              <a:shade val="50000"/>
+            </a:schemeClr>
+          </a:lnRef>
+          <a:fillRef idx="1">
+            <a:schemeClr val="accent1"/>
+          </a:fillRef>
+          <a:effectRef idx="0">
+            <a:schemeClr val="accent1"/>
+          </a:effectRef>
+          <a:fontRef idx="minor">
+            <a:schemeClr val="lt1"/>
+          </a:fontRef>
+        </p:style>
+        <p:txBody>
+          <a:bodyPr lIns="0" rIns="0" rtlCol="0" anchor="ctr"/>
+          <a:lstStyle/>
+          <a:p>
+            <a:pPr algn="ctr"/>
+            <a:r>
+              <a:rPr lang="en-GB" dirty="0" smtClean="0">
+                <a:solidFill>
+                  <a:schemeClr val="tx1"/>
+                </a:solidFill>
+              </a:rPr>
+              <a:t>N_143</a:t>
+            </a:r>
+            <a:endParaRPr lang="en-GB" dirty="0">
+              <a:solidFill>
+                <a:schemeClr val="tx1"/>
+              </a:solidFill>
+            </a:endParaRPr>
+          </a:p>
+        </p:txBody>
+      </p:sp>
+      <p:sp>
+        <p:nvSpPr>
+          <p:cNvPr id="25" name="Rectangle 24"/>
+          <p:cNvSpPr/>
+          <p:nvPr/>
+        </p:nvSpPr>
+        <p:spPr>
+          <a:xfrm>
+            <a:off x="6629400" y="3810000"/>
+            <a:ext cx="343363" cy="369332"/>
+          </a:xfrm>
+          <a:prstGeom prst="rect">
+            <a:avLst/>
+          </a:prstGeom>
+        </p:spPr>
+        <p:txBody>
+          <a:bodyPr wrap="none">
+            <a:spAutoFit/>
+          </a:bodyPr>
+          <a:lstStyle/>
+          <a:p>
+            <a:pPr algn="ctr"/>
+            <a:r>
+              <a:rPr lang="en-GB" dirty="0" smtClean="0"/>
+              <a:t>…</a:t>
+            </a:r>
+            <a:endParaRPr lang="en-GB" dirty="0"/>
+          </a:p>
+        </p:txBody>
+      </p:sp>
+      <p:sp>
+        <p:nvSpPr>
+          <p:cNvPr id="28" name="Rectangle 27"/>
+          <p:cNvSpPr/>
+          <p:nvPr/>
+        </p:nvSpPr>
+        <p:spPr>
+          <a:xfrm>
+            <a:off x="5715000" y="5105400"/>
+            <a:ext cx="343363" cy="369332"/>
+          </a:xfrm>
+          <a:prstGeom prst="rect">
+            <a:avLst/>
+          </a:prstGeom>
+        </p:spPr>
+        <p:txBody>
+          <a:bodyPr wrap="none">
+            <a:spAutoFit/>
+          </a:bodyPr>
+          <a:lstStyle/>
+          <a:p>
+            <a:pPr algn="ctr"/>
+            <a:r>
+              <a:rPr lang="en-GB" dirty="0" smtClean="0"/>
+              <a:t>…</a:t>
+            </a:r>
+            <a:endParaRPr lang="en-GB" dirty="0"/>
+          </a:p>
+        </p:txBody>
+      </p:sp>
+    </p:spTree>
+  </p:cSld>
+  <p:clrMapOvr>
+    <a:masterClrMapping/>
+  </p:clrMapOvr>
+</p:sld>
+</file>
+
+<file path=ppt/slides/slide23.xml><?xml version="1.0" encoding="utf-8"?>
+<p:sld xmlns:a="http://schemas.openxmlformats.org/drawingml/2006/main" xmlns:r="http://schemas.openxmlformats.org/officeDocument/2006/relationships" xmlns:p="http://schemas.openxmlformats.org/presentationml/2006/main">
+  <p:cSld>
+    <p:spTree>
+      <p:nvGrpSpPr>
+        <p:cNvPr id="1" name=""/>
+        <p:cNvGrpSpPr/>
+        <p:nvPr/>
+      </p:nvGrpSpPr>
+      <p:grpSpPr>
+        <a:xfrm>
+          <a:off x="0" y="0"/>
+          <a:ext cx="0" cy="0"/>
+          <a:chOff x="0" y="0"/>
+          <a:chExt cx="0" cy="0"/>
+        </a:xfrm>
+      </p:grpSpPr>
+      <p:sp>
+        <p:nvSpPr>
+          <p:cNvPr id="4" name="Title 3"/>
+          <p:cNvSpPr>
+            <a:spLocks noGrp="1"/>
+          </p:cNvSpPr>
+          <p:nvPr>
+            <p:ph type="title"/>
+          </p:nvPr>
+        </p:nvSpPr>
+        <p:spPr/>
+        <p:txBody>
+          <a:bodyPr>
+            <a:normAutofit fontScale="90000"/>
+          </a:bodyPr>
+          <a:lstStyle/>
+          <a:p>
+            <a:r>
+              <a:rPr lang="en-GB" dirty="0" smtClean="0"/>
+              <a:t>Relational database – no link expression</a:t>
+            </a:r>
+            <a:endParaRPr lang="en-GB" dirty="0"/>
+          </a:p>
+        </p:txBody>
+      </p:sp>
+      <p:sp>
+        <p:nvSpPr>
+          <p:cNvPr id="7" name="Rounded Rectangle 6"/>
+          <p:cNvSpPr/>
+          <p:nvPr/>
+        </p:nvSpPr>
+        <p:spPr>
+          <a:xfrm>
+            <a:off x="1295400" y="3124200"/>
+            <a:ext cx="2743200" cy="1828800"/>
+          </a:xfrm>
+          <a:prstGeom prst="roundRect">
+            <a:avLst/>
+          </a:prstGeom>
+          <a:solidFill>
+            <a:schemeClr val="bg1"/>
+          </a:solidFill>
+          <a:ln>
+            <a:solidFill>
+              <a:schemeClr val="tx1"/>
+            </a:solidFill>
+          </a:ln>
+        </p:spPr>
+        <p:style>
+          <a:lnRef idx="2">
+            <a:schemeClr val="accent1">
+              <a:shade val="50000"/>
+            </a:schemeClr>
+          </a:lnRef>
+          <a:fillRef idx="1">
+            <a:schemeClr val="accent1"/>
+          </a:fillRef>
+          <a:effectRef idx="0">
+            <a:schemeClr val="accent1"/>
+          </a:effectRef>
+          <a:fontRef idx="minor">
+            <a:schemeClr val="lt1"/>
+          </a:fontRef>
+        </p:style>
+        <p:txBody>
+          <a:bodyPr rtlCol="0" anchor="ctr"/>
+          <a:lstStyle/>
+          <a:p>
+            <a:pPr algn="ctr"/>
+            <a:endParaRPr lang="en-GB" dirty="0">
+              <a:solidFill>
+                <a:schemeClr val="tx1"/>
+              </a:solidFill>
+            </a:endParaRPr>
+          </a:p>
+        </p:txBody>
+      </p:sp>
+      <p:sp>
+        <p:nvSpPr>
+          <p:cNvPr id="13" name="Rectangle 12"/>
+          <p:cNvSpPr/>
+          <p:nvPr/>
+        </p:nvSpPr>
+        <p:spPr>
+          <a:xfrm>
+            <a:off x="1295400" y="2743200"/>
+            <a:ext cx="1230017" cy="369332"/>
+          </a:xfrm>
+          <a:prstGeom prst="rect">
+            <a:avLst/>
+          </a:prstGeom>
+        </p:spPr>
+        <p:txBody>
+          <a:bodyPr wrap="none">
+            <a:spAutoFit/>
+          </a:bodyPr>
+          <a:lstStyle/>
+          <a:p>
+            <a:pPr algn="ctr"/>
+            <a:r>
+              <a:rPr lang="en-GB" dirty="0" smtClean="0"/>
+              <a:t>PersonRow</a:t>
+            </a:r>
+            <a:endParaRPr lang="en-GB" dirty="0"/>
+          </a:p>
+        </p:txBody>
+      </p:sp>
+      <p:sp>
+        <p:nvSpPr>
+          <p:cNvPr id="15" name="Rounded Rectangle 14"/>
+          <p:cNvSpPr/>
+          <p:nvPr/>
+        </p:nvSpPr>
+        <p:spPr>
+          <a:xfrm>
+            <a:off x="1752600" y="3505200"/>
+            <a:ext cx="1447800" cy="1295400"/>
+          </a:xfrm>
+          <a:prstGeom prst="roundRect">
+            <a:avLst/>
+          </a:prstGeom>
+          <a:solidFill>
+            <a:schemeClr val="bg1"/>
+          </a:solidFill>
+          <a:ln>
+            <a:solidFill>
+              <a:schemeClr val="tx1"/>
+            </a:solidFill>
+          </a:ln>
+        </p:spPr>
+        <p:style>
+          <a:lnRef idx="2">
+            <a:schemeClr val="accent1">
+              <a:shade val="50000"/>
+            </a:schemeClr>
+          </a:lnRef>
+          <a:fillRef idx="1">
+            <a:schemeClr val="accent1"/>
+          </a:fillRef>
+          <a:effectRef idx="0">
+            <a:schemeClr val="accent1"/>
+          </a:effectRef>
+          <a:fontRef idx="minor">
+            <a:schemeClr val="lt1"/>
+          </a:fontRef>
+        </p:style>
+        <p:txBody>
+          <a:bodyPr rtlCol="0" anchor="ctr"/>
+          <a:lstStyle/>
+          <a:p>
+            <a:pPr algn="ctr"/>
+            <a:endParaRPr lang="en-GB" dirty="0">
+              <a:solidFill>
+                <a:schemeClr val="tx1"/>
+              </a:solidFill>
+            </a:endParaRPr>
+          </a:p>
+        </p:txBody>
+      </p:sp>
+      <p:sp>
+        <p:nvSpPr>
+          <p:cNvPr id="16" name="Rectangle 15"/>
+          <p:cNvSpPr/>
+          <p:nvPr/>
+        </p:nvSpPr>
+        <p:spPr>
+          <a:xfrm>
+            <a:off x="1698006" y="3135868"/>
+            <a:ext cx="359394" cy="369332"/>
+          </a:xfrm>
+          <a:prstGeom prst="rect">
+            <a:avLst/>
+          </a:prstGeom>
+        </p:spPr>
+        <p:txBody>
+          <a:bodyPr wrap="none">
+            <a:spAutoFit/>
+          </a:bodyPr>
+          <a:lstStyle/>
+          <a:p>
+            <a:pPr algn="ctr"/>
+            <a:r>
+              <a:rPr lang="en-GB" dirty="0" smtClean="0"/>
+              <a:t>id</a:t>
+            </a:r>
+            <a:endParaRPr lang="en-GB" dirty="0"/>
+          </a:p>
+        </p:txBody>
+      </p:sp>
+      <p:sp>
+        <p:nvSpPr>
+          <p:cNvPr id="18" name="Oval 17"/>
+          <p:cNvSpPr/>
+          <p:nvPr/>
+        </p:nvSpPr>
+        <p:spPr>
+          <a:xfrm>
+            <a:off x="2057400" y="3733800"/>
+            <a:ext cx="914400" cy="838200"/>
+          </a:xfrm>
+          <a:prstGeom prst="ellipse">
+            <a:avLst/>
+          </a:prstGeom>
+          <a:solidFill>
+            <a:schemeClr val="bg1"/>
+          </a:solidFill>
+          <a:ln>
+            <a:solidFill>
+              <a:schemeClr val="tx1"/>
+            </a:solidFill>
+          </a:ln>
+        </p:spPr>
+        <p:style>
+          <a:lnRef idx="2">
+            <a:schemeClr val="accent1">
+              <a:shade val="50000"/>
+            </a:schemeClr>
+          </a:lnRef>
+          <a:fillRef idx="1">
+            <a:schemeClr val="accent1"/>
+          </a:fillRef>
+          <a:effectRef idx="0">
+            <a:schemeClr val="accent1"/>
+          </a:effectRef>
+          <a:fontRef idx="minor">
+            <a:schemeClr val="lt1"/>
+          </a:fontRef>
+        </p:style>
+        <p:txBody>
+          <a:bodyPr lIns="0" rIns="0" rtlCol="0" anchor="ctr"/>
+          <a:lstStyle/>
+          <a:p>
+            <a:pPr algn="ctr"/>
+            <a:r>
+              <a:rPr lang="en-GB" dirty="0" smtClean="0">
+                <a:solidFill>
+                  <a:schemeClr val="tx1"/>
+                </a:solidFill>
+              </a:rPr>
+              <a:t>N(id)</a:t>
+            </a:r>
+            <a:endParaRPr lang="en-GB" dirty="0">
+              <a:solidFill>
+                <a:schemeClr val="tx1"/>
+              </a:solidFill>
+            </a:endParaRPr>
+          </a:p>
+        </p:txBody>
+      </p:sp>
+      <p:sp>
+        <p:nvSpPr>
+          <p:cNvPr id="9" name="Rectangle 8"/>
+          <p:cNvSpPr/>
+          <p:nvPr/>
+        </p:nvSpPr>
+        <p:spPr>
+          <a:xfrm>
+            <a:off x="3429000" y="3810000"/>
+            <a:ext cx="343363" cy="369332"/>
+          </a:xfrm>
+          <a:prstGeom prst="rect">
+            <a:avLst/>
+          </a:prstGeom>
+        </p:spPr>
+        <p:txBody>
+          <a:bodyPr wrap="none">
+            <a:spAutoFit/>
+          </a:bodyPr>
+          <a:lstStyle/>
+          <a:p>
+            <a:pPr algn="ctr"/>
+            <a:r>
+              <a:rPr lang="en-GB" dirty="0" smtClean="0"/>
+              <a:t>…</a:t>
+            </a:r>
+            <a:endParaRPr lang="en-GB" dirty="0"/>
+          </a:p>
+        </p:txBody>
+      </p:sp>
+      <p:sp>
+        <p:nvSpPr>
+          <p:cNvPr id="14" name="Rounded Rectangle 13"/>
+          <p:cNvSpPr/>
+          <p:nvPr/>
+        </p:nvSpPr>
+        <p:spPr>
+          <a:xfrm>
+            <a:off x="990600" y="2667000"/>
+            <a:ext cx="6553200" cy="2819400"/>
+          </a:xfrm>
+          <a:prstGeom prst="roundRect">
+            <a:avLst/>
+          </a:prstGeom>
+          <a:noFill/>
+          <a:ln w="9525">
+            <a:solidFill>
+              <a:schemeClr val="tx1"/>
+            </a:solidFill>
+            <a:prstDash val="solid"/>
+          </a:ln>
+        </p:spPr>
+        <p:style>
+          <a:lnRef idx="2">
+            <a:schemeClr val="accent1">
+              <a:shade val="50000"/>
+            </a:schemeClr>
+          </a:lnRef>
+          <a:fillRef idx="1">
+            <a:schemeClr val="accent1"/>
+          </a:fillRef>
+          <a:effectRef idx="0">
+            <a:schemeClr val="accent1"/>
+          </a:effectRef>
+          <a:fontRef idx="minor">
+            <a:schemeClr val="lt1"/>
+          </a:fontRef>
+        </p:style>
+        <p:txBody>
+          <a:bodyPr rtlCol="0" anchor="ctr"/>
+          <a:lstStyle/>
+          <a:p>
+            <a:pPr algn="ctr"/>
+            <a:endParaRPr lang="en-GB" dirty="0">
+              <a:solidFill>
+                <a:schemeClr val="tx1"/>
+              </a:solidFill>
+            </a:endParaRPr>
+          </a:p>
+        </p:txBody>
+      </p:sp>
+      <p:sp>
+        <p:nvSpPr>
+          <p:cNvPr id="17" name="Rectangle 16"/>
+          <p:cNvSpPr/>
+          <p:nvPr/>
+        </p:nvSpPr>
+        <p:spPr>
+          <a:xfrm>
+            <a:off x="1295400" y="2286000"/>
+            <a:ext cx="2031775" cy="369332"/>
+          </a:xfrm>
+          <a:prstGeom prst="rect">
+            <a:avLst/>
+          </a:prstGeom>
+        </p:spPr>
+        <p:txBody>
+          <a:bodyPr wrap="none">
+            <a:spAutoFit/>
+          </a:bodyPr>
+          <a:lstStyle/>
+          <a:p>
+            <a:pPr algn="ctr"/>
+            <a:r>
+              <a:rPr lang="en-GB" dirty="0" smtClean="0"/>
+              <a:t>Database (optional)</a:t>
+            </a:r>
+            <a:endParaRPr lang="en-GB" dirty="0"/>
+          </a:p>
+        </p:txBody>
+      </p:sp>
+      <p:sp>
+        <p:nvSpPr>
+          <p:cNvPr id="19" name="Rectangle 18"/>
+          <p:cNvSpPr/>
+          <p:nvPr/>
+        </p:nvSpPr>
+        <p:spPr>
+          <a:xfrm>
+            <a:off x="2514600" y="5105400"/>
+            <a:ext cx="343363" cy="369332"/>
+          </a:xfrm>
+          <a:prstGeom prst="rect">
+            <a:avLst/>
+          </a:prstGeom>
+        </p:spPr>
+        <p:txBody>
+          <a:bodyPr wrap="none">
+            <a:spAutoFit/>
+          </a:bodyPr>
+          <a:lstStyle/>
+          <a:p>
+            <a:pPr algn="ctr"/>
+            <a:r>
+              <a:rPr lang="en-GB" dirty="0" smtClean="0"/>
+              <a:t>…</a:t>
+            </a:r>
+            <a:endParaRPr lang="en-GB" dirty="0"/>
+          </a:p>
+        </p:txBody>
+      </p:sp>
+      <p:sp>
+        <p:nvSpPr>
+          <p:cNvPr id="20" name="Rounded Rectangle 19"/>
+          <p:cNvSpPr/>
+          <p:nvPr/>
+        </p:nvSpPr>
+        <p:spPr>
+          <a:xfrm>
+            <a:off x="4495800" y="3124200"/>
+            <a:ext cx="2743200" cy="1828800"/>
+          </a:xfrm>
+          <a:prstGeom prst="roundRect">
+            <a:avLst/>
+          </a:prstGeom>
+          <a:solidFill>
+            <a:schemeClr val="bg1"/>
+          </a:solidFill>
+          <a:ln>
+            <a:solidFill>
+              <a:schemeClr val="tx1"/>
+            </a:solidFill>
+          </a:ln>
+        </p:spPr>
+        <p:style>
+          <a:lnRef idx="2">
+            <a:schemeClr val="accent1">
+              <a:shade val="50000"/>
+            </a:schemeClr>
+          </a:lnRef>
+          <a:fillRef idx="1">
+            <a:schemeClr val="accent1"/>
+          </a:fillRef>
+          <a:effectRef idx="0">
+            <a:schemeClr val="accent1"/>
+          </a:effectRef>
+          <a:fontRef idx="minor">
+            <a:schemeClr val="lt1"/>
+          </a:fontRef>
+        </p:style>
+        <p:txBody>
+          <a:bodyPr rtlCol="0" anchor="ctr"/>
+          <a:lstStyle/>
+          <a:p>
+            <a:pPr algn="ctr"/>
+            <a:endParaRPr lang="en-GB" dirty="0">
+              <a:solidFill>
+                <a:schemeClr val="tx1"/>
+              </a:solidFill>
+            </a:endParaRPr>
+          </a:p>
+        </p:txBody>
+      </p:sp>
+      <p:sp>
+        <p:nvSpPr>
+          <p:cNvPr id="21" name="Rectangle 20"/>
+          <p:cNvSpPr/>
+          <p:nvPr/>
+        </p:nvSpPr>
+        <p:spPr>
+          <a:xfrm>
+            <a:off x="4495800" y="2743200"/>
+            <a:ext cx="989759" cy="369332"/>
+          </a:xfrm>
+          <a:prstGeom prst="rect">
+            <a:avLst/>
+          </a:prstGeom>
+        </p:spPr>
+        <p:txBody>
+          <a:bodyPr wrap="none">
+            <a:spAutoFit/>
+          </a:bodyPr>
+          <a:lstStyle/>
+          <a:p>
+            <a:pPr algn="ctr"/>
+            <a:r>
+              <a:rPr lang="en-GB" dirty="0" smtClean="0"/>
+              <a:t>TaskRow</a:t>
+            </a:r>
+            <a:endParaRPr lang="en-GB" dirty="0"/>
+          </a:p>
+        </p:txBody>
+      </p:sp>
+      <p:sp>
+        <p:nvSpPr>
+          <p:cNvPr id="22" name="Rounded Rectangle 21"/>
+          <p:cNvSpPr/>
+          <p:nvPr/>
+        </p:nvSpPr>
+        <p:spPr>
+          <a:xfrm>
+            <a:off x="4953000" y="3505200"/>
+            <a:ext cx="1447800" cy="1295400"/>
+          </a:xfrm>
+          <a:prstGeom prst="roundRect">
+            <a:avLst/>
+          </a:prstGeom>
+          <a:solidFill>
+            <a:schemeClr val="bg1"/>
+          </a:solidFill>
+          <a:ln>
+            <a:solidFill>
+              <a:schemeClr val="tx1"/>
+            </a:solidFill>
+          </a:ln>
+        </p:spPr>
+        <p:style>
+          <a:lnRef idx="2">
+            <a:schemeClr val="accent1">
+              <a:shade val="50000"/>
+            </a:schemeClr>
+          </a:lnRef>
+          <a:fillRef idx="1">
+            <a:schemeClr val="accent1"/>
+          </a:fillRef>
+          <a:effectRef idx="0">
+            <a:schemeClr val="accent1"/>
+          </a:effectRef>
+          <a:fontRef idx="minor">
+            <a:schemeClr val="lt1"/>
+          </a:fontRef>
+        </p:style>
+        <p:txBody>
+          <a:bodyPr rtlCol="0" anchor="ctr"/>
+          <a:lstStyle/>
+          <a:p>
+            <a:pPr algn="ctr"/>
+            <a:endParaRPr lang="en-GB" dirty="0">
+              <a:solidFill>
+                <a:schemeClr val="tx1"/>
+              </a:solidFill>
+            </a:endParaRPr>
+          </a:p>
+        </p:txBody>
+      </p:sp>
+      <p:sp>
+        <p:nvSpPr>
+          <p:cNvPr id="23" name="Rectangle 22"/>
+          <p:cNvSpPr/>
+          <p:nvPr/>
+        </p:nvSpPr>
+        <p:spPr>
+          <a:xfrm>
+            <a:off x="4898406" y="3135868"/>
+            <a:ext cx="1006238" cy="369332"/>
+          </a:xfrm>
+          <a:prstGeom prst="rect">
+            <a:avLst/>
+          </a:prstGeom>
+        </p:spPr>
+        <p:txBody>
+          <a:bodyPr wrap="none">
+            <a:spAutoFit/>
+          </a:bodyPr>
+          <a:lstStyle/>
+          <a:p>
+            <a:pPr algn="ctr"/>
+            <a:r>
+              <a:rPr lang="en-GB" dirty="0" smtClean="0"/>
+              <a:t>personid</a:t>
+            </a:r>
+            <a:endParaRPr lang="en-GB" dirty="0"/>
+          </a:p>
+        </p:txBody>
+      </p:sp>
+      <p:sp>
+        <p:nvSpPr>
+          <p:cNvPr id="24" name="Oval 23"/>
+          <p:cNvSpPr/>
+          <p:nvPr/>
+        </p:nvSpPr>
+        <p:spPr>
+          <a:xfrm>
+            <a:off x="5257800" y="3733800"/>
+            <a:ext cx="914400" cy="838200"/>
+          </a:xfrm>
+          <a:prstGeom prst="ellipse">
+            <a:avLst/>
+          </a:prstGeom>
+          <a:solidFill>
+            <a:schemeClr val="bg1"/>
+          </a:solidFill>
+          <a:ln>
+            <a:solidFill>
+              <a:schemeClr val="tx1"/>
+            </a:solidFill>
+          </a:ln>
+        </p:spPr>
+        <p:style>
+          <a:lnRef idx="2">
+            <a:schemeClr val="accent1">
+              <a:shade val="50000"/>
+            </a:schemeClr>
+          </a:lnRef>
+          <a:fillRef idx="1">
+            <a:schemeClr val="accent1"/>
+          </a:fillRef>
+          <a:effectRef idx="0">
+            <a:schemeClr val="accent1"/>
+          </a:effectRef>
+          <a:fontRef idx="minor">
+            <a:schemeClr val="lt1"/>
+          </a:fontRef>
+        </p:style>
+        <p:txBody>
+          <a:bodyPr lIns="0" rIns="0" rtlCol="0" anchor="ctr"/>
+          <a:lstStyle/>
+          <a:p>
+            <a:pPr algn="ctr"/>
+            <a:r>
+              <a:rPr lang="en-GB" dirty="0" smtClean="0">
+                <a:solidFill>
+                  <a:schemeClr val="tx1"/>
+                </a:solidFill>
+              </a:rPr>
+              <a:t>N(id)</a:t>
+            </a:r>
+            <a:endParaRPr lang="en-GB" dirty="0">
+              <a:solidFill>
+                <a:schemeClr val="tx1"/>
+              </a:solidFill>
+            </a:endParaRPr>
+          </a:p>
+        </p:txBody>
+      </p:sp>
+      <p:sp>
+        <p:nvSpPr>
+          <p:cNvPr id="25" name="Rectangle 24"/>
+          <p:cNvSpPr/>
+          <p:nvPr/>
+        </p:nvSpPr>
+        <p:spPr>
+          <a:xfrm>
+            <a:off x="6629400" y="3810000"/>
+            <a:ext cx="343363" cy="369332"/>
+          </a:xfrm>
+          <a:prstGeom prst="rect">
+            <a:avLst/>
+          </a:prstGeom>
+        </p:spPr>
+        <p:txBody>
+          <a:bodyPr wrap="none">
+            <a:spAutoFit/>
+          </a:bodyPr>
+          <a:lstStyle/>
+          <a:p>
+            <a:pPr algn="ctr"/>
+            <a:r>
+              <a:rPr lang="en-GB" dirty="0" smtClean="0"/>
+              <a:t>…</a:t>
+            </a:r>
+            <a:endParaRPr lang="en-GB" dirty="0"/>
+          </a:p>
+        </p:txBody>
+      </p:sp>
+      <p:sp>
+        <p:nvSpPr>
+          <p:cNvPr id="28" name="Rectangle 27"/>
+          <p:cNvSpPr/>
+          <p:nvPr/>
+        </p:nvSpPr>
+        <p:spPr>
+          <a:xfrm>
+            <a:off x="5715000" y="5105400"/>
+            <a:ext cx="343363" cy="369332"/>
+          </a:xfrm>
+          <a:prstGeom prst="rect">
+            <a:avLst/>
+          </a:prstGeom>
+        </p:spPr>
+        <p:txBody>
+          <a:bodyPr wrap="none">
+            <a:spAutoFit/>
+          </a:bodyPr>
+          <a:lstStyle/>
+          <a:p>
+            <a:pPr algn="ctr"/>
+            <a:r>
+              <a:rPr lang="en-GB" dirty="0" smtClean="0"/>
+              <a:t>…</a:t>
+            </a:r>
+            <a:endParaRPr lang="en-GB" dirty="0"/>
+          </a:p>
+        </p:txBody>
+      </p:sp>
+    </p:spTree>
+  </p:cSld>
+  <p:clrMapOvr>
+    <a:masterClrMapping/>
+  </p:clrMapOvr>
+</p:sld>
+</file>
+
+<file path=ppt/slides/slide24.xml><?xml version="1.0" encoding="utf-8"?>
+<p:sld xmlns:a="http://schemas.openxmlformats.org/drawingml/2006/main" xmlns:r="http://schemas.openxmlformats.org/officeDocument/2006/relationships" xmlns:p="http://schemas.openxmlformats.org/presentationml/2006/main">
+  <p:cSld>
+    <p:spTree>
+      <p:nvGrpSpPr>
+        <p:cNvPr id="1" name=""/>
+        <p:cNvGrpSpPr/>
+        <p:nvPr/>
+      </p:nvGrpSpPr>
+      <p:grpSpPr>
+        <a:xfrm>
+          <a:off x="0" y="0"/>
+          <a:ext cx="0" cy="0"/>
+          <a:chOff x="0" y="0"/>
+          <a:chExt cx="0" cy="0"/>
+        </a:xfrm>
+      </p:grpSpPr>
+      <p:sp>
+        <p:nvSpPr>
+          <p:cNvPr id="4" name="Title 3"/>
+          <p:cNvSpPr>
+            <a:spLocks noGrp="1"/>
+          </p:cNvSpPr>
+          <p:nvPr>
+            <p:ph type="title"/>
+          </p:nvPr>
+        </p:nvSpPr>
+        <p:spPr/>
+        <p:txBody>
+          <a:bodyPr/>
+          <a:lstStyle/>
+          <a:p>
+            <a:r>
+              <a:rPr lang="en-GB" dirty="0" smtClean="0"/>
+              <a:t>Tuplespace</a:t>
+            </a:r>
+            <a:endParaRPr lang="en-GB" dirty="0"/>
+          </a:p>
+        </p:txBody>
+      </p:sp>
+      <p:sp>
+        <p:nvSpPr>
+          <p:cNvPr id="7" name="Rounded Rectangle 6"/>
+          <p:cNvSpPr/>
+          <p:nvPr/>
+        </p:nvSpPr>
+        <p:spPr>
+          <a:xfrm>
+            <a:off x="2514600" y="2743200"/>
+            <a:ext cx="4343400" cy="1828800"/>
+          </a:xfrm>
+          <a:prstGeom prst="roundRect">
+            <a:avLst/>
+          </a:prstGeom>
+          <a:solidFill>
+            <a:schemeClr val="bg1"/>
+          </a:solidFill>
+          <a:ln>
+            <a:solidFill>
+              <a:schemeClr val="tx1"/>
+            </a:solidFill>
+          </a:ln>
+        </p:spPr>
+        <p:style>
+          <a:lnRef idx="2">
+            <a:schemeClr val="accent1">
+              <a:shade val="50000"/>
+            </a:schemeClr>
+          </a:lnRef>
+          <a:fillRef idx="1">
+            <a:schemeClr val="accent1"/>
+          </a:fillRef>
+          <a:effectRef idx="0">
+            <a:schemeClr val="accent1"/>
+          </a:effectRef>
+          <a:fontRef idx="minor">
+            <a:schemeClr val="lt1"/>
+          </a:fontRef>
+        </p:style>
+        <p:txBody>
+          <a:bodyPr rtlCol="0" anchor="ctr"/>
+          <a:lstStyle/>
+          <a:p>
+            <a:pPr algn="ctr"/>
+            <a:endParaRPr lang="en-GB" dirty="0">
+              <a:solidFill>
+                <a:schemeClr val="tx1"/>
+              </a:solidFill>
+            </a:endParaRPr>
+          </a:p>
+        </p:txBody>
+      </p:sp>
+      <p:sp>
+        <p:nvSpPr>
+          <p:cNvPr id="13" name="Rectangle 12"/>
+          <p:cNvSpPr/>
+          <p:nvPr/>
+        </p:nvSpPr>
+        <p:spPr>
+          <a:xfrm>
+            <a:off x="2667000" y="2362200"/>
+            <a:ext cx="694550" cy="369332"/>
+          </a:xfrm>
+          <a:prstGeom prst="rect">
+            <a:avLst/>
+          </a:prstGeom>
+        </p:spPr>
+        <p:txBody>
+          <a:bodyPr wrap="none">
+            <a:spAutoFit/>
+          </a:bodyPr>
+          <a:lstStyle/>
+          <a:p>
+            <a:pPr algn="ctr"/>
+            <a:r>
+              <a:rPr lang="en-GB" dirty="0" smtClean="0"/>
+              <a:t>Tuple</a:t>
+            </a:r>
+            <a:endParaRPr lang="en-GB" dirty="0"/>
+          </a:p>
+        </p:txBody>
+      </p:sp>
+      <p:sp>
+        <p:nvSpPr>
+          <p:cNvPr id="15" name="Rounded Rectangle 14"/>
+          <p:cNvSpPr/>
+          <p:nvPr/>
+        </p:nvSpPr>
+        <p:spPr>
+          <a:xfrm>
+            <a:off x="2971800" y="3124200"/>
+            <a:ext cx="1447800" cy="1295400"/>
+          </a:xfrm>
+          <a:prstGeom prst="roundRect">
+            <a:avLst/>
+          </a:prstGeom>
+          <a:solidFill>
+            <a:schemeClr val="bg1"/>
+          </a:solidFill>
+          <a:ln>
+            <a:solidFill>
+              <a:schemeClr val="tx1"/>
+            </a:solidFill>
+          </a:ln>
+        </p:spPr>
+        <p:style>
+          <a:lnRef idx="2">
+            <a:schemeClr val="accent1">
+              <a:shade val="50000"/>
+            </a:schemeClr>
+          </a:lnRef>
+          <a:fillRef idx="1">
+            <a:schemeClr val="accent1"/>
+          </a:fillRef>
+          <a:effectRef idx="0">
+            <a:schemeClr val="accent1"/>
+          </a:effectRef>
+          <a:fontRef idx="minor">
+            <a:schemeClr val="lt1"/>
+          </a:fontRef>
+        </p:style>
+        <p:txBody>
+          <a:bodyPr rtlCol="0" anchor="ctr"/>
+          <a:lstStyle/>
+          <a:p>
+            <a:pPr algn="ctr"/>
+            <a:endParaRPr lang="en-GB" dirty="0">
+              <a:solidFill>
+                <a:schemeClr val="tx1"/>
+              </a:solidFill>
+            </a:endParaRPr>
+          </a:p>
+        </p:txBody>
+      </p:sp>
+      <p:sp>
+        <p:nvSpPr>
+          <p:cNvPr id="16" name="Rectangle 15"/>
+          <p:cNvSpPr/>
+          <p:nvPr/>
+        </p:nvSpPr>
+        <p:spPr>
+          <a:xfrm>
+            <a:off x="2917206" y="2754868"/>
+            <a:ext cx="417102" cy="369332"/>
+          </a:xfrm>
+          <a:prstGeom prst="rect">
+            <a:avLst/>
+          </a:prstGeom>
+        </p:spPr>
+        <p:txBody>
+          <a:bodyPr wrap="none">
+            <a:spAutoFit/>
+          </a:bodyPr>
+          <a:lstStyle/>
+          <a:p>
+            <a:pPr algn="ctr"/>
+            <a:r>
+              <a:rPr lang="en-GB" dirty="0" smtClean="0"/>
+              <a:t>_1</a:t>
+            </a:r>
+            <a:endParaRPr lang="en-GB" dirty="0"/>
+          </a:p>
+        </p:txBody>
+      </p:sp>
+      <p:sp>
+        <p:nvSpPr>
+          <p:cNvPr id="18" name="Oval 17"/>
+          <p:cNvSpPr/>
+          <p:nvPr/>
+        </p:nvSpPr>
+        <p:spPr>
+          <a:xfrm>
+            <a:off x="3276600" y="3352800"/>
+            <a:ext cx="914400" cy="838200"/>
+          </a:xfrm>
+          <a:prstGeom prst="ellipse">
+            <a:avLst/>
+          </a:prstGeom>
+          <a:solidFill>
+            <a:schemeClr val="bg1"/>
+          </a:solidFill>
+          <a:ln>
+            <a:solidFill>
+              <a:schemeClr val="tx1"/>
+            </a:solidFill>
+          </a:ln>
+        </p:spPr>
+        <p:style>
+          <a:lnRef idx="2">
+            <a:schemeClr val="accent1">
+              <a:shade val="50000"/>
+            </a:schemeClr>
+          </a:lnRef>
+          <a:fillRef idx="1">
+            <a:schemeClr val="accent1"/>
+          </a:fillRef>
+          <a:effectRef idx="0">
+            <a:schemeClr val="accent1"/>
+          </a:effectRef>
+          <a:fontRef idx="minor">
+            <a:schemeClr val="lt1"/>
+          </a:fontRef>
+        </p:style>
+        <p:txBody>
+          <a:bodyPr lIns="0" rIns="0" rtlCol="0" anchor="ctr"/>
+          <a:lstStyle/>
+          <a:p>
+            <a:pPr algn="ctr"/>
+            <a:r>
+              <a:rPr lang="en-GB" dirty="0" smtClean="0">
+                <a:solidFill>
+                  <a:schemeClr val="tx1"/>
+                </a:solidFill>
+              </a:rPr>
+              <a:t>N_143</a:t>
+            </a:r>
+            <a:endParaRPr lang="en-GB" dirty="0">
+              <a:solidFill>
+                <a:schemeClr val="tx1"/>
+              </a:solidFill>
+            </a:endParaRPr>
+          </a:p>
+        </p:txBody>
+      </p:sp>
+      <p:sp>
+        <p:nvSpPr>
+          <p:cNvPr id="8" name="Rounded Rectangle 7"/>
+          <p:cNvSpPr/>
+          <p:nvPr/>
+        </p:nvSpPr>
+        <p:spPr>
+          <a:xfrm>
+            <a:off x="4783687" y="3112532"/>
+            <a:ext cx="1447800" cy="1295400"/>
+          </a:xfrm>
+          <a:prstGeom prst="roundRect">
+            <a:avLst/>
+          </a:prstGeom>
+          <a:solidFill>
+            <a:schemeClr val="bg1"/>
+          </a:solidFill>
+          <a:ln>
+            <a:solidFill>
+              <a:schemeClr val="tx1"/>
+            </a:solidFill>
+          </a:ln>
+        </p:spPr>
+        <p:style>
+          <a:lnRef idx="2">
+            <a:schemeClr val="accent1">
+              <a:shade val="50000"/>
+            </a:schemeClr>
+          </a:lnRef>
+          <a:fillRef idx="1">
+            <a:schemeClr val="accent1"/>
+          </a:fillRef>
+          <a:effectRef idx="0">
+            <a:schemeClr val="accent1"/>
+          </a:effectRef>
+          <a:fontRef idx="minor">
+            <a:schemeClr val="lt1"/>
+          </a:fontRef>
+        </p:style>
+        <p:txBody>
+          <a:bodyPr rtlCol="0" anchor="ctr"/>
+          <a:lstStyle/>
+          <a:p>
+            <a:pPr algn="ctr"/>
+            <a:endParaRPr lang="en-GB" dirty="0">
+              <a:solidFill>
+                <a:schemeClr val="tx1"/>
+              </a:solidFill>
+            </a:endParaRPr>
+          </a:p>
+        </p:txBody>
+      </p:sp>
+      <p:sp>
+        <p:nvSpPr>
+          <p:cNvPr id="9" name="Rectangle 8"/>
+          <p:cNvSpPr/>
+          <p:nvPr/>
+        </p:nvSpPr>
+        <p:spPr>
+          <a:xfrm>
+            <a:off x="4648200" y="2743200"/>
+            <a:ext cx="417102" cy="369332"/>
+          </a:xfrm>
+          <a:prstGeom prst="rect">
+            <a:avLst/>
+          </a:prstGeom>
+        </p:spPr>
+        <p:txBody>
+          <a:bodyPr wrap="none">
+            <a:spAutoFit/>
+          </a:bodyPr>
+          <a:lstStyle/>
+          <a:p>
+            <a:pPr algn="ctr"/>
+            <a:r>
+              <a:rPr lang="en-GB" dirty="0" smtClean="0"/>
+              <a:t>_2</a:t>
+            </a:r>
+            <a:endParaRPr lang="en-GB" dirty="0"/>
+          </a:p>
+        </p:txBody>
+      </p:sp>
+      <p:sp>
+        <p:nvSpPr>
+          <p:cNvPr id="10" name="Oval 9"/>
+          <p:cNvSpPr/>
+          <p:nvPr/>
+        </p:nvSpPr>
+        <p:spPr>
+          <a:xfrm>
+            <a:off x="5029200" y="3341132"/>
+            <a:ext cx="1007513" cy="838200"/>
+          </a:xfrm>
+          <a:prstGeom prst="ellipse">
+            <a:avLst/>
+          </a:prstGeom>
+          <a:solidFill>
+            <a:schemeClr val="bg1"/>
+          </a:solidFill>
+          <a:ln>
+            <a:solidFill>
+              <a:schemeClr val="tx1"/>
+            </a:solidFill>
+          </a:ln>
+        </p:spPr>
+        <p:style>
+          <a:lnRef idx="2">
+            <a:schemeClr val="accent1">
+              <a:shade val="50000"/>
+            </a:schemeClr>
+          </a:lnRef>
+          <a:fillRef idx="1">
+            <a:schemeClr val="accent1"/>
+          </a:fillRef>
+          <a:effectRef idx="0">
+            <a:schemeClr val="accent1"/>
+          </a:effectRef>
+          <a:fontRef idx="minor">
+            <a:schemeClr val="lt1"/>
+          </a:fontRef>
+        </p:style>
+        <p:txBody>
+          <a:bodyPr lIns="0" rIns="0" rtlCol="0" anchor="ctr"/>
+          <a:lstStyle/>
+          <a:p>
+            <a:pPr algn="ctr"/>
+            <a:r>
+              <a:rPr lang="en-GB" dirty="0" smtClean="0">
+                <a:solidFill>
+                  <a:schemeClr val="tx1"/>
+                </a:solidFill>
+              </a:rPr>
+              <a:t>S_Chris</a:t>
+            </a:r>
+            <a:endParaRPr lang="en-GB" dirty="0">
+              <a:solidFill>
+                <a:schemeClr val="tx1"/>
+              </a:solidFill>
+            </a:endParaRPr>
+          </a:p>
+        </p:txBody>
+      </p:sp>
+      <p:sp>
+        <p:nvSpPr>
+          <p:cNvPr id="14" name="Rounded Rectangle 13"/>
+          <p:cNvSpPr/>
+          <p:nvPr/>
+        </p:nvSpPr>
+        <p:spPr>
+          <a:xfrm>
+            <a:off x="2286000" y="2133600"/>
+            <a:ext cx="4800600" cy="3124200"/>
+          </a:xfrm>
+          <a:prstGeom prst="roundRect">
+            <a:avLst/>
+          </a:prstGeom>
+          <a:noFill/>
+          <a:ln w="9525">
+            <a:solidFill>
+              <a:schemeClr val="tx1"/>
+            </a:solidFill>
+            <a:prstDash val="solid"/>
+          </a:ln>
+        </p:spPr>
+        <p:style>
+          <a:lnRef idx="2">
+            <a:schemeClr val="accent1">
+              <a:shade val="50000"/>
+            </a:schemeClr>
+          </a:lnRef>
+          <a:fillRef idx="1">
+            <a:schemeClr val="accent1"/>
+          </a:fillRef>
+          <a:effectRef idx="0">
+            <a:schemeClr val="accent1"/>
+          </a:effectRef>
+          <a:fontRef idx="minor">
+            <a:schemeClr val="lt1"/>
+          </a:fontRef>
+        </p:style>
+        <p:txBody>
+          <a:bodyPr rtlCol="0" anchor="ctr"/>
+          <a:lstStyle/>
+          <a:p>
+            <a:pPr algn="ctr"/>
+            <a:endParaRPr lang="en-GB" dirty="0">
+              <a:solidFill>
+                <a:schemeClr val="tx1"/>
+              </a:solidFill>
+            </a:endParaRPr>
+          </a:p>
+        </p:txBody>
+      </p:sp>
+      <p:sp>
+        <p:nvSpPr>
+          <p:cNvPr id="17" name="Rectangle 16"/>
+          <p:cNvSpPr/>
+          <p:nvPr/>
+        </p:nvSpPr>
+        <p:spPr>
+          <a:xfrm>
+            <a:off x="2656248" y="1752600"/>
+            <a:ext cx="1229952" cy="369332"/>
+          </a:xfrm>
+          <a:prstGeom prst="rect">
+            <a:avLst/>
+          </a:prstGeom>
+        </p:spPr>
+        <p:txBody>
+          <a:bodyPr wrap="none">
+            <a:spAutoFit/>
+          </a:bodyPr>
+          <a:lstStyle/>
+          <a:p>
+            <a:pPr algn="ctr"/>
+            <a:r>
+              <a:rPr lang="en-GB" dirty="0" smtClean="0"/>
+              <a:t>Tuplespace</a:t>
+            </a:r>
+            <a:endParaRPr lang="en-GB" dirty="0"/>
+          </a:p>
+        </p:txBody>
+      </p:sp>
+      <p:sp>
+        <p:nvSpPr>
+          <p:cNvPr id="19" name="Rectangle 18"/>
+          <p:cNvSpPr/>
+          <p:nvPr/>
+        </p:nvSpPr>
+        <p:spPr>
+          <a:xfrm>
+            <a:off x="4572000" y="4724400"/>
+            <a:ext cx="343363" cy="369332"/>
+          </a:xfrm>
+          <a:prstGeom prst="rect">
+            <a:avLst/>
+          </a:prstGeom>
+        </p:spPr>
+        <p:txBody>
+          <a:bodyPr wrap="none">
+            <a:spAutoFit/>
+          </a:bodyPr>
+          <a:lstStyle/>
+          <a:p>
+            <a:pPr algn="ctr"/>
+            <a:r>
+              <a:rPr lang="en-GB" dirty="0" smtClean="0"/>
+              <a:t>…</a:t>
+            </a:r>
+            <a:endParaRPr lang="en-GB" dirty="0"/>
           </a:p>
         </p:txBody>
       </p:sp>

</xml_diff>

<commit_message>
added signals to cookbook
</commit_message>
<xml_diff>
--- a/bigraphspace/docs/images/Cookbook_diagrams.pptx
+++ b/bigraphspace/docs/images/Cookbook_diagrams.pptx
@@ -34,7 +34,13 @@
     <p:sldId id="284" r:id="rId28"/>
     <p:sldId id="280" r:id="rId29"/>
     <p:sldId id="282" r:id="rId30"/>
-    <p:sldId id="285" r:id="rId31"/>
+    <p:sldId id="286" r:id="rId31"/>
+    <p:sldId id="285" r:id="rId32"/>
+    <p:sldId id="287" r:id="rId33"/>
+    <p:sldId id="288" r:id="rId34"/>
+    <p:sldId id="289" r:id="rId35"/>
+    <p:sldId id="291" r:id="rId36"/>
+    <p:sldId id="290" r:id="rId37"/>
   </p:sldIdLst>
   <p:sldSz cx="9144000" cy="6858000" type="screen4x3"/>
   <p:notesSz cx="6858000" cy="9144000"/>
@@ -318,7 +324,7 @@
             <a:fld id="{1D8BD707-D9CF-40AE-B4C6-C98DA3205C09}" type="datetimeFigureOut">
               <a:rPr lang="en-US" smtClean="0"/>
               <a:pPr/>
-              <a:t>7/27/2009</a:t>
+              <a:t>7/28/2009</a:t>
             </a:fld>
             <a:endParaRPr lang="en-US"/>
           </a:p>
@@ -485,7 +491,7 @@
             <a:fld id="{1D8BD707-D9CF-40AE-B4C6-C98DA3205C09}" type="datetimeFigureOut">
               <a:rPr lang="en-US" smtClean="0"/>
               <a:pPr/>
-              <a:t>7/27/2009</a:t>
+              <a:t>7/28/2009</a:t>
             </a:fld>
             <a:endParaRPr lang="en-US"/>
           </a:p>
@@ -662,7 +668,7 @@
             <a:fld id="{1D8BD707-D9CF-40AE-B4C6-C98DA3205C09}" type="datetimeFigureOut">
               <a:rPr lang="en-US" smtClean="0"/>
               <a:pPr/>
-              <a:t>7/27/2009</a:t>
+              <a:t>7/28/2009</a:t>
             </a:fld>
             <a:endParaRPr lang="en-US"/>
           </a:p>
@@ -829,7 +835,7 @@
             <a:fld id="{1D8BD707-D9CF-40AE-B4C6-C98DA3205C09}" type="datetimeFigureOut">
               <a:rPr lang="en-US" smtClean="0"/>
               <a:pPr/>
-              <a:t>7/27/2009</a:t>
+              <a:t>7/28/2009</a:t>
             </a:fld>
             <a:endParaRPr lang="en-US"/>
           </a:p>
@@ -1072,7 +1078,7 @@
             <a:fld id="{1D8BD707-D9CF-40AE-B4C6-C98DA3205C09}" type="datetimeFigureOut">
               <a:rPr lang="en-US" smtClean="0"/>
               <a:pPr/>
-              <a:t>7/27/2009</a:t>
+              <a:t>7/28/2009</a:t>
             </a:fld>
             <a:endParaRPr lang="en-US"/>
           </a:p>
@@ -1357,7 +1363,7 @@
             <a:fld id="{1D8BD707-D9CF-40AE-B4C6-C98DA3205C09}" type="datetimeFigureOut">
               <a:rPr lang="en-US" smtClean="0"/>
               <a:pPr/>
-              <a:t>7/27/2009</a:t>
+              <a:t>7/28/2009</a:t>
             </a:fld>
             <a:endParaRPr lang="en-US"/>
           </a:p>
@@ -1776,7 +1782,7 @@
             <a:fld id="{1D8BD707-D9CF-40AE-B4C6-C98DA3205C09}" type="datetimeFigureOut">
               <a:rPr lang="en-US" smtClean="0"/>
               <a:pPr/>
-              <a:t>7/27/2009</a:t>
+              <a:t>7/28/2009</a:t>
             </a:fld>
             <a:endParaRPr lang="en-US"/>
           </a:p>
@@ -1891,7 +1897,7 @@
             <a:fld id="{1D8BD707-D9CF-40AE-B4C6-C98DA3205C09}" type="datetimeFigureOut">
               <a:rPr lang="en-US" smtClean="0"/>
               <a:pPr/>
-              <a:t>7/27/2009</a:t>
+              <a:t>7/28/2009</a:t>
             </a:fld>
             <a:endParaRPr lang="en-US"/>
           </a:p>
@@ -1983,7 +1989,7 @@
             <a:fld id="{1D8BD707-D9CF-40AE-B4C6-C98DA3205C09}" type="datetimeFigureOut">
               <a:rPr lang="en-US" smtClean="0"/>
               <a:pPr/>
-              <a:t>7/27/2009</a:t>
+              <a:t>7/28/2009</a:t>
             </a:fld>
             <a:endParaRPr lang="en-US"/>
           </a:p>
@@ -2257,7 +2263,7 @@
             <a:fld id="{1D8BD707-D9CF-40AE-B4C6-C98DA3205C09}" type="datetimeFigureOut">
               <a:rPr lang="en-US" smtClean="0"/>
               <a:pPr/>
-              <a:t>7/27/2009</a:t>
+              <a:t>7/28/2009</a:t>
             </a:fld>
             <a:endParaRPr lang="en-US"/>
           </a:p>
@@ -2507,7 +2513,7 @@
             <a:fld id="{1D8BD707-D9CF-40AE-B4C6-C98DA3205C09}" type="datetimeFigureOut">
               <a:rPr lang="en-US" smtClean="0"/>
               <a:pPr/>
-              <a:t>7/27/2009</a:t>
+              <a:t>7/28/2009</a:t>
             </a:fld>
             <a:endParaRPr lang="en-US"/>
           </a:p>
@@ -2717,7 +2723,7 @@
             <a:fld id="{1D8BD707-D9CF-40AE-B4C6-C98DA3205C09}" type="datetimeFigureOut">
               <a:rPr lang="en-US" smtClean="0"/>
               <a:pPr/>
-              <a:t>7/27/2009</a:t>
+              <a:t>7/28/2009</a:t>
             </a:fld>
             <a:endParaRPr lang="en-US"/>
           </a:p>
@@ -17133,7 +17139,499 @@
           <a:p>
             <a:r>
               <a:rPr lang="en-GB" dirty="0" smtClean="0"/>
-              <a:t>Modelled overlap with a dominant parent</a:t>
+              <a:t>Modelled overlap with </a:t>
+            </a:r>
+            <a:r>
+              <a:rPr lang="en-GB" dirty="0" smtClean="0"/>
+              <a:t>a dominant parent (1)</a:t>
+            </a:r>
+            <a:endParaRPr lang="en-GB" dirty="0"/>
+          </a:p>
+        </p:txBody>
+      </p:sp>
+      <p:sp>
+        <p:nvSpPr>
+          <p:cNvPr id="32" name="Rounded Rectangle 31"/>
+          <p:cNvSpPr/>
+          <p:nvPr/>
+        </p:nvSpPr>
+        <p:spPr>
+          <a:xfrm>
+            <a:off x="3733800" y="3352800"/>
+            <a:ext cx="1447800" cy="1524000"/>
+          </a:xfrm>
+          <a:prstGeom prst="roundRect">
+            <a:avLst/>
+          </a:prstGeom>
+          <a:solidFill>
+            <a:schemeClr val="bg1"/>
+          </a:solidFill>
+          <a:ln>
+            <a:solidFill>
+              <a:schemeClr val="tx1"/>
+            </a:solidFill>
+          </a:ln>
+        </p:spPr>
+        <p:style>
+          <a:lnRef idx="2">
+            <a:schemeClr val="accent1">
+              <a:shade val="50000"/>
+            </a:schemeClr>
+          </a:lnRef>
+          <a:fillRef idx="1">
+            <a:schemeClr val="accent1"/>
+          </a:fillRef>
+          <a:effectRef idx="0">
+            <a:schemeClr val="accent1"/>
+          </a:effectRef>
+          <a:fontRef idx="minor">
+            <a:schemeClr val="lt1"/>
+          </a:fontRef>
+        </p:style>
+        <p:txBody>
+          <a:bodyPr rtlCol="0" anchor="ctr"/>
+          <a:lstStyle/>
+          <a:p>
+            <a:pPr algn="ctr"/>
+            <a:endParaRPr lang="en-GB" dirty="0">
+              <a:solidFill>
+                <a:schemeClr val="tx1"/>
+              </a:solidFill>
+            </a:endParaRPr>
+          </a:p>
+        </p:txBody>
+      </p:sp>
+      <p:sp>
+        <p:nvSpPr>
+          <p:cNvPr id="33" name="Rectangle 32"/>
+          <p:cNvSpPr/>
+          <p:nvPr/>
+        </p:nvSpPr>
+        <p:spPr>
+          <a:xfrm>
+            <a:off x="3733800" y="2971800"/>
+            <a:ext cx="317716" cy="369332"/>
+          </a:xfrm>
+          <a:prstGeom prst="rect">
+            <a:avLst/>
+          </a:prstGeom>
+        </p:spPr>
+        <p:txBody>
+          <a:bodyPr wrap="none">
+            <a:spAutoFit/>
+          </a:bodyPr>
+          <a:lstStyle/>
+          <a:p>
+            <a:pPr algn="ctr"/>
+            <a:r>
+              <a:rPr lang="en-GB" dirty="0" smtClean="0"/>
+              <a:t>A</a:t>
+            </a:r>
+            <a:endParaRPr lang="en-GB" dirty="0"/>
+          </a:p>
+        </p:txBody>
+      </p:sp>
+      <p:sp>
+        <p:nvSpPr>
+          <p:cNvPr id="34" name="Rounded Rectangle 33"/>
+          <p:cNvSpPr/>
+          <p:nvPr/>
+        </p:nvSpPr>
+        <p:spPr>
+          <a:xfrm>
+            <a:off x="3886200" y="3886200"/>
+            <a:ext cx="1143000" cy="838200"/>
+          </a:xfrm>
+          <a:prstGeom prst="roundRect">
+            <a:avLst/>
+          </a:prstGeom>
+          <a:noFill/>
+          <a:ln>
+            <a:solidFill>
+              <a:schemeClr val="tx1"/>
+            </a:solidFill>
+          </a:ln>
+        </p:spPr>
+        <p:style>
+          <a:lnRef idx="2">
+            <a:schemeClr val="accent1">
+              <a:shade val="50000"/>
+            </a:schemeClr>
+          </a:lnRef>
+          <a:fillRef idx="1">
+            <a:schemeClr val="accent1"/>
+          </a:fillRef>
+          <a:effectRef idx="0">
+            <a:schemeClr val="accent1"/>
+          </a:effectRef>
+          <a:fontRef idx="minor">
+            <a:schemeClr val="lt1"/>
+          </a:fontRef>
+        </p:style>
+        <p:txBody>
+          <a:bodyPr rtlCol="0" anchor="ctr"/>
+          <a:lstStyle/>
+          <a:p>
+            <a:pPr algn="ctr"/>
+            <a:endParaRPr lang="en-GB" dirty="0">
+              <a:solidFill>
+                <a:schemeClr val="tx1"/>
+              </a:solidFill>
+            </a:endParaRPr>
+          </a:p>
+        </p:txBody>
+      </p:sp>
+      <p:sp>
+        <p:nvSpPr>
+          <p:cNvPr id="35" name="Rectangle 34"/>
+          <p:cNvSpPr/>
+          <p:nvPr/>
+        </p:nvSpPr>
+        <p:spPr>
+          <a:xfrm>
+            <a:off x="5486400" y="2971800"/>
+            <a:ext cx="317716" cy="369332"/>
+          </a:xfrm>
+          <a:prstGeom prst="rect">
+            <a:avLst/>
+          </a:prstGeom>
+        </p:spPr>
+        <p:txBody>
+          <a:bodyPr wrap="none">
+            <a:spAutoFit/>
+          </a:bodyPr>
+          <a:lstStyle/>
+          <a:p>
+            <a:pPr algn="ctr"/>
+            <a:r>
+              <a:rPr lang="en-GB" dirty="0" smtClean="0"/>
+              <a:t>B</a:t>
+            </a:r>
+            <a:endParaRPr lang="en-GB" dirty="0"/>
+          </a:p>
+        </p:txBody>
+      </p:sp>
+      <p:sp>
+        <p:nvSpPr>
+          <p:cNvPr id="38" name="Rounded Rectangle 37"/>
+          <p:cNvSpPr/>
+          <p:nvPr/>
+        </p:nvSpPr>
+        <p:spPr>
+          <a:xfrm>
+            <a:off x="4267200" y="4114800"/>
+            <a:ext cx="533400" cy="457200"/>
+          </a:xfrm>
+          <a:prstGeom prst="roundRect">
+            <a:avLst/>
+          </a:prstGeom>
+          <a:solidFill>
+            <a:schemeClr val="bg1"/>
+          </a:solidFill>
+          <a:ln>
+            <a:solidFill>
+              <a:schemeClr val="tx1"/>
+            </a:solidFill>
+          </a:ln>
+        </p:spPr>
+        <p:style>
+          <a:lnRef idx="2">
+            <a:schemeClr val="accent1">
+              <a:shade val="50000"/>
+            </a:schemeClr>
+          </a:lnRef>
+          <a:fillRef idx="1">
+            <a:schemeClr val="accent1"/>
+          </a:fillRef>
+          <a:effectRef idx="0">
+            <a:schemeClr val="accent1"/>
+          </a:effectRef>
+          <a:fontRef idx="minor">
+            <a:schemeClr val="lt1"/>
+          </a:fontRef>
+        </p:style>
+        <p:txBody>
+          <a:bodyPr rtlCol="0" anchor="ctr"/>
+          <a:lstStyle/>
+          <a:p>
+            <a:pPr algn="ctr"/>
+            <a:r>
+              <a:rPr lang="en-GB" dirty="0" smtClean="0">
+                <a:solidFill>
+                  <a:schemeClr val="tx1"/>
+                </a:solidFill>
+              </a:rPr>
+              <a:t>C</a:t>
+            </a:r>
+            <a:endParaRPr lang="en-GB" dirty="0">
+              <a:solidFill>
+                <a:schemeClr val="tx1"/>
+              </a:solidFill>
+            </a:endParaRPr>
+          </a:p>
+        </p:txBody>
+      </p:sp>
+      <p:sp>
+        <p:nvSpPr>
+          <p:cNvPr id="39" name="Rounded Rectangle 38"/>
+          <p:cNvSpPr/>
+          <p:nvPr/>
+        </p:nvSpPr>
+        <p:spPr>
+          <a:xfrm>
+            <a:off x="5334000" y="3352800"/>
+            <a:ext cx="533400" cy="990600"/>
+          </a:xfrm>
+          <a:prstGeom prst="roundRect">
+            <a:avLst/>
+          </a:prstGeom>
+          <a:noFill/>
+          <a:ln>
+            <a:solidFill>
+              <a:schemeClr val="tx1"/>
+            </a:solidFill>
+          </a:ln>
+        </p:spPr>
+        <p:style>
+          <a:lnRef idx="2">
+            <a:schemeClr val="accent1">
+              <a:shade val="50000"/>
+            </a:schemeClr>
+          </a:lnRef>
+          <a:fillRef idx="1">
+            <a:schemeClr val="accent1"/>
+          </a:fillRef>
+          <a:effectRef idx="0">
+            <a:schemeClr val="accent1"/>
+          </a:effectRef>
+          <a:fontRef idx="minor">
+            <a:schemeClr val="lt1"/>
+          </a:fontRef>
+        </p:style>
+        <p:txBody>
+          <a:bodyPr rtlCol="0" anchor="ctr"/>
+          <a:lstStyle/>
+          <a:p>
+            <a:pPr algn="ctr"/>
+            <a:endParaRPr lang="en-GB" dirty="0">
+              <a:solidFill>
+                <a:schemeClr val="tx1"/>
+              </a:solidFill>
+            </a:endParaRPr>
+          </a:p>
+        </p:txBody>
+      </p:sp>
+      <p:sp>
+        <p:nvSpPr>
+          <p:cNvPr id="40" name="Rectangle 39"/>
+          <p:cNvSpPr/>
+          <p:nvPr/>
+        </p:nvSpPr>
+        <p:spPr>
+          <a:xfrm>
+            <a:off x="3886200" y="3516868"/>
+            <a:ext cx="442749" cy="369332"/>
+          </a:xfrm>
+          <a:prstGeom prst="rect">
+            <a:avLst/>
+          </a:prstGeom>
+        </p:spPr>
+        <p:txBody>
+          <a:bodyPr wrap="none">
+            <a:spAutoFit/>
+          </a:bodyPr>
+          <a:lstStyle/>
+          <a:p>
+            <a:pPr algn="ctr"/>
+            <a:r>
+              <a:rPr lang="en-GB" dirty="0" smtClean="0"/>
+              <a:t>AB</a:t>
+            </a:r>
+            <a:endParaRPr lang="en-GB" dirty="0"/>
+          </a:p>
+        </p:txBody>
+      </p:sp>
+      <p:sp>
+        <p:nvSpPr>
+          <p:cNvPr id="10" name="Oval 9"/>
+          <p:cNvSpPr/>
+          <p:nvPr/>
+        </p:nvSpPr>
+        <p:spPr>
+          <a:xfrm>
+            <a:off x="4495800" y="3733800"/>
+            <a:ext cx="152400" cy="152400"/>
+          </a:xfrm>
+          <a:prstGeom prst="ellipse">
+            <a:avLst/>
+          </a:prstGeom>
+          <a:solidFill>
+            <a:schemeClr val="tx1"/>
+          </a:solidFill>
+          <a:ln>
+            <a:solidFill>
+              <a:schemeClr val="tx1"/>
+            </a:solidFill>
+          </a:ln>
+        </p:spPr>
+        <p:style>
+          <a:lnRef idx="2">
+            <a:schemeClr val="accent1">
+              <a:shade val="50000"/>
+            </a:schemeClr>
+          </a:lnRef>
+          <a:fillRef idx="1">
+            <a:schemeClr val="accent1"/>
+          </a:fillRef>
+          <a:effectRef idx="0">
+            <a:schemeClr val="accent1"/>
+          </a:effectRef>
+          <a:fontRef idx="minor">
+            <a:schemeClr val="lt1"/>
+          </a:fontRef>
+        </p:style>
+        <p:txBody>
+          <a:bodyPr rtlCol="0" anchor="ctr"/>
+          <a:lstStyle/>
+          <a:p>
+            <a:pPr algn="ctr"/>
+            <a:endParaRPr lang="en-GB"/>
+          </a:p>
+        </p:txBody>
+      </p:sp>
+      <p:cxnSp>
+        <p:nvCxnSpPr>
+          <p:cNvPr id="15" name="Curved Connector 10"/>
+          <p:cNvCxnSpPr>
+            <a:stCxn id="16" idx="1"/>
+            <a:endCxn id="10" idx="0"/>
+          </p:cNvCxnSpPr>
+          <p:nvPr/>
+        </p:nvCxnSpPr>
+        <p:spPr>
+          <a:xfrm rot="10800000" flipV="1">
+            <a:off x="4572000" y="3581400"/>
+            <a:ext cx="914400" cy="152400"/>
+          </a:xfrm>
+          <a:prstGeom prst="curvedConnector2">
+            <a:avLst/>
+          </a:prstGeom>
+          <a:ln>
+            <a:solidFill>
+              <a:schemeClr val="tx1"/>
+            </a:solidFill>
+          </a:ln>
+        </p:spPr>
+        <p:style>
+          <a:lnRef idx="1">
+            <a:schemeClr val="accent1"/>
+          </a:lnRef>
+          <a:fillRef idx="0">
+            <a:schemeClr val="accent1"/>
+          </a:fillRef>
+          <a:effectRef idx="0">
+            <a:schemeClr val="accent1"/>
+          </a:effectRef>
+          <a:fontRef idx="minor">
+            <a:schemeClr val="tx1"/>
+          </a:fontRef>
+        </p:style>
+      </p:cxnSp>
+      <p:sp>
+        <p:nvSpPr>
+          <p:cNvPr id="16" name="Diamond 15"/>
+          <p:cNvSpPr/>
+          <p:nvPr/>
+        </p:nvSpPr>
+        <p:spPr>
+          <a:xfrm>
+            <a:off x="5486400" y="3505200"/>
+            <a:ext cx="152400" cy="152400"/>
+          </a:xfrm>
+          <a:prstGeom prst="diamond">
+            <a:avLst/>
+          </a:prstGeom>
+          <a:noFill/>
+          <a:ln>
+            <a:solidFill>
+              <a:schemeClr val="tx1"/>
+            </a:solidFill>
+          </a:ln>
+        </p:spPr>
+        <p:style>
+          <a:lnRef idx="2">
+            <a:schemeClr val="accent1">
+              <a:shade val="50000"/>
+            </a:schemeClr>
+          </a:lnRef>
+          <a:fillRef idx="1">
+            <a:schemeClr val="accent1"/>
+          </a:fillRef>
+          <a:effectRef idx="0">
+            <a:schemeClr val="accent1"/>
+          </a:effectRef>
+          <a:fontRef idx="minor">
+            <a:schemeClr val="lt1"/>
+          </a:fontRef>
+        </p:style>
+        <p:txBody>
+          <a:bodyPr rtlCol="0" anchor="ctr"/>
+          <a:lstStyle/>
+          <a:p>
+            <a:pPr algn="ctr"/>
+            <a:endParaRPr lang="en-GB"/>
+          </a:p>
+        </p:txBody>
+      </p:sp>
+    </p:spTree>
+  </p:cSld>
+  <p:clrMapOvr>
+    <a:masterClrMapping/>
+  </p:clrMapOvr>
+</p:sld>
+</file>
+
+<file path=ppt/slides/slide31.xml><?xml version="1.0" encoding="utf-8"?>
+<p:sld xmlns:a="http://schemas.openxmlformats.org/drawingml/2006/main" xmlns:r="http://schemas.openxmlformats.org/officeDocument/2006/relationships" xmlns:p="http://schemas.openxmlformats.org/presentationml/2006/main">
+  <p:cSld>
+    <p:spTree>
+      <p:nvGrpSpPr>
+        <p:cNvPr id="1" name=""/>
+        <p:cNvGrpSpPr/>
+        <p:nvPr/>
+      </p:nvGrpSpPr>
+      <p:grpSpPr>
+        <a:xfrm>
+          <a:off x="0" y="0"/>
+          <a:ext cx="0" cy="0"/>
+          <a:chOff x="0" y="0"/>
+          <a:chExt cx="0" cy="0"/>
+        </a:xfrm>
+      </p:grpSpPr>
+      <p:sp>
+        <p:nvSpPr>
+          <p:cNvPr id="2" name="Title 1"/>
+          <p:cNvSpPr>
+            <a:spLocks noGrp="1"/>
+          </p:cNvSpPr>
+          <p:nvPr>
+            <p:ph type="title"/>
+          </p:nvPr>
+        </p:nvSpPr>
+        <p:spPr/>
+        <p:txBody>
+          <a:bodyPr>
+            <a:normAutofit fontScale="90000"/>
+          </a:bodyPr>
+          <a:lstStyle/>
+          <a:p>
+            <a:r>
+              <a:rPr lang="en-GB" dirty="0" smtClean="0"/>
+              <a:t>Modelled overlap with a dominant </a:t>
+            </a:r>
+            <a:r>
+              <a:rPr lang="en-GB" dirty="0" smtClean="0"/>
+              <a:t>parent (2)</a:t>
             </a:r>
             <a:endParaRPr lang="en-GB" dirty="0"/>
           </a:p>
@@ -17492,6 +17990,3239 @@
           <a:p>
             <a:pPr algn="ctr"/>
             <a:endParaRPr lang="en-GB"/>
+          </a:p>
+        </p:txBody>
+      </p:sp>
+    </p:spTree>
+  </p:cSld>
+  <p:clrMapOvr>
+    <a:masterClrMapping/>
+  </p:clrMapOvr>
+</p:sld>
+</file>
+
+<file path=ppt/slides/slide32.xml><?xml version="1.0" encoding="utf-8"?>
+<p:sld xmlns:a="http://schemas.openxmlformats.org/drawingml/2006/main" xmlns:r="http://schemas.openxmlformats.org/officeDocument/2006/relationships" xmlns:p="http://schemas.openxmlformats.org/presentationml/2006/main">
+  <p:cSld>
+    <p:spTree>
+      <p:nvGrpSpPr>
+        <p:cNvPr id="1" name=""/>
+        <p:cNvGrpSpPr/>
+        <p:nvPr/>
+      </p:nvGrpSpPr>
+      <p:grpSpPr>
+        <a:xfrm>
+          <a:off x="0" y="0"/>
+          <a:ext cx="0" cy="0"/>
+          <a:chOff x="0" y="0"/>
+          <a:chExt cx="0" cy="0"/>
+        </a:xfrm>
+      </p:grpSpPr>
+      <p:sp>
+        <p:nvSpPr>
+          <p:cNvPr id="2" name="Title 1"/>
+          <p:cNvSpPr>
+            <a:spLocks noGrp="1"/>
+          </p:cNvSpPr>
+          <p:nvPr>
+            <p:ph type="title"/>
+          </p:nvPr>
+        </p:nvSpPr>
+        <p:spPr/>
+        <p:txBody>
+          <a:bodyPr/>
+          <a:lstStyle/>
+          <a:p>
+            <a:r>
+              <a:rPr lang="en-GB" dirty="0" smtClean="0"/>
+              <a:t>Signal levels</a:t>
+            </a:r>
+            <a:endParaRPr lang="en-GB" dirty="0"/>
+          </a:p>
+        </p:txBody>
+      </p:sp>
+      <p:sp>
+        <p:nvSpPr>
+          <p:cNvPr id="3" name="Rounded Rectangle 2"/>
+          <p:cNvSpPr/>
+          <p:nvPr/>
+        </p:nvSpPr>
+        <p:spPr>
+          <a:xfrm>
+            <a:off x="3581400" y="3200400"/>
+            <a:ext cx="1600200" cy="1676400"/>
+          </a:xfrm>
+          <a:prstGeom prst="roundRect">
+            <a:avLst/>
+          </a:prstGeom>
+          <a:solidFill>
+            <a:schemeClr val="bg1"/>
+          </a:solidFill>
+          <a:ln>
+            <a:solidFill>
+              <a:schemeClr val="tx1"/>
+            </a:solidFill>
+          </a:ln>
+        </p:spPr>
+        <p:style>
+          <a:lnRef idx="2">
+            <a:schemeClr val="accent1">
+              <a:shade val="50000"/>
+            </a:schemeClr>
+          </a:lnRef>
+          <a:fillRef idx="1">
+            <a:schemeClr val="accent1"/>
+          </a:fillRef>
+          <a:effectRef idx="0">
+            <a:schemeClr val="accent1"/>
+          </a:effectRef>
+          <a:fontRef idx="minor">
+            <a:schemeClr val="lt1"/>
+          </a:fontRef>
+        </p:style>
+        <p:txBody>
+          <a:bodyPr rtlCol="0" anchor="ctr"/>
+          <a:lstStyle/>
+          <a:p>
+            <a:pPr algn="ctr"/>
+            <a:endParaRPr lang="en-GB" dirty="0">
+              <a:solidFill>
+                <a:schemeClr val="tx1"/>
+              </a:solidFill>
+            </a:endParaRPr>
+          </a:p>
+        </p:txBody>
+      </p:sp>
+      <p:sp>
+        <p:nvSpPr>
+          <p:cNvPr id="4" name="Rectangle 3"/>
+          <p:cNvSpPr/>
+          <p:nvPr/>
+        </p:nvSpPr>
+        <p:spPr>
+          <a:xfrm>
+            <a:off x="3427957" y="2438400"/>
+            <a:ext cx="915443" cy="369332"/>
+          </a:xfrm>
+          <a:prstGeom prst="rect">
+            <a:avLst/>
+          </a:prstGeom>
+        </p:spPr>
+        <p:txBody>
+          <a:bodyPr wrap="none">
+            <a:spAutoFit/>
+          </a:bodyPr>
+          <a:lstStyle/>
+          <a:p>
+            <a:pPr algn="ctr"/>
+            <a:r>
+              <a:rPr lang="en-GB" dirty="0" smtClean="0"/>
+              <a:t>S-level1</a:t>
+            </a:r>
+            <a:endParaRPr lang="en-GB" dirty="0"/>
+          </a:p>
+        </p:txBody>
+      </p:sp>
+      <p:sp>
+        <p:nvSpPr>
+          <p:cNvPr id="5" name="Rounded Rectangle 4"/>
+          <p:cNvSpPr/>
+          <p:nvPr/>
+        </p:nvSpPr>
+        <p:spPr>
+          <a:xfrm>
+            <a:off x="3886200" y="4267200"/>
+            <a:ext cx="1066800" cy="457200"/>
+          </a:xfrm>
+          <a:prstGeom prst="roundRect">
+            <a:avLst/>
+          </a:prstGeom>
+          <a:noFill/>
+          <a:ln>
+            <a:solidFill>
+              <a:schemeClr val="tx1"/>
+            </a:solidFill>
+          </a:ln>
+        </p:spPr>
+        <p:style>
+          <a:lnRef idx="2">
+            <a:schemeClr val="accent1">
+              <a:shade val="50000"/>
+            </a:schemeClr>
+          </a:lnRef>
+          <a:fillRef idx="1">
+            <a:schemeClr val="accent1"/>
+          </a:fillRef>
+          <a:effectRef idx="0">
+            <a:schemeClr val="accent1"/>
+          </a:effectRef>
+          <a:fontRef idx="minor">
+            <a:schemeClr val="lt1"/>
+          </a:fontRef>
+        </p:style>
+        <p:txBody>
+          <a:bodyPr rtlCol="0" anchor="ctr"/>
+          <a:lstStyle/>
+          <a:p>
+            <a:pPr algn="ctr"/>
+            <a:endParaRPr lang="en-GB" dirty="0">
+              <a:solidFill>
+                <a:schemeClr val="tx1"/>
+              </a:solidFill>
+            </a:endParaRPr>
+          </a:p>
+        </p:txBody>
+      </p:sp>
+      <p:sp>
+        <p:nvSpPr>
+          <p:cNvPr id="6" name="Rounded Rectangle 5"/>
+          <p:cNvSpPr/>
+          <p:nvPr/>
+        </p:nvSpPr>
+        <p:spPr>
+          <a:xfrm>
+            <a:off x="3886200" y="3429000"/>
+            <a:ext cx="533400" cy="457200"/>
+          </a:xfrm>
+          <a:prstGeom prst="roundRect">
+            <a:avLst/>
+          </a:prstGeom>
+          <a:solidFill>
+            <a:schemeClr val="bg1"/>
+          </a:solidFill>
+          <a:ln>
+            <a:solidFill>
+              <a:schemeClr val="tx1"/>
+            </a:solidFill>
+          </a:ln>
+        </p:spPr>
+        <p:style>
+          <a:lnRef idx="2">
+            <a:schemeClr val="accent1">
+              <a:shade val="50000"/>
+            </a:schemeClr>
+          </a:lnRef>
+          <a:fillRef idx="1">
+            <a:schemeClr val="accent1"/>
+          </a:fillRef>
+          <a:effectRef idx="0">
+            <a:schemeClr val="accent1"/>
+          </a:effectRef>
+          <a:fontRef idx="minor">
+            <a:schemeClr val="lt1"/>
+          </a:fontRef>
+        </p:style>
+        <p:txBody>
+          <a:bodyPr rtlCol="0" anchor="ctr"/>
+          <a:lstStyle/>
+          <a:p>
+            <a:pPr algn="ctr"/>
+            <a:r>
+              <a:rPr lang="en-GB" dirty="0" smtClean="0">
+                <a:solidFill>
+                  <a:schemeClr val="tx1"/>
+                </a:solidFill>
+              </a:rPr>
+              <a:t>D</a:t>
+            </a:r>
+            <a:endParaRPr lang="en-GB" dirty="0">
+              <a:solidFill>
+                <a:schemeClr val="tx1"/>
+              </a:solidFill>
+            </a:endParaRPr>
+          </a:p>
+        </p:txBody>
+      </p:sp>
+      <p:sp>
+        <p:nvSpPr>
+          <p:cNvPr id="7" name="Rectangle 6"/>
+          <p:cNvSpPr/>
+          <p:nvPr/>
+        </p:nvSpPr>
+        <p:spPr>
+          <a:xfrm>
+            <a:off x="3885157" y="3962400"/>
+            <a:ext cx="915443" cy="369332"/>
+          </a:xfrm>
+          <a:prstGeom prst="rect">
+            <a:avLst/>
+          </a:prstGeom>
+        </p:spPr>
+        <p:txBody>
+          <a:bodyPr wrap="none">
+            <a:spAutoFit/>
+          </a:bodyPr>
+          <a:lstStyle/>
+          <a:p>
+            <a:pPr algn="ctr"/>
+            <a:r>
+              <a:rPr lang="en-GB" dirty="0" smtClean="0"/>
+              <a:t>S-level3</a:t>
+            </a:r>
+            <a:endParaRPr lang="en-GB" dirty="0"/>
+          </a:p>
+        </p:txBody>
+      </p:sp>
+      <p:sp>
+        <p:nvSpPr>
+          <p:cNvPr id="9" name="Rounded Rectangle 8"/>
+          <p:cNvSpPr/>
+          <p:nvPr/>
+        </p:nvSpPr>
+        <p:spPr>
+          <a:xfrm>
+            <a:off x="3276600" y="2743200"/>
+            <a:ext cx="2057400" cy="2286000"/>
+          </a:xfrm>
+          <a:prstGeom prst="roundRect">
+            <a:avLst/>
+          </a:prstGeom>
+          <a:noFill/>
+          <a:ln>
+            <a:solidFill>
+              <a:schemeClr val="tx1"/>
+            </a:solidFill>
+          </a:ln>
+        </p:spPr>
+        <p:style>
+          <a:lnRef idx="2">
+            <a:schemeClr val="accent1">
+              <a:shade val="50000"/>
+            </a:schemeClr>
+          </a:lnRef>
+          <a:fillRef idx="1">
+            <a:schemeClr val="accent1"/>
+          </a:fillRef>
+          <a:effectRef idx="0">
+            <a:schemeClr val="accent1"/>
+          </a:effectRef>
+          <a:fontRef idx="minor">
+            <a:schemeClr val="lt1"/>
+          </a:fontRef>
+        </p:style>
+        <p:txBody>
+          <a:bodyPr rtlCol="0" anchor="ctr"/>
+          <a:lstStyle/>
+          <a:p>
+            <a:pPr algn="ctr"/>
+            <a:endParaRPr lang="en-GB" dirty="0">
+              <a:solidFill>
+                <a:schemeClr val="tx1"/>
+              </a:solidFill>
+            </a:endParaRPr>
+          </a:p>
+        </p:txBody>
+      </p:sp>
+      <p:sp>
+        <p:nvSpPr>
+          <p:cNvPr id="10" name="Rectangle 9"/>
+          <p:cNvSpPr/>
+          <p:nvPr/>
+        </p:nvSpPr>
+        <p:spPr>
+          <a:xfrm>
+            <a:off x="3656557" y="2895600"/>
+            <a:ext cx="915443" cy="369332"/>
+          </a:xfrm>
+          <a:prstGeom prst="rect">
+            <a:avLst/>
+          </a:prstGeom>
+        </p:spPr>
+        <p:txBody>
+          <a:bodyPr wrap="none">
+            <a:spAutoFit/>
+          </a:bodyPr>
+          <a:lstStyle/>
+          <a:p>
+            <a:pPr algn="ctr"/>
+            <a:r>
+              <a:rPr lang="en-GB" dirty="0" smtClean="0"/>
+              <a:t>S-level2</a:t>
+            </a:r>
+            <a:endParaRPr lang="en-GB" dirty="0"/>
+          </a:p>
+        </p:txBody>
+      </p:sp>
+    </p:spTree>
+  </p:cSld>
+  <p:clrMapOvr>
+    <a:masterClrMapping/>
+  </p:clrMapOvr>
+</p:sld>
+</file>
+
+<file path=ppt/slides/slide33.xml><?xml version="1.0" encoding="utf-8"?>
+<p:sld xmlns:a="http://schemas.openxmlformats.org/drawingml/2006/main" xmlns:r="http://schemas.openxmlformats.org/officeDocument/2006/relationships" xmlns:p="http://schemas.openxmlformats.org/presentationml/2006/main">
+  <p:cSld>
+    <p:spTree>
+      <p:nvGrpSpPr>
+        <p:cNvPr id="1" name=""/>
+        <p:cNvGrpSpPr/>
+        <p:nvPr/>
+      </p:nvGrpSpPr>
+      <p:grpSpPr>
+        <a:xfrm>
+          <a:off x="0" y="0"/>
+          <a:ext cx="0" cy="0"/>
+          <a:chOff x="0" y="0"/>
+          <a:chExt cx="0" cy="0"/>
+        </a:xfrm>
+      </p:grpSpPr>
+      <p:sp>
+        <p:nvSpPr>
+          <p:cNvPr id="2" name="Title 1"/>
+          <p:cNvSpPr>
+            <a:spLocks noGrp="1"/>
+          </p:cNvSpPr>
+          <p:nvPr>
+            <p:ph type="title"/>
+          </p:nvPr>
+        </p:nvSpPr>
+        <p:spPr/>
+        <p:txBody>
+          <a:bodyPr>
+            <a:normAutofit/>
+          </a:bodyPr>
+          <a:lstStyle/>
+          <a:p>
+            <a:r>
+              <a:rPr lang="en-GB" dirty="0" smtClean="0"/>
+              <a:t>Signal link</a:t>
+            </a:r>
+            <a:endParaRPr lang="en-GB" dirty="0"/>
+          </a:p>
+        </p:txBody>
+      </p:sp>
+      <p:sp>
+        <p:nvSpPr>
+          <p:cNvPr id="32" name="Rounded Rectangle 31"/>
+          <p:cNvSpPr/>
+          <p:nvPr/>
+        </p:nvSpPr>
+        <p:spPr>
+          <a:xfrm>
+            <a:off x="685800" y="2209800"/>
+            <a:ext cx="1447800" cy="1143000"/>
+          </a:xfrm>
+          <a:prstGeom prst="roundRect">
+            <a:avLst/>
+          </a:prstGeom>
+          <a:solidFill>
+            <a:schemeClr val="bg1"/>
+          </a:solidFill>
+          <a:ln>
+            <a:solidFill>
+              <a:schemeClr val="tx1"/>
+            </a:solidFill>
+          </a:ln>
+        </p:spPr>
+        <p:style>
+          <a:lnRef idx="2">
+            <a:schemeClr val="accent1">
+              <a:shade val="50000"/>
+            </a:schemeClr>
+          </a:lnRef>
+          <a:fillRef idx="1">
+            <a:schemeClr val="accent1"/>
+          </a:fillRef>
+          <a:effectRef idx="0">
+            <a:schemeClr val="accent1"/>
+          </a:effectRef>
+          <a:fontRef idx="minor">
+            <a:schemeClr val="lt1"/>
+          </a:fontRef>
+        </p:style>
+        <p:txBody>
+          <a:bodyPr rtlCol="0" anchor="ctr"/>
+          <a:lstStyle/>
+          <a:p>
+            <a:pPr algn="ctr"/>
+            <a:endParaRPr lang="en-GB" dirty="0">
+              <a:solidFill>
+                <a:schemeClr val="tx1"/>
+              </a:solidFill>
+            </a:endParaRPr>
+          </a:p>
+        </p:txBody>
+      </p:sp>
+      <p:sp>
+        <p:nvSpPr>
+          <p:cNvPr id="33" name="Rectangle 32"/>
+          <p:cNvSpPr/>
+          <p:nvPr/>
+        </p:nvSpPr>
+        <p:spPr>
+          <a:xfrm>
+            <a:off x="478180" y="1905000"/>
+            <a:ext cx="732958" cy="369332"/>
+          </a:xfrm>
+          <a:prstGeom prst="rect">
+            <a:avLst/>
+          </a:prstGeom>
+        </p:spPr>
+        <p:txBody>
+          <a:bodyPr wrap="none">
+            <a:spAutoFit/>
+          </a:bodyPr>
+          <a:lstStyle/>
+          <a:p>
+            <a:pPr algn="ctr"/>
+            <a:r>
+              <a:rPr lang="en-GB" dirty="0" smtClean="0"/>
+              <a:t>Room</a:t>
+            </a:r>
+            <a:endParaRPr lang="en-GB" dirty="0"/>
+          </a:p>
+        </p:txBody>
+      </p:sp>
+      <p:sp>
+        <p:nvSpPr>
+          <p:cNvPr id="35" name="Rectangle 34"/>
+          <p:cNvSpPr/>
+          <p:nvPr/>
+        </p:nvSpPr>
+        <p:spPr>
+          <a:xfrm>
+            <a:off x="2228407" y="2057400"/>
+            <a:ext cx="737702" cy="369332"/>
+          </a:xfrm>
+          <a:prstGeom prst="rect">
+            <a:avLst/>
+          </a:prstGeom>
+        </p:spPr>
+        <p:txBody>
+          <a:bodyPr wrap="none">
+            <a:spAutoFit/>
+          </a:bodyPr>
+          <a:lstStyle/>
+          <a:p>
+            <a:pPr algn="ctr"/>
+            <a:r>
+              <a:rPr lang="en-GB" dirty="0" smtClean="0"/>
+              <a:t>Signal</a:t>
+            </a:r>
+            <a:endParaRPr lang="en-GB" dirty="0"/>
+          </a:p>
+        </p:txBody>
+      </p:sp>
+      <p:sp>
+        <p:nvSpPr>
+          <p:cNvPr id="38" name="Rounded Rectangle 37"/>
+          <p:cNvSpPr/>
+          <p:nvPr/>
+        </p:nvSpPr>
+        <p:spPr>
+          <a:xfrm>
+            <a:off x="1219200" y="2590800"/>
+            <a:ext cx="609600" cy="533400"/>
+          </a:xfrm>
+          <a:prstGeom prst="roundRect">
+            <a:avLst/>
+          </a:prstGeom>
+          <a:solidFill>
+            <a:schemeClr val="bg1"/>
+          </a:solidFill>
+          <a:ln>
+            <a:solidFill>
+              <a:schemeClr val="tx1"/>
+            </a:solidFill>
+          </a:ln>
+        </p:spPr>
+        <p:style>
+          <a:lnRef idx="2">
+            <a:schemeClr val="accent1">
+              <a:shade val="50000"/>
+            </a:schemeClr>
+          </a:lnRef>
+          <a:fillRef idx="1">
+            <a:schemeClr val="accent1"/>
+          </a:fillRef>
+          <a:effectRef idx="0">
+            <a:schemeClr val="accent1"/>
+          </a:effectRef>
+          <a:fontRef idx="minor">
+            <a:schemeClr val="lt1"/>
+          </a:fontRef>
+        </p:style>
+        <p:txBody>
+          <a:bodyPr rtlCol="0" anchor="ctr"/>
+          <a:lstStyle/>
+          <a:p>
+            <a:pPr algn="ctr"/>
+            <a:endParaRPr lang="en-GB" dirty="0">
+              <a:solidFill>
+                <a:schemeClr val="tx1"/>
+              </a:solidFill>
+            </a:endParaRPr>
+          </a:p>
+        </p:txBody>
+      </p:sp>
+      <p:sp>
+        <p:nvSpPr>
+          <p:cNvPr id="39" name="Rounded Rectangle 38"/>
+          <p:cNvSpPr/>
+          <p:nvPr/>
+        </p:nvSpPr>
+        <p:spPr>
+          <a:xfrm>
+            <a:off x="2286000" y="2438400"/>
+            <a:ext cx="533400" cy="533400"/>
+          </a:xfrm>
+          <a:prstGeom prst="roundRect">
+            <a:avLst/>
+          </a:prstGeom>
+          <a:noFill/>
+          <a:ln>
+            <a:solidFill>
+              <a:schemeClr val="tx1"/>
+            </a:solidFill>
+          </a:ln>
+        </p:spPr>
+        <p:style>
+          <a:lnRef idx="2">
+            <a:schemeClr val="accent1">
+              <a:shade val="50000"/>
+            </a:schemeClr>
+          </a:lnRef>
+          <a:fillRef idx="1">
+            <a:schemeClr val="accent1"/>
+          </a:fillRef>
+          <a:effectRef idx="0">
+            <a:schemeClr val="accent1"/>
+          </a:effectRef>
+          <a:fontRef idx="minor">
+            <a:schemeClr val="lt1"/>
+          </a:fontRef>
+        </p:style>
+        <p:txBody>
+          <a:bodyPr rtlCol="0" anchor="ctr"/>
+          <a:lstStyle/>
+          <a:p>
+            <a:pPr algn="ctr"/>
+            <a:endParaRPr lang="en-GB" dirty="0">
+              <a:solidFill>
+                <a:schemeClr val="tx1"/>
+              </a:solidFill>
+            </a:endParaRPr>
+          </a:p>
+        </p:txBody>
+      </p:sp>
+      <p:sp>
+        <p:nvSpPr>
+          <p:cNvPr id="10" name="Oval 9"/>
+          <p:cNvSpPr/>
+          <p:nvPr/>
+        </p:nvSpPr>
+        <p:spPr>
+          <a:xfrm>
+            <a:off x="1828800" y="2743200"/>
+            <a:ext cx="152400" cy="152400"/>
+          </a:xfrm>
+          <a:prstGeom prst="ellipse">
+            <a:avLst/>
+          </a:prstGeom>
+          <a:solidFill>
+            <a:schemeClr val="tx1"/>
+          </a:solidFill>
+          <a:ln>
+            <a:solidFill>
+              <a:schemeClr val="tx1"/>
+            </a:solidFill>
+          </a:ln>
+        </p:spPr>
+        <p:style>
+          <a:lnRef idx="2">
+            <a:schemeClr val="accent1">
+              <a:shade val="50000"/>
+            </a:schemeClr>
+          </a:lnRef>
+          <a:fillRef idx="1">
+            <a:schemeClr val="accent1"/>
+          </a:fillRef>
+          <a:effectRef idx="0">
+            <a:schemeClr val="accent1"/>
+          </a:effectRef>
+          <a:fontRef idx="minor">
+            <a:schemeClr val="lt1"/>
+          </a:fontRef>
+        </p:style>
+        <p:txBody>
+          <a:bodyPr rtlCol="0" anchor="ctr"/>
+          <a:lstStyle/>
+          <a:p>
+            <a:pPr algn="ctr"/>
+            <a:endParaRPr lang="en-GB"/>
+          </a:p>
+        </p:txBody>
+      </p:sp>
+      <p:cxnSp>
+        <p:nvCxnSpPr>
+          <p:cNvPr id="15" name="Curved Connector 10"/>
+          <p:cNvCxnSpPr>
+            <a:stCxn id="16" idx="1"/>
+            <a:endCxn id="10" idx="6"/>
+          </p:cNvCxnSpPr>
+          <p:nvPr/>
+        </p:nvCxnSpPr>
+        <p:spPr>
+          <a:xfrm rot="10800000" flipV="1">
+            <a:off x="1981200" y="2667000"/>
+            <a:ext cx="457200" cy="152400"/>
+          </a:xfrm>
+          <a:prstGeom prst="curvedConnector3">
+            <a:avLst>
+              <a:gd name="adj1" fmla="val 50000"/>
+            </a:avLst>
+          </a:prstGeom>
+          <a:ln>
+            <a:solidFill>
+              <a:schemeClr val="tx1"/>
+            </a:solidFill>
+          </a:ln>
+        </p:spPr>
+        <p:style>
+          <a:lnRef idx="1">
+            <a:schemeClr val="accent1"/>
+          </a:lnRef>
+          <a:fillRef idx="0">
+            <a:schemeClr val="accent1"/>
+          </a:fillRef>
+          <a:effectRef idx="0">
+            <a:schemeClr val="accent1"/>
+          </a:effectRef>
+          <a:fontRef idx="minor">
+            <a:schemeClr val="tx1"/>
+          </a:fontRef>
+        </p:style>
+      </p:cxnSp>
+      <p:sp>
+        <p:nvSpPr>
+          <p:cNvPr id="16" name="Diamond 15"/>
+          <p:cNvSpPr/>
+          <p:nvPr/>
+        </p:nvSpPr>
+        <p:spPr>
+          <a:xfrm>
+            <a:off x="2438400" y="2590800"/>
+            <a:ext cx="152400" cy="152400"/>
+          </a:xfrm>
+          <a:prstGeom prst="diamond">
+            <a:avLst/>
+          </a:prstGeom>
+          <a:noFill/>
+          <a:ln>
+            <a:solidFill>
+              <a:schemeClr val="tx1"/>
+            </a:solidFill>
+          </a:ln>
+        </p:spPr>
+        <p:style>
+          <a:lnRef idx="2">
+            <a:schemeClr val="accent1">
+              <a:shade val="50000"/>
+            </a:schemeClr>
+          </a:lnRef>
+          <a:fillRef idx="1">
+            <a:schemeClr val="accent1"/>
+          </a:fillRef>
+          <a:effectRef idx="0">
+            <a:schemeClr val="accent1"/>
+          </a:effectRef>
+          <a:fontRef idx="minor">
+            <a:schemeClr val="lt1"/>
+          </a:fontRef>
+        </p:style>
+        <p:txBody>
+          <a:bodyPr rtlCol="0" anchor="ctr"/>
+          <a:lstStyle/>
+          <a:p>
+            <a:pPr algn="ctr"/>
+            <a:endParaRPr lang="en-GB"/>
+          </a:p>
+        </p:txBody>
+      </p:sp>
+      <p:sp>
+        <p:nvSpPr>
+          <p:cNvPr id="11" name="Rectangle 10"/>
+          <p:cNvSpPr/>
+          <p:nvPr/>
+        </p:nvSpPr>
+        <p:spPr>
+          <a:xfrm>
+            <a:off x="1093110" y="2286000"/>
+            <a:ext cx="811890" cy="369332"/>
+          </a:xfrm>
+          <a:prstGeom prst="rect">
+            <a:avLst/>
+          </a:prstGeom>
+        </p:spPr>
+        <p:txBody>
+          <a:bodyPr wrap="none">
+            <a:spAutoFit/>
+          </a:bodyPr>
+          <a:lstStyle/>
+          <a:p>
+            <a:pPr algn="ctr"/>
+            <a:r>
+              <a:rPr lang="en-GB" dirty="0" smtClean="0"/>
+              <a:t>Device</a:t>
+            </a:r>
+            <a:endParaRPr lang="en-GB" dirty="0"/>
+          </a:p>
+        </p:txBody>
+      </p:sp>
+      <p:sp>
+        <p:nvSpPr>
+          <p:cNvPr id="12" name="Rounded Rectangle 11"/>
+          <p:cNvSpPr/>
+          <p:nvPr/>
+        </p:nvSpPr>
+        <p:spPr>
+          <a:xfrm>
+            <a:off x="3408020" y="2286000"/>
+            <a:ext cx="1447800" cy="1143000"/>
+          </a:xfrm>
+          <a:prstGeom prst="roundRect">
+            <a:avLst/>
+          </a:prstGeom>
+          <a:solidFill>
+            <a:schemeClr val="bg1"/>
+          </a:solidFill>
+          <a:ln>
+            <a:solidFill>
+              <a:schemeClr val="tx1"/>
+            </a:solidFill>
+          </a:ln>
+        </p:spPr>
+        <p:style>
+          <a:lnRef idx="2">
+            <a:schemeClr val="accent1">
+              <a:shade val="50000"/>
+            </a:schemeClr>
+          </a:lnRef>
+          <a:fillRef idx="1">
+            <a:schemeClr val="accent1"/>
+          </a:fillRef>
+          <a:effectRef idx="0">
+            <a:schemeClr val="accent1"/>
+          </a:effectRef>
+          <a:fontRef idx="minor">
+            <a:schemeClr val="lt1"/>
+          </a:fontRef>
+        </p:style>
+        <p:txBody>
+          <a:bodyPr rtlCol="0" anchor="ctr"/>
+          <a:lstStyle/>
+          <a:p>
+            <a:pPr algn="ctr"/>
+            <a:endParaRPr lang="en-GB" dirty="0">
+              <a:solidFill>
+                <a:schemeClr val="tx1"/>
+              </a:solidFill>
+            </a:endParaRPr>
+          </a:p>
+        </p:txBody>
+      </p:sp>
+      <p:sp>
+        <p:nvSpPr>
+          <p:cNvPr id="13" name="Rectangle 12"/>
+          <p:cNvSpPr/>
+          <p:nvPr/>
+        </p:nvSpPr>
+        <p:spPr>
+          <a:xfrm>
+            <a:off x="3200400" y="1981200"/>
+            <a:ext cx="732958" cy="369332"/>
+          </a:xfrm>
+          <a:prstGeom prst="rect">
+            <a:avLst/>
+          </a:prstGeom>
+        </p:spPr>
+        <p:txBody>
+          <a:bodyPr wrap="none">
+            <a:spAutoFit/>
+          </a:bodyPr>
+          <a:lstStyle/>
+          <a:p>
+            <a:pPr algn="ctr"/>
+            <a:r>
+              <a:rPr lang="en-GB" dirty="0" smtClean="0"/>
+              <a:t>Room</a:t>
+            </a:r>
+            <a:endParaRPr lang="en-GB" dirty="0"/>
+          </a:p>
+        </p:txBody>
+      </p:sp>
+      <p:sp>
+        <p:nvSpPr>
+          <p:cNvPr id="14" name="Rectangle 13"/>
+          <p:cNvSpPr/>
+          <p:nvPr/>
+        </p:nvSpPr>
+        <p:spPr>
+          <a:xfrm>
+            <a:off x="5103027" y="2133600"/>
+            <a:ext cx="737702" cy="369332"/>
+          </a:xfrm>
+          <a:prstGeom prst="rect">
+            <a:avLst/>
+          </a:prstGeom>
+        </p:spPr>
+        <p:txBody>
+          <a:bodyPr wrap="none">
+            <a:spAutoFit/>
+          </a:bodyPr>
+          <a:lstStyle/>
+          <a:p>
+            <a:pPr algn="ctr"/>
+            <a:r>
+              <a:rPr lang="en-GB" dirty="0" smtClean="0"/>
+              <a:t>Signal</a:t>
+            </a:r>
+            <a:endParaRPr lang="en-GB" dirty="0"/>
+          </a:p>
+        </p:txBody>
+      </p:sp>
+      <p:sp>
+        <p:nvSpPr>
+          <p:cNvPr id="17" name="Rounded Rectangle 16"/>
+          <p:cNvSpPr/>
+          <p:nvPr/>
+        </p:nvSpPr>
+        <p:spPr>
+          <a:xfrm>
+            <a:off x="3941420" y="2667000"/>
+            <a:ext cx="609600" cy="533400"/>
+          </a:xfrm>
+          <a:prstGeom prst="roundRect">
+            <a:avLst/>
+          </a:prstGeom>
+          <a:solidFill>
+            <a:schemeClr val="bg1"/>
+          </a:solidFill>
+          <a:ln>
+            <a:solidFill>
+              <a:schemeClr val="tx1"/>
+            </a:solidFill>
+          </a:ln>
+        </p:spPr>
+        <p:style>
+          <a:lnRef idx="2">
+            <a:schemeClr val="accent1">
+              <a:shade val="50000"/>
+            </a:schemeClr>
+          </a:lnRef>
+          <a:fillRef idx="1">
+            <a:schemeClr val="accent1"/>
+          </a:fillRef>
+          <a:effectRef idx="0">
+            <a:schemeClr val="accent1"/>
+          </a:effectRef>
+          <a:fontRef idx="minor">
+            <a:schemeClr val="lt1"/>
+          </a:fontRef>
+        </p:style>
+        <p:txBody>
+          <a:bodyPr rtlCol="0" anchor="ctr"/>
+          <a:lstStyle/>
+          <a:p>
+            <a:pPr algn="ctr"/>
+            <a:endParaRPr lang="en-GB" dirty="0">
+              <a:solidFill>
+                <a:schemeClr val="tx1"/>
+              </a:solidFill>
+            </a:endParaRPr>
+          </a:p>
+        </p:txBody>
+      </p:sp>
+      <p:sp>
+        <p:nvSpPr>
+          <p:cNvPr id="18" name="Rounded Rectangle 17"/>
+          <p:cNvSpPr/>
+          <p:nvPr/>
+        </p:nvSpPr>
+        <p:spPr>
+          <a:xfrm>
+            <a:off x="5160620" y="2514600"/>
+            <a:ext cx="533400" cy="533400"/>
+          </a:xfrm>
+          <a:prstGeom prst="roundRect">
+            <a:avLst/>
+          </a:prstGeom>
+          <a:noFill/>
+          <a:ln>
+            <a:solidFill>
+              <a:schemeClr val="tx1"/>
+            </a:solidFill>
+          </a:ln>
+        </p:spPr>
+        <p:style>
+          <a:lnRef idx="2">
+            <a:schemeClr val="accent1">
+              <a:shade val="50000"/>
+            </a:schemeClr>
+          </a:lnRef>
+          <a:fillRef idx="1">
+            <a:schemeClr val="accent1"/>
+          </a:fillRef>
+          <a:effectRef idx="0">
+            <a:schemeClr val="accent1"/>
+          </a:effectRef>
+          <a:fontRef idx="minor">
+            <a:schemeClr val="lt1"/>
+          </a:fontRef>
+        </p:style>
+        <p:txBody>
+          <a:bodyPr rtlCol="0" anchor="ctr"/>
+          <a:lstStyle/>
+          <a:p>
+            <a:pPr algn="ctr"/>
+            <a:endParaRPr lang="en-GB" dirty="0">
+              <a:solidFill>
+                <a:schemeClr val="tx1"/>
+              </a:solidFill>
+            </a:endParaRPr>
+          </a:p>
+        </p:txBody>
+      </p:sp>
+      <p:sp>
+        <p:nvSpPr>
+          <p:cNvPr id="19" name="Oval 18"/>
+          <p:cNvSpPr/>
+          <p:nvPr/>
+        </p:nvSpPr>
+        <p:spPr>
+          <a:xfrm>
+            <a:off x="5002529" y="2743200"/>
+            <a:ext cx="152400" cy="152400"/>
+          </a:xfrm>
+          <a:prstGeom prst="ellipse">
+            <a:avLst/>
+          </a:prstGeom>
+          <a:solidFill>
+            <a:schemeClr val="tx1"/>
+          </a:solidFill>
+          <a:ln>
+            <a:solidFill>
+              <a:schemeClr val="tx1"/>
+            </a:solidFill>
+          </a:ln>
+        </p:spPr>
+        <p:style>
+          <a:lnRef idx="2">
+            <a:schemeClr val="accent1">
+              <a:shade val="50000"/>
+            </a:schemeClr>
+          </a:lnRef>
+          <a:fillRef idx="1">
+            <a:schemeClr val="accent1"/>
+          </a:fillRef>
+          <a:effectRef idx="0">
+            <a:schemeClr val="accent1"/>
+          </a:effectRef>
+          <a:fontRef idx="minor">
+            <a:schemeClr val="lt1"/>
+          </a:fontRef>
+        </p:style>
+        <p:txBody>
+          <a:bodyPr rtlCol="0" anchor="ctr"/>
+          <a:lstStyle/>
+          <a:p>
+            <a:pPr algn="ctr"/>
+            <a:endParaRPr lang="en-GB"/>
+          </a:p>
+        </p:txBody>
+      </p:sp>
+      <p:cxnSp>
+        <p:nvCxnSpPr>
+          <p:cNvPr id="20" name="Curved Connector 10"/>
+          <p:cNvCxnSpPr>
+            <a:stCxn id="21" idx="3"/>
+            <a:endCxn id="19" idx="2"/>
+          </p:cNvCxnSpPr>
+          <p:nvPr/>
+        </p:nvCxnSpPr>
+        <p:spPr>
+          <a:xfrm flipV="1">
+            <a:off x="4392929" y="2819400"/>
+            <a:ext cx="609600" cy="76200"/>
+          </a:xfrm>
+          <a:prstGeom prst="curvedConnector3">
+            <a:avLst>
+              <a:gd name="adj1" fmla="val 50000"/>
+            </a:avLst>
+          </a:prstGeom>
+          <a:ln>
+            <a:solidFill>
+              <a:schemeClr val="tx1"/>
+            </a:solidFill>
+          </a:ln>
+        </p:spPr>
+        <p:style>
+          <a:lnRef idx="1">
+            <a:schemeClr val="accent1"/>
+          </a:lnRef>
+          <a:fillRef idx="0">
+            <a:schemeClr val="accent1"/>
+          </a:fillRef>
+          <a:effectRef idx="0">
+            <a:schemeClr val="accent1"/>
+          </a:effectRef>
+          <a:fontRef idx="minor">
+            <a:schemeClr val="tx1"/>
+          </a:fontRef>
+        </p:style>
+      </p:cxnSp>
+      <p:sp>
+        <p:nvSpPr>
+          <p:cNvPr id="21" name="Diamond 20"/>
+          <p:cNvSpPr/>
+          <p:nvPr/>
+        </p:nvSpPr>
+        <p:spPr>
+          <a:xfrm>
+            <a:off x="4240529" y="2819400"/>
+            <a:ext cx="152400" cy="152400"/>
+          </a:xfrm>
+          <a:prstGeom prst="diamond">
+            <a:avLst/>
+          </a:prstGeom>
+          <a:noFill/>
+          <a:ln>
+            <a:solidFill>
+              <a:schemeClr val="tx1"/>
+            </a:solidFill>
+          </a:ln>
+        </p:spPr>
+        <p:style>
+          <a:lnRef idx="2">
+            <a:schemeClr val="accent1">
+              <a:shade val="50000"/>
+            </a:schemeClr>
+          </a:lnRef>
+          <a:fillRef idx="1">
+            <a:schemeClr val="accent1"/>
+          </a:fillRef>
+          <a:effectRef idx="0">
+            <a:schemeClr val="accent1"/>
+          </a:effectRef>
+          <a:fontRef idx="minor">
+            <a:schemeClr val="lt1"/>
+          </a:fontRef>
+        </p:style>
+        <p:txBody>
+          <a:bodyPr rtlCol="0" anchor="ctr"/>
+          <a:lstStyle/>
+          <a:p>
+            <a:pPr algn="ctr"/>
+            <a:endParaRPr lang="en-GB"/>
+          </a:p>
+        </p:txBody>
+      </p:sp>
+      <p:sp>
+        <p:nvSpPr>
+          <p:cNvPr id="22" name="Rectangle 21"/>
+          <p:cNvSpPr/>
+          <p:nvPr/>
+        </p:nvSpPr>
+        <p:spPr>
+          <a:xfrm>
+            <a:off x="3815330" y="2362200"/>
+            <a:ext cx="811890" cy="369332"/>
+          </a:xfrm>
+          <a:prstGeom prst="rect">
+            <a:avLst/>
+          </a:prstGeom>
+        </p:spPr>
+        <p:txBody>
+          <a:bodyPr wrap="none">
+            <a:spAutoFit/>
+          </a:bodyPr>
+          <a:lstStyle/>
+          <a:p>
+            <a:pPr algn="ctr"/>
+            <a:r>
+              <a:rPr lang="en-GB" dirty="0" smtClean="0"/>
+              <a:t>Device</a:t>
+            </a:r>
+            <a:endParaRPr lang="en-GB" dirty="0"/>
+          </a:p>
+        </p:txBody>
+      </p:sp>
+      <p:sp>
+        <p:nvSpPr>
+          <p:cNvPr id="28" name="Rounded Rectangle 27"/>
+          <p:cNvSpPr/>
+          <p:nvPr/>
+        </p:nvSpPr>
+        <p:spPr>
+          <a:xfrm>
+            <a:off x="6382193" y="2362200"/>
+            <a:ext cx="1447800" cy="1143000"/>
+          </a:xfrm>
+          <a:prstGeom prst="roundRect">
+            <a:avLst/>
+          </a:prstGeom>
+          <a:solidFill>
+            <a:schemeClr val="bg1"/>
+          </a:solidFill>
+          <a:ln>
+            <a:solidFill>
+              <a:schemeClr val="tx1"/>
+            </a:solidFill>
+          </a:ln>
+        </p:spPr>
+        <p:style>
+          <a:lnRef idx="2">
+            <a:schemeClr val="accent1">
+              <a:shade val="50000"/>
+            </a:schemeClr>
+          </a:lnRef>
+          <a:fillRef idx="1">
+            <a:schemeClr val="accent1"/>
+          </a:fillRef>
+          <a:effectRef idx="0">
+            <a:schemeClr val="accent1"/>
+          </a:effectRef>
+          <a:fontRef idx="minor">
+            <a:schemeClr val="lt1"/>
+          </a:fontRef>
+        </p:style>
+        <p:txBody>
+          <a:bodyPr rtlCol="0" anchor="ctr"/>
+          <a:lstStyle/>
+          <a:p>
+            <a:pPr algn="ctr"/>
+            <a:endParaRPr lang="en-GB" dirty="0">
+              <a:solidFill>
+                <a:schemeClr val="tx1"/>
+              </a:solidFill>
+            </a:endParaRPr>
+          </a:p>
+        </p:txBody>
+      </p:sp>
+      <p:sp>
+        <p:nvSpPr>
+          <p:cNvPr id="29" name="Rectangle 28"/>
+          <p:cNvSpPr/>
+          <p:nvPr/>
+        </p:nvSpPr>
+        <p:spPr>
+          <a:xfrm>
+            <a:off x="6248400" y="2057400"/>
+            <a:ext cx="732958" cy="369332"/>
+          </a:xfrm>
+          <a:prstGeom prst="rect">
+            <a:avLst/>
+          </a:prstGeom>
+        </p:spPr>
+        <p:txBody>
+          <a:bodyPr wrap="none">
+            <a:spAutoFit/>
+          </a:bodyPr>
+          <a:lstStyle/>
+          <a:p>
+            <a:pPr algn="ctr"/>
+            <a:r>
+              <a:rPr lang="en-GB" dirty="0" smtClean="0"/>
+              <a:t>Room</a:t>
+            </a:r>
+            <a:endParaRPr lang="en-GB" dirty="0"/>
+          </a:p>
+        </p:txBody>
+      </p:sp>
+      <p:sp>
+        <p:nvSpPr>
+          <p:cNvPr id="30" name="Rectangle 29"/>
+          <p:cNvSpPr/>
+          <p:nvPr/>
+        </p:nvSpPr>
+        <p:spPr>
+          <a:xfrm>
+            <a:off x="7924800" y="2209800"/>
+            <a:ext cx="737702" cy="369332"/>
+          </a:xfrm>
+          <a:prstGeom prst="rect">
+            <a:avLst/>
+          </a:prstGeom>
+        </p:spPr>
+        <p:txBody>
+          <a:bodyPr wrap="none">
+            <a:spAutoFit/>
+          </a:bodyPr>
+          <a:lstStyle/>
+          <a:p>
+            <a:pPr algn="ctr"/>
+            <a:r>
+              <a:rPr lang="en-GB" dirty="0" smtClean="0"/>
+              <a:t>Signal</a:t>
+            </a:r>
+            <a:endParaRPr lang="en-GB" dirty="0"/>
+          </a:p>
+        </p:txBody>
+      </p:sp>
+      <p:sp>
+        <p:nvSpPr>
+          <p:cNvPr id="31" name="Rounded Rectangle 30"/>
+          <p:cNvSpPr/>
+          <p:nvPr/>
+        </p:nvSpPr>
+        <p:spPr>
+          <a:xfrm>
+            <a:off x="6915593" y="2743200"/>
+            <a:ext cx="609600" cy="533400"/>
+          </a:xfrm>
+          <a:prstGeom prst="roundRect">
+            <a:avLst/>
+          </a:prstGeom>
+          <a:solidFill>
+            <a:schemeClr val="bg1"/>
+          </a:solidFill>
+          <a:ln>
+            <a:solidFill>
+              <a:schemeClr val="tx1"/>
+            </a:solidFill>
+          </a:ln>
+        </p:spPr>
+        <p:style>
+          <a:lnRef idx="2">
+            <a:schemeClr val="accent1">
+              <a:shade val="50000"/>
+            </a:schemeClr>
+          </a:lnRef>
+          <a:fillRef idx="1">
+            <a:schemeClr val="accent1"/>
+          </a:fillRef>
+          <a:effectRef idx="0">
+            <a:schemeClr val="accent1"/>
+          </a:effectRef>
+          <a:fontRef idx="minor">
+            <a:schemeClr val="lt1"/>
+          </a:fontRef>
+        </p:style>
+        <p:txBody>
+          <a:bodyPr rtlCol="0" anchor="ctr"/>
+          <a:lstStyle/>
+          <a:p>
+            <a:pPr algn="ctr"/>
+            <a:endParaRPr lang="en-GB" dirty="0">
+              <a:solidFill>
+                <a:schemeClr val="tx1"/>
+              </a:solidFill>
+            </a:endParaRPr>
+          </a:p>
+        </p:txBody>
+      </p:sp>
+      <p:sp>
+        <p:nvSpPr>
+          <p:cNvPr id="34" name="Rounded Rectangle 33"/>
+          <p:cNvSpPr/>
+          <p:nvPr/>
+        </p:nvSpPr>
+        <p:spPr>
+          <a:xfrm>
+            <a:off x="7982393" y="2590800"/>
+            <a:ext cx="533400" cy="533400"/>
+          </a:xfrm>
+          <a:prstGeom prst="roundRect">
+            <a:avLst/>
+          </a:prstGeom>
+          <a:noFill/>
+          <a:ln>
+            <a:solidFill>
+              <a:schemeClr val="tx1"/>
+            </a:solidFill>
+          </a:ln>
+        </p:spPr>
+        <p:style>
+          <a:lnRef idx="2">
+            <a:schemeClr val="accent1">
+              <a:shade val="50000"/>
+            </a:schemeClr>
+          </a:lnRef>
+          <a:fillRef idx="1">
+            <a:schemeClr val="accent1"/>
+          </a:fillRef>
+          <a:effectRef idx="0">
+            <a:schemeClr val="accent1"/>
+          </a:effectRef>
+          <a:fontRef idx="minor">
+            <a:schemeClr val="lt1"/>
+          </a:fontRef>
+        </p:style>
+        <p:txBody>
+          <a:bodyPr rtlCol="0" anchor="ctr"/>
+          <a:lstStyle/>
+          <a:p>
+            <a:pPr algn="ctr"/>
+            <a:endParaRPr lang="en-GB" dirty="0">
+              <a:solidFill>
+                <a:schemeClr val="tx1"/>
+              </a:solidFill>
+            </a:endParaRPr>
+          </a:p>
+        </p:txBody>
+      </p:sp>
+      <p:cxnSp>
+        <p:nvCxnSpPr>
+          <p:cNvPr id="37" name="Curved Connector 10"/>
+          <p:cNvCxnSpPr>
+            <a:stCxn id="40" idx="1"/>
+            <a:endCxn id="42" idx="3"/>
+          </p:cNvCxnSpPr>
+          <p:nvPr/>
+        </p:nvCxnSpPr>
+        <p:spPr>
+          <a:xfrm rot="10800000" flipV="1">
+            <a:off x="7367103" y="2819400"/>
+            <a:ext cx="767691" cy="152400"/>
+          </a:xfrm>
+          <a:prstGeom prst="curvedConnector3">
+            <a:avLst>
+              <a:gd name="adj1" fmla="val 50000"/>
+            </a:avLst>
+          </a:prstGeom>
+          <a:ln>
+            <a:solidFill>
+              <a:schemeClr val="tx1"/>
+            </a:solidFill>
+          </a:ln>
+        </p:spPr>
+        <p:style>
+          <a:lnRef idx="1">
+            <a:schemeClr val="accent1"/>
+          </a:lnRef>
+          <a:fillRef idx="0">
+            <a:schemeClr val="accent1"/>
+          </a:fillRef>
+          <a:effectRef idx="0">
+            <a:schemeClr val="accent1"/>
+          </a:effectRef>
+          <a:fontRef idx="minor">
+            <a:schemeClr val="tx1"/>
+          </a:fontRef>
+        </p:style>
+      </p:cxnSp>
+      <p:sp>
+        <p:nvSpPr>
+          <p:cNvPr id="40" name="Diamond 39"/>
+          <p:cNvSpPr/>
+          <p:nvPr/>
+        </p:nvSpPr>
+        <p:spPr>
+          <a:xfrm>
+            <a:off x="8134793" y="2743200"/>
+            <a:ext cx="152400" cy="152400"/>
+          </a:xfrm>
+          <a:prstGeom prst="diamond">
+            <a:avLst/>
+          </a:prstGeom>
+          <a:noFill/>
+          <a:ln>
+            <a:solidFill>
+              <a:schemeClr val="tx1"/>
+            </a:solidFill>
+          </a:ln>
+        </p:spPr>
+        <p:style>
+          <a:lnRef idx="2">
+            <a:schemeClr val="accent1">
+              <a:shade val="50000"/>
+            </a:schemeClr>
+          </a:lnRef>
+          <a:fillRef idx="1">
+            <a:schemeClr val="accent1"/>
+          </a:fillRef>
+          <a:effectRef idx="0">
+            <a:schemeClr val="accent1"/>
+          </a:effectRef>
+          <a:fontRef idx="minor">
+            <a:schemeClr val="lt1"/>
+          </a:fontRef>
+        </p:style>
+        <p:txBody>
+          <a:bodyPr rtlCol="0" anchor="ctr"/>
+          <a:lstStyle/>
+          <a:p>
+            <a:pPr algn="ctr"/>
+            <a:endParaRPr lang="en-GB"/>
+          </a:p>
+        </p:txBody>
+      </p:sp>
+      <p:sp>
+        <p:nvSpPr>
+          <p:cNvPr id="41" name="Rectangle 40"/>
+          <p:cNvSpPr/>
+          <p:nvPr/>
+        </p:nvSpPr>
+        <p:spPr>
+          <a:xfrm>
+            <a:off x="6789503" y="2438400"/>
+            <a:ext cx="811890" cy="369332"/>
+          </a:xfrm>
+          <a:prstGeom prst="rect">
+            <a:avLst/>
+          </a:prstGeom>
+        </p:spPr>
+        <p:txBody>
+          <a:bodyPr wrap="none">
+            <a:spAutoFit/>
+          </a:bodyPr>
+          <a:lstStyle/>
+          <a:p>
+            <a:pPr algn="ctr"/>
+            <a:r>
+              <a:rPr lang="en-GB" dirty="0" smtClean="0"/>
+              <a:t>Device</a:t>
+            </a:r>
+            <a:endParaRPr lang="en-GB" dirty="0"/>
+          </a:p>
+        </p:txBody>
+      </p:sp>
+      <p:sp>
+        <p:nvSpPr>
+          <p:cNvPr id="42" name="Diamond 41"/>
+          <p:cNvSpPr/>
+          <p:nvPr/>
+        </p:nvSpPr>
+        <p:spPr>
+          <a:xfrm>
+            <a:off x="7214702" y="2895600"/>
+            <a:ext cx="152400" cy="152400"/>
+          </a:xfrm>
+          <a:prstGeom prst="diamond">
+            <a:avLst/>
+          </a:prstGeom>
+          <a:noFill/>
+          <a:ln>
+            <a:solidFill>
+              <a:schemeClr val="tx1"/>
+            </a:solidFill>
+          </a:ln>
+        </p:spPr>
+        <p:style>
+          <a:lnRef idx="2">
+            <a:schemeClr val="accent1">
+              <a:shade val="50000"/>
+            </a:schemeClr>
+          </a:lnRef>
+          <a:fillRef idx="1">
+            <a:schemeClr val="accent1"/>
+          </a:fillRef>
+          <a:effectRef idx="0">
+            <a:schemeClr val="accent1"/>
+          </a:effectRef>
+          <a:fontRef idx="minor">
+            <a:schemeClr val="lt1"/>
+          </a:fontRef>
+        </p:style>
+        <p:txBody>
+          <a:bodyPr rtlCol="0" anchor="ctr"/>
+          <a:lstStyle/>
+          <a:p>
+            <a:pPr algn="ctr"/>
+            <a:endParaRPr lang="en-GB"/>
+          </a:p>
+        </p:txBody>
+      </p:sp>
+    </p:spTree>
+  </p:cSld>
+  <p:clrMapOvr>
+    <a:masterClrMapping/>
+  </p:clrMapOvr>
+</p:sld>
+</file>
+
+<file path=ppt/slides/slide34.xml><?xml version="1.0" encoding="utf-8"?>
+<p:sld xmlns:a="http://schemas.openxmlformats.org/drawingml/2006/main" xmlns:r="http://schemas.openxmlformats.org/officeDocument/2006/relationships" xmlns:p="http://schemas.openxmlformats.org/presentationml/2006/main">
+  <p:cSld>
+    <p:spTree>
+      <p:nvGrpSpPr>
+        <p:cNvPr id="1" name=""/>
+        <p:cNvGrpSpPr/>
+        <p:nvPr/>
+      </p:nvGrpSpPr>
+      <p:grpSpPr>
+        <a:xfrm>
+          <a:off x="0" y="0"/>
+          <a:ext cx="0" cy="0"/>
+          <a:chOff x="0" y="0"/>
+          <a:chExt cx="0" cy="0"/>
+        </a:xfrm>
+      </p:grpSpPr>
+      <p:sp>
+        <p:nvSpPr>
+          <p:cNvPr id="2" name="Title 1"/>
+          <p:cNvSpPr>
+            <a:spLocks noGrp="1"/>
+          </p:cNvSpPr>
+          <p:nvPr>
+            <p:ph type="title"/>
+          </p:nvPr>
+        </p:nvSpPr>
+        <p:spPr/>
+        <p:txBody>
+          <a:bodyPr>
+            <a:normAutofit/>
+          </a:bodyPr>
+          <a:lstStyle/>
+          <a:p>
+            <a:r>
+              <a:rPr lang="en-GB" dirty="0" smtClean="0"/>
+              <a:t>Signal coverage with links</a:t>
+            </a:r>
+            <a:endParaRPr lang="en-GB" dirty="0"/>
+          </a:p>
+        </p:txBody>
+      </p:sp>
+      <p:sp>
+        <p:nvSpPr>
+          <p:cNvPr id="32" name="Rounded Rectangle 31"/>
+          <p:cNvSpPr/>
+          <p:nvPr/>
+        </p:nvSpPr>
+        <p:spPr>
+          <a:xfrm>
+            <a:off x="2209800" y="2286000"/>
+            <a:ext cx="1066800" cy="1371600"/>
+          </a:xfrm>
+          <a:prstGeom prst="roundRect">
+            <a:avLst/>
+          </a:prstGeom>
+          <a:solidFill>
+            <a:schemeClr val="bg1"/>
+          </a:solidFill>
+          <a:ln>
+            <a:solidFill>
+              <a:schemeClr val="tx1"/>
+            </a:solidFill>
+          </a:ln>
+        </p:spPr>
+        <p:style>
+          <a:lnRef idx="2">
+            <a:schemeClr val="accent1">
+              <a:shade val="50000"/>
+            </a:schemeClr>
+          </a:lnRef>
+          <a:fillRef idx="1">
+            <a:schemeClr val="accent1"/>
+          </a:fillRef>
+          <a:effectRef idx="0">
+            <a:schemeClr val="accent1"/>
+          </a:effectRef>
+          <a:fontRef idx="minor">
+            <a:schemeClr val="lt1"/>
+          </a:fontRef>
+        </p:style>
+        <p:txBody>
+          <a:bodyPr rtlCol="0" anchor="ctr"/>
+          <a:lstStyle/>
+          <a:p>
+            <a:pPr algn="ctr"/>
+            <a:endParaRPr lang="en-GB" dirty="0">
+              <a:solidFill>
+                <a:schemeClr val="tx1"/>
+              </a:solidFill>
+            </a:endParaRPr>
+          </a:p>
+        </p:txBody>
+      </p:sp>
+      <p:sp>
+        <p:nvSpPr>
+          <p:cNvPr id="33" name="Rectangle 32"/>
+          <p:cNvSpPr/>
+          <p:nvPr/>
+        </p:nvSpPr>
+        <p:spPr>
+          <a:xfrm>
+            <a:off x="2198023" y="1981200"/>
+            <a:ext cx="849977" cy="369332"/>
+          </a:xfrm>
+          <a:prstGeom prst="rect">
+            <a:avLst/>
+          </a:prstGeom>
+        </p:spPr>
+        <p:txBody>
+          <a:bodyPr wrap="none">
+            <a:spAutoFit/>
+          </a:bodyPr>
+          <a:lstStyle/>
+          <a:p>
+            <a:pPr algn="ctr"/>
+            <a:r>
+              <a:rPr lang="en-GB" dirty="0" smtClean="0"/>
+              <a:t>Room1</a:t>
+            </a:r>
+            <a:endParaRPr lang="en-GB" dirty="0"/>
+          </a:p>
+        </p:txBody>
+      </p:sp>
+      <p:sp>
+        <p:nvSpPr>
+          <p:cNvPr id="12" name="Rounded Rectangle 11"/>
+          <p:cNvSpPr/>
+          <p:nvPr/>
+        </p:nvSpPr>
+        <p:spPr>
+          <a:xfrm>
+            <a:off x="3408020" y="2286000"/>
+            <a:ext cx="1447800" cy="1371600"/>
+          </a:xfrm>
+          <a:prstGeom prst="roundRect">
+            <a:avLst/>
+          </a:prstGeom>
+          <a:solidFill>
+            <a:schemeClr val="bg1"/>
+          </a:solidFill>
+          <a:ln>
+            <a:solidFill>
+              <a:schemeClr val="tx1"/>
+            </a:solidFill>
+          </a:ln>
+        </p:spPr>
+        <p:style>
+          <a:lnRef idx="2">
+            <a:schemeClr val="accent1">
+              <a:shade val="50000"/>
+            </a:schemeClr>
+          </a:lnRef>
+          <a:fillRef idx="1">
+            <a:schemeClr val="accent1"/>
+          </a:fillRef>
+          <a:effectRef idx="0">
+            <a:schemeClr val="accent1"/>
+          </a:effectRef>
+          <a:fontRef idx="minor">
+            <a:schemeClr val="lt1"/>
+          </a:fontRef>
+        </p:style>
+        <p:txBody>
+          <a:bodyPr rtlCol="0" anchor="ctr"/>
+          <a:lstStyle/>
+          <a:p>
+            <a:pPr algn="ctr"/>
+            <a:endParaRPr lang="en-GB" dirty="0">
+              <a:solidFill>
+                <a:schemeClr val="tx1"/>
+              </a:solidFill>
+            </a:endParaRPr>
+          </a:p>
+        </p:txBody>
+      </p:sp>
+      <p:sp>
+        <p:nvSpPr>
+          <p:cNvPr id="13" name="Rectangle 12"/>
+          <p:cNvSpPr/>
+          <p:nvPr/>
+        </p:nvSpPr>
+        <p:spPr>
+          <a:xfrm>
+            <a:off x="3352800" y="1981200"/>
+            <a:ext cx="849977" cy="369332"/>
+          </a:xfrm>
+          <a:prstGeom prst="rect">
+            <a:avLst/>
+          </a:prstGeom>
+        </p:spPr>
+        <p:txBody>
+          <a:bodyPr wrap="none">
+            <a:spAutoFit/>
+          </a:bodyPr>
+          <a:lstStyle/>
+          <a:p>
+            <a:pPr algn="ctr"/>
+            <a:r>
+              <a:rPr lang="en-GB" dirty="0" smtClean="0"/>
+              <a:t>Room2</a:t>
+            </a:r>
+            <a:endParaRPr lang="en-GB" dirty="0"/>
+          </a:p>
+        </p:txBody>
+      </p:sp>
+      <p:sp>
+        <p:nvSpPr>
+          <p:cNvPr id="14" name="Rectangle 13"/>
+          <p:cNvSpPr/>
+          <p:nvPr/>
+        </p:nvSpPr>
+        <p:spPr>
+          <a:xfrm>
+            <a:off x="5103027" y="2133600"/>
+            <a:ext cx="737702" cy="369332"/>
+          </a:xfrm>
+          <a:prstGeom prst="rect">
+            <a:avLst/>
+          </a:prstGeom>
+        </p:spPr>
+        <p:txBody>
+          <a:bodyPr wrap="none">
+            <a:spAutoFit/>
+          </a:bodyPr>
+          <a:lstStyle/>
+          <a:p>
+            <a:pPr algn="ctr"/>
+            <a:r>
+              <a:rPr lang="en-GB" dirty="0" smtClean="0"/>
+              <a:t>Signal</a:t>
+            </a:r>
+            <a:endParaRPr lang="en-GB" dirty="0"/>
+          </a:p>
+        </p:txBody>
+      </p:sp>
+      <p:sp>
+        <p:nvSpPr>
+          <p:cNvPr id="17" name="Rounded Rectangle 16"/>
+          <p:cNvSpPr/>
+          <p:nvPr/>
+        </p:nvSpPr>
+        <p:spPr>
+          <a:xfrm>
+            <a:off x="3707490" y="2895600"/>
+            <a:ext cx="609600" cy="533400"/>
+          </a:xfrm>
+          <a:prstGeom prst="roundRect">
+            <a:avLst/>
+          </a:prstGeom>
+          <a:solidFill>
+            <a:schemeClr val="bg1"/>
+          </a:solidFill>
+          <a:ln>
+            <a:solidFill>
+              <a:schemeClr val="tx1"/>
+            </a:solidFill>
+          </a:ln>
+        </p:spPr>
+        <p:style>
+          <a:lnRef idx="2">
+            <a:schemeClr val="accent1">
+              <a:shade val="50000"/>
+            </a:schemeClr>
+          </a:lnRef>
+          <a:fillRef idx="1">
+            <a:schemeClr val="accent1"/>
+          </a:fillRef>
+          <a:effectRef idx="0">
+            <a:schemeClr val="accent1"/>
+          </a:effectRef>
+          <a:fontRef idx="minor">
+            <a:schemeClr val="lt1"/>
+          </a:fontRef>
+        </p:style>
+        <p:txBody>
+          <a:bodyPr rtlCol="0" anchor="ctr"/>
+          <a:lstStyle/>
+          <a:p>
+            <a:pPr algn="ctr"/>
+            <a:endParaRPr lang="en-GB" dirty="0">
+              <a:solidFill>
+                <a:schemeClr val="tx1"/>
+              </a:solidFill>
+            </a:endParaRPr>
+          </a:p>
+        </p:txBody>
+      </p:sp>
+      <p:sp>
+        <p:nvSpPr>
+          <p:cNvPr id="18" name="Rounded Rectangle 17"/>
+          <p:cNvSpPr/>
+          <p:nvPr/>
+        </p:nvSpPr>
+        <p:spPr>
+          <a:xfrm>
+            <a:off x="5160620" y="2514600"/>
+            <a:ext cx="533400" cy="533400"/>
+          </a:xfrm>
+          <a:prstGeom prst="roundRect">
+            <a:avLst/>
+          </a:prstGeom>
+          <a:noFill/>
+          <a:ln>
+            <a:solidFill>
+              <a:schemeClr val="tx1"/>
+            </a:solidFill>
+          </a:ln>
+        </p:spPr>
+        <p:style>
+          <a:lnRef idx="2">
+            <a:schemeClr val="accent1">
+              <a:shade val="50000"/>
+            </a:schemeClr>
+          </a:lnRef>
+          <a:fillRef idx="1">
+            <a:schemeClr val="accent1"/>
+          </a:fillRef>
+          <a:effectRef idx="0">
+            <a:schemeClr val="accent1"/>
+          </a:effectRef>
+          <a:fontRef idx="minor">
+            <a:schemeClr val="lt1"/>
+          </a:fontRef>
+        </p:style>
+        <p:txBody>
+          <a:bodyPr rtlCol="0" anchor="ctr"/>
+          <a:lstStyle/>
+          <a:p>
+            <a:pPr algn="ctr"/>
+            <a:endParaRPr lang="en-GB" dirty="0">
+              <a:solidFill>
+                <a:schemeClr val="tx1"/>
+              </a:solidFill>
+            </a:endParaRPr>
+          </a:p>
+        </p:txBody>
+      </p:sp>
+      <p:sp>
+        <p:nvSpPr>
+          <p:cNvPr id="19" name="Oval 18"/>
+          <p:cNvSpPr/>
+          <p:nvPr/>
+        </p:nvSpPr>
+        <p:spPr>
+          <a:xfrm>
+            <a:off x="5002529" y="2743200"/>
+            <a:ext cx="152400" cy="152400"/>
+          </a:xfrm>
+          <a:prstGeom prst="ellipse">
+            <a:avLst/>
+          </a:prstGeom>
+          <a:solidFill>
+            <a:schemeClr val="tx1"/>
+          </a:solidFill>
+          <a:ln>
+            <a:solidFill>
+              <a:schemeClr val="tx1"/>
+            </a:solidFill>
+          </a:ln>
+        </p:spPr>
+        <p:style>
+          <a:lnRef idx="2">
+            <a:schemeClr val="accent1">
+              <a:shade val="50000"/>
+            </a:schemeClr>
+          </a:lnRef>
+          <a:fillRef idx="1">
+            <a:schemeClr val="accent1"/>
+          </a:fillRef>
+          <a:effectRef idx="0">
+            <a:schemeClr val="accent1"/>
+          </a:effectRef>
+          <a:fontRef idx="minor">
+            <a:schemeClr val="lt1"/>
+          </a:fontRef>
+        </p:style>
+        <p:txBody>
+          <a:bodyPr rtlCol="0" anchor="ctr"/>
+          <a:lstStyle/>
+          <a:p>
+            <a:pPr algn="ctr"/>
+            <a:endParaRPr lang="en-GB"/>
+          </a:p>
+        </p:txBody>
+      </p:sp>
+      <p:cxnSp>
+        <p:nvCxnSpPr>
+          <p:cNvPr id="20" name="Curved Connector 10"/>
+          <p:cNvCxnSpPr>
+            <a:stCxn id="21" idx="3"/>
+            <a:endCxn id="19" idx="2"/>
+          </p:cNvCxnSpPr>
+          <p:nvPr/>
+        </p:nvCxnSpPr>
+        <p:spPr>
+          <a:xfrm>
+            <a:off x="4648200" y="2590800"/>
+            <a:ext cx="354329" cy="228600"/>
+          </a:xfrm>
+          <a:prstGeom prst="curvedConnector3">
+            <a:avLst>
+              <a:gd name="adj1" fmla="val 50000"/>
+            </a:avLst>
+          </a:prstGeom>
+          <a:ln>
+            <a:solidFill>
+              <a:schemeClr val="tx1"/>
+            </a:solidFill>
+          </a:ln>
+        </p:spPr>
+        <p:style>
+          <a:lnRef idx="1">
+            <a:schemeClr val="accent1"/>
+          </a:lnRef>
+          <a:fillRef idx="0">
+            <a:schemeClr val="accent1"/>
+          </a:fillRef>
+          <a:effectRef idx="0">
+            <a:schemeClr val="accent1"/>
+          </a:effectRef>
+          <a:fontRef idx="minor">
+            <a:schemeClr val="tx1"/>
+          </a:fontRef>
+        </p:style>
+      </p:cxnSp>
+      <p:sp>
+        <p:nvSpPr>
+          <p:cNvPr id="21" name="Diamond 20"/>
+          <p:cNvSpPr/>
+          <p:nvPr/>
+        </p:nvSpPr>
+        <p:spPr>
+          <a:xfrm>
+            <a:off x="4495800" y="2514600"/>
+            <a:ext cx="152400" cy="152400"/>
+          </a:xfrm>
+          <a:prstGeom prst="diamond">
+            <a:avLst/>
+          </a:prstGeom>
+          <a:noFill/>
+          <a:ln>
+            <a:solidFill>
+              <a:schemeClr val="tx1"/>
+            </a:solidFill>
+          </a:ln>
+        </p:spPr>
+        <p:style>
+          <a:lnRef idx="2">
+            <a:schemeClr val="accent1">
+              <a:shade val="50000"/>
+            </a:schemeClr>
+          </a:lnRef>
+          <a:fillRef idx="1">
+            <a:schemeClr val="accent1"/>
+          </a:fillRef>
+          <a:effectRef idx="0">
+            <a:schemeClr val="accent1"/>
+          </a:effectRef>
+          <a:fontRef idx="minor">
+            <a:schemeClr val="lt1"/>
+          </a:fontRef>
+        </p:style>
+        <p:txBody>
+          <a:bodyPr rtlCol="0" anchor="ctr"/>
+          <a:lstStyle/>
+          <a:p>
+            <a:pPr algn="ctr"/>
+            <a:endParaRPr lang="en-GB"/>
+          </a:p>
+        </p:txBody>
+      </p:sp>
+      <p:sp>
+        <p:nvSpPr>
+          <p:cNvPr id="22" name="Rectangle 21"/>
+          <p:cNvSpPr/>
+          <p:nvPr/>
+        </p:nvSpPr>
+        <p:spPr>
+          <a:xfrm>
+            <a:off x="3581400" y="2590800"/>
+            <a:ext cx="811890" cy="369332"/>
+          </a:xfrm>
+          <a:prstGeom prst="rect">
+            <a:avLst/>
+          </a:prstGeom>
+        </p:spPr>
+        <p:txBody>
+          <a:bodyPr wrap="none">
+            <a:spAutoFit/>
+          </a:bodyPr>
+          <a:lstStyle/>
+          <a:p>
+            <a:pPr algn="ctr"/>
+            <a:r>
+              <a:rPr lang="en-GB" dirty="0" smtClean="0"/>
+              <a:t>Device</a:t>
+            </a:r>
+            <a:endParaRPr lang="en-GB" dirty="0"/>
+          </a:p>
+        </p:txBody>
+      </p:sp>
+    </p:spTree>
+  </p:cSld>
+  <p:clrMapOvr>
+    <a:masterClrMapping/>
+  </p:clrMapOvr>
+</p:sld>
+</file>
+
+<file path=ppt/slides/slide35.xml><?xml version="1.0" encoding="utf-8"?>
+<p:sld xmlns:a="http://schemas.openxmlformats.org/drawingml/2006/main" xmlns:r="http://schemas.openxmlformats.org/officeDocument/2006/relationships" xmlns:p="http://schemas.openxmlformats.org/presentationml/2006/main">
+  <p:cSld>
+    <p:spTree>
+      <p:nvGrpSpPr>
+        <p:cNvPr id="1" name=""/>
+        <p:cNvGrpSpPr/>
+        <p:nvPr/>
+      </p:nvGrpSpPr>
+      <p:grpSpPr>
+        <a:xfrm>
+          <a:off x="0" y="0"/>
+          <a:ext cx="0" cy="0"/>
+          <a:chOff x="0" y="0"/>
+          <a:chExt cx="0" cy="0"/>
+        </a:xfrm>
+      </p:grpSpPr>
+      <p:sp>
+        <p:nvSpPr>
+          <p:cNvPr id="2" name="Title 1"/>
+          <p:cNvSpPr>
+            <a:spLocks noGrp="1"/>
+          </p:cNvSpPr>
+          <p:nvPr>
+            <p:ph type="title"/>
+          </p:nvPr>
+        </p:nvSpPr>
+        <p:spPr/>
+        <p:txBody>
+          <a:bodyPr>
+            <a:normAutofit fontScale="90000"/>
+          </a:bodyPr>
+          <a:lstStyle/>
+          <a:p>
+            <a:r>
+              <a:rPr lang="en-GB" dirty="0" smtClean="0"/>
+              <a:t>Signal coverage -&gt; receipt with links</a:t>
+            </a:r>
+            <a:endParaRPr lang="en-GB" dirty="0"/>
+          </a:p>
+        </p:txBody>
+      </p:sp>
+      <p:sp>
+        <p:nvSpPr>
+          <p:cNvPr id="32" name="Rounded Rectangle 31"/>
+          <p:cNvSpPr/>
+          <p:nvPr/>
+        </p:nvSpPr>
+        <p:spPr>
+          <a:xfrm>
+            <a:off x="2209800" y="2286000"/>
+            <a:ext cx="1066800" cy="1371600"/>
+          </a:xfrm>
+          <a:prstGeom prst="roundRect">
+            <a:avLst/>
+          </a:prstGeom>
+          <a:solidFill>
+            <a:schemeClr val="bg1"/>
+          </a:solidFill>
+          <a:ln>
+            <a:solidFill>
+              <a:schemeClr val="tx1"/>
+            </a:solidFill>
+          </a:ln>
+        </p:spPr>
+        <p:style>
+          <a:lnRef idx="2">
+            <a:schemeClr val="accent1">
+              <a:shade val="50000"/>
+            </a:schemeClr>
+          </a:lnRef>
+          <a:fillRef idx="1">
+            <a:schemeClr val="accent1"/>
+          </a:fillRef>
+          <a:effectRef idx="0">
+            <a:schemeClr val="accent1"/>
+          </a:effectRef>
+          <a:fontRef idx="minor">
+            <a:schemeClr val="lt1"/>
+          </a:fontRef>
+        </p:style>
+        <p:txBody>
+          <a:bodyPr rtlCol="0" anchor="ctr"/>
+          <a:lstStyle/>
+          <a:p>
+            <a:pPr algn="ctr"/>
+            <a:endParaRPr lang="en-GB" dirty="0">
+              <a:solidFill>
+                <a:schemeClr val="tx1"/>
+              </a:solidFill>
+            </a:endParaRPr>
+          </a:p>
+        </p:txBody>
+      </p:sp>
+      <p:sp>
+        <p:nvSpPr>
+          <p:cNvPr id="33" name="Rectangle 32"/>
+          <p:cNvSpPr/>
+          <p:nvPr/>
+        </p:nvSpPr>
+        <p:spPr>
+          <a:xfrm>
+            <a:off x="2198023" y="1981200"/>
+            <a:ext cx="849977" cy="369332"/>
+          </a:xfrm>
+          <a:prstGeom prst="rect">
+            <a:avLst/>
+          </a:prstGeom>
+        </p:spPr>
+        <p:txBody>
+          <a:bodyPr wrap="none">
+            <a:spAutoFit/>
+          </a:bodyPr>
+          <a:lstStyle/>
+          <a:p>
+            <a:pPr algn="ctr"/>
+            <a:r>
+              <a:rPr lang="en-GB" dirty="0" smtClean="0"/>
+              <a:t>Room1</a:t>
+            </a:r>
+            <a:endParaRPr lang="en-GB" dirty="0"/>
+          </a:p>
+        </p:txBody>
+      </p:sp>
+      <p:sp>
+        <p:nvSpPr>
+          <p:cNvPr id="12" name="Rounded Rectangle 11"/>
+          <p:cNvSpPr/>
+          <p:nvPr/>
+        </p:nvSpPr>
+        <p:spPr>
+          <a:xfrm>
+            <a:off x="3408020" y="2286000"/>
+            <a:ext cx="1447800" cy="1371600"/>
+          </a:xfrm>
+          <a:prstGeom prst="roundRect">
+            <a:avLst/>
+          </a:prstGeom>
+          <a:solidFill>
+            <a:schemeClr val="bg1"/>
+          </a:solidFill>
+          <a:ln>
+            <a:solidFill>
+              <a:schemeClr val="tx1"/>
+            </a:solidFill>
+          </a:ln>
+        </p:spPr>
+        <p:style>
+          <a:lnRef idx="2">
+            <a:schemeClr val="accent1">
+              <a:shade val="50000"/>
+            </a:schemeClr>
+          </a:lnRef>
+          <a:fillRef idx="1">
+            <a:schemeClr val="accent1"/>
+          </a:fillRef>
+          <a:effectRef idx="0">
+            <a:schemeClr val="accent1"/>
+          </a:effectRef>
+          <a:fontRef idx="minor">
+            <a:schemeClr val="lt1"/>
+          </a:fontRef>
+        </p:style>
+        <p:txBody>
+          <a:bodyPr rtlCol="0" anchor="ctr"/>
+          <a:lstStyle/>
+          <a:p>
+            <a:pPr algn="ctr"/>
+            <a:endParaRPr lang="en-GB" dirty="0">
+              <a:solidFill>
+                <a:schemeClr val="tx1"/>
+              </a:solidFill>
+            </a:endParaRPr>
+          </a:p>
+        </p:txBody>
+      </p:sp>
+      <p:sp>
+        <p:nvSpPr>
+          <p:cNvPr id="13" name="Rectangle 12"/>
+          <p:cNvSpPr/>
+          <p:nvPr/>
+        </p:nvSpPr>
+        <p:spPr>
+          <a:xfrm>
+            <a:off x="3352800" y="1981200"/>
+            <a:ext cx="849977" cy="369332"/>
+          </a:xfrm>
+          <a:prstGeom prst="rect">
+            <a:avLst/>
+          </a:prstGeom>
+        </p:spPr>
+        <p:txBody>
+          <a:bodyPr wrap="none">
+            <a:spAutoFit/>
+          </a:bodyPr>
+          <a:lstStyle/>
+          <a:p>
+            <a:pPr algn="ctr"/>
+            <a:r>
+              <a:rPr lang="en-GB" dirty="0" smtClean="0"/>
+              <a:t>Room2</a:t>
+            </a:r>
+            <a:endParaRPr lang="en-GB" dirty="0"/>
+          </a:p>
+        </p:txBody>
+      </p:sp>
+      <p:sp>
+        <p:nvSpPr>
+          <p:cNvPr id="14" name="Rectangle 13"/>
+          <p:cNvSpPr/>
+          <p:nvPr/>
+        </p:nvSpPr>
+        <p:spPr>
+          <a:xfrm>
+            <a:off x="5103027" y="2133600"/>
+            <a:ext cx="737702" cy="369332"/>
+          </a:xfrm>
+          <a:prstGeom prst="rect">
+            <a:avLst/>
+          </a:prstGeom>
+        </p:spPr>
+        <p:txBody>
+          <a:bodyPr wrap="none">
+            <a:spAutoFit/>
+          </a:bodyPr>
+          <a:lstStyle/>
+          <a:p>
+            <a:pPr algn="ctr"/>
+            <a:r>
+              <a:rPr lang="en-GB" dirty="0" smtClean="0"/>
+              <a:t>Signal</a:t>
+            </a:r>
+            <a:endParaRPr lang="en-GB" dirty="0"/>
+          </a:p>
+        </p:txBody>
+      </p:sp>
+      <p:sp>
+        <p:nvSpPr>
+          <p:cNvPr id="17" name="Rounded Rectangle 16"/>
+          <p:cNvSpPr/>
+          <p:nvPr/>
+        </p:nvSpPr>
+        <p:spPr>
+          <a:xfrm>
+            <a:off x="3707490" y="2895600"/>
+            <a:ext cx="609600" cy="533400"/>
+          </a:xfrm>
+          <a:prstGeom prst="roundRect">
+            <a:avLst/>
+          </a:prstGeom>
+          <a:solidFill>
+            <a:schemeClr val="bg1"/>
+          </a:solidFill>
+          <a:ln>
+            <a:solidFill>
+              <a:schemeClr val="tx1"/>
+            </a:solidFill>
+          </a:ln>
+        </p:spPr>
+        <p:style>
+          <a:lnRef idx="2">
+            <a:schemeClr val="accent1">
+              <a:shade val="50000"/>
+            </a:schemeClr>
+          </a:lnRef>
+          <a:fillRef idx="1">
+            <a:schemeClr val="accent1"/>
+          </a:fillRef>
+          <a:effectRef idx="0">
+            <a:schemeClr val="accent1"/>
+          </a:effectRef>
+          <a:fontRef idx="minor">
+            <a:schemeClr val="lt1"/>
+          </a:fontRef>
+        </p:style>
+        <p:txBody>
+          <a:bodyPr rtlCol="0" anchor="ctr"/>
+          <a:lstStyle/>
+          <a:p>
+            <a:pPr algn="ctr"/>
+            <a:endParaRPr lang="en-GB" dirty="0">
+              <a:solidFill>
+                <a:schemeClr val="tx1"/>
+              </a:solidFill>
+            </a:endParaRPr>
+          </a:p>
+        </p:txBody>
+      </p:sp>
+      <p:sp>
+        <p:nvSpPr>
+          <p:cNvPr id="18" name="Rounded Rectangle 17"/>
+          <p:cNvSpPr/>
+          <p:nvPr/>
+        </p:nvSpPr>
+        <p:spPr>
+          <a:xfrm>
+            <a:off x="5160620" y="2514600"/>
+            <a:ext cx="533400" cy="533400"/>
+          </a:xfrm>
+          <a:prstGeom prst="roundRect">
+            <a:avLst/>
+          </a:prstGeom>
+          <a:noFill/>
+          <a:ln>
+            <a:solidFill>
+              <a:schemeClr val="tx1"/>
+            </a:solidFill>
+          </a:ln>
+        </p:spPr>
+        <p:style>
+          <a:lnRef idx="2">
+            <a:schemeClr val="accent1">
+              <a:shade val="50000"/>
+            </a:schemeClr>
+          </a:lnRef>
+          <a:fillRef idx="1">
+            <a:schemeClr val="accent1"/>
+          </a:fillRef>
+          <a:effectRef idx="0">
+            <a:schemeClr val="accent1"/>
+          </a:effectRef>
+          <a:fontRef idx="minor">
+            <a:schemeClr val="lt1"/>
+          </a:fontRef>
+        </p:style>
+        <p:txBody>
+          <a:bodyPr rtlCol="0" anchor="ctr"/>
+          <a:lstStyle/>
+          <a:p>
+            <a:pPr algn="ctr"/>
+            <a:endParaRPr lang="en-GB" dirty="0">
+              <a:solidFill>
+                <a:schemeClr val="tx1"/>
+              </a:solidFill>
+            </a:endParaRPr>
+          </a:p>
+        </p:txBody>
+      </p:sp>
+      <p:sp>
+        <p:nvSpPr>
+          <p:cNvPr id="19" name="Oval 18"/>
+          <p:cNvSpPr/>
+          <p:nvPr/>
+        </p:nvSpPr>
+        <p:spPr>
+          <a:xfrm>
+            <a:off x="5002529" y="2743200"/>
+            <a:ext cx="152400" cy="152400"/>
+          </a:xfrm>
+          <a:prstGeom prst="ellipse">
+            <a:avLst/>
+          </a:prstGeom>
+          <a:solidFill>
+            <a:schemeClr val="tx1"/>
+          </a:solidFill>
+          <a:ln>
+            <a:solidFill>
+              <a:schemeClr val="tx1"/>
+            </a:solidFill>
+          </a:ln>
+        </p:spPr>
+        <p:style>
+          <a:lnRef idx="2">
+            <a:schemeClr val="accent1">
+              <a:shade val="50000"/>
+            </a:schemeClr>
+          </a:lnRef>
+          <a:fillRef idx="1">
+            <a:schemeClr val="accent1"/>
+          </a:fillRef>
+          <a:effectRef idx="0">
+            <a:schemeClr val="accent1"/>
+          </a:effectRef>
+          <a:fontRef idx="minor">
+            <a:schemeClr val="lt1"/>
+          </a:fontRef>
+        </p:style>
+        <p:txBody>
+          <a:bodyPr rtlCol="0" anchor="ctr"/>
+          <a:lstStyle/>
+          <a:p>
+            <a:pPr algn="ctr"/>
+            <a:endParaRPr lang="en-GB"/>
+          </a:p>
+        </p:txBody>
+      </p:sp>
+      <p:cxnSp>
+        <p:nvCxnSpPr>
+          <p:cNvPr id="20" name="Curved Connector 10"/>
+          <p:cNvCxnSpPr>
+            <a:stCxn id="21" idx="3"/>
+            <a:endCxn id="19" idx="2"/>
+          </p:cNvCxnSpPr>
+          <p:nvPr/>
+        </p:nvCxnSpPr>
+        <p:spPr>
+          <a:xfrm>
+            <a:off x="4648200" y="2590800"/>
+            <a:ext cx="354329" cy="228600"/>
+          </a:xfrm>
+          <a:prstGeom prst="curvedConnector3">
+            <a:avLst>
+              <a:gd name="adj1" fmla="val 50000"/>
+            </a:avLst>
+          </a:prstGeom>
+          <a:ln>
+            <a:solidFill>
+              <a:schemeClr val="tx1"/>
+            </a:solidFill>
+          </a:ln>
+        </p:spPr>
+        <p:style>
+          <a:lnRef idx="1">
+            <a:schemeClr val="accent1"/>
+          </a:lnRef>
+          <a:fillRef idx="0">
+            <a:schemeClr val="accent1"/>
+          </a:fillRef>
+          <a:effectRef idx="0">
+            <a:schemeClr val="accent1"/>
+          </a:effectRef>
+          <a:fontRef idx="minor">
+            <a:schemeClr val="tx1"/>
+          </a:fontRef>
+        </p:style>
+      </p:cxnSp>
+      <p:sp>
+        <p:nvSpPr>
+          <p:cNvPr id="21" name="Diamond 20"/>
+          <p:cNvSpPr/>
+          <p:nvPr/>
+        </p:nvSpPr>
+        <p:spPr>
+          <a:xfrm>
+            <a:off x="4495800" y="2514600"/>
+            <a:ext cx="152400" cy="152400"/>
+          </a:xfrm>
+          <a:prstGeom prst="diamond">
+            <a:avLst/>
+          </a:prstGeom>
+          <a:noFill/>
+          <a:ln>
+            <a:solidFill>
+              <a:schemeClr val="tx1"/>
+            </a:solidFill>
+          </a:ln>
+        </p:spPr>
+        <p:style>
+          <a:lnRef idx="2">
+            <a:schemeClr val="accent1">
+              <a:shade val="50000"/>
+            </a:schemeClr>
+          </a:lnRef>
+          <a:fillRef idx="1">
+            <a:schemeClr val="accent1"/>
+          </a:fillRef>
+          <a:effectRef idx="0">
+            <a:schemeClr val="accent1"/>
+          </a:effectRef>
+          <a:fontRef idx="minor">
+            <a:schemeClr val="lt1"/>
+          </a:fontRef>
+        </p:style>
+        <p:txBody>
+          <a:bodyPr rtlCol="0" anchor="ctr"/>
+          <a:lstStyle/>
+          <a:p>
+            <a:pPr algn="ctr"/>
+            <a:endParaRPr lang="en-GB"/>
+          </a:p>
+        </p:txBody>
+      </p:sp>
+      <p:sp>
+        <p:nvSpPr>
+          <p:cNvPr id="22" name="Rectangle 21"/>
+          <p:cNvSpPr/>
+          <p:nvPr/>
+        </p:nvSpPr>
+        <p:spPr>
+          <a:xfrm>
+            <a:off x="3581400" y="2590800"/>
+            <a:ext cx="811890" cy="369332"/>
+          </a:xfrm>
+          <a:prstGeom prst="rect">
+            <a:avLst/>
+          </a:prstGeom>
+        </p:spPr>
+        <p:txBody>
+          <a:bodyPr wrap="none">
+            <a:spAutoFit/>
+          </a:bodyPr>
+          <a:lstStyle/>
+          <a:p>
+            <a:pPr algn="ctr"/>
+            <a:r>
+              <a:rPr lang="en-GB" dirty="0" smtClean="0"/>
+              <a:t>Device</a:t>
+            </a:r>
+            <a:endParaRPr lang="en-GB" dirty="0"/>
+          </a:p>
+        </p:txBody>
+      </p:sp>
+      <p:cxnSp>
+        <p:nvCxnSpPr>
+          <p:cNvPr id="15" name="Curved Connector 10"/>
+          <p:cNvCxnSpPr>
+            <a:stCxn id="16" idx="3"/>
+            <a:endCxn id="19" idx="2"/>
+          </p:cNvCxnSpPr>
+          <p:nvPr/>
+        </p:nvCxnSpPr>
+        <p:spPr>
+          <a:xfrm flipV="1">
+            <a:off x="4191000" y="2819400"/>
+            <a:ext cx="811529" cy="304800"/>
+          </a:xfrm>
+          <a:prstGeom prst="curvedConnector3">
+            <a:avLst>
+              <a:gd name="adj1" fmla="val 50000"/>
+            </a:avLst>
+          </a:prstGeom>
+          <a:ln>
+            <a:solidFill>
+              <a:schemeClr val="tx1"/>
+            </a:solidFill>
+          </a:ln>
+        </p:spPr>
+        <p:style>
+          <a:lnRef idx="1">
+            <a:schemeClr val="accent1"/>
+          </a:lnRef>
+          <a:fillRef idx="0">
+            <a:schemeClr val="accent1"/>
+          </a:fillRef>
+          <a:effectRef idx="0">
+            <a:schemeClr val="accent1"/>
+          </a:effectRef>
+          <a:fontRef idx="minor">
+            <a:schemeClr val="tx1"/>
+          </a:fontRef>
+        </p:style>
+      </p:cxnSp>
+      <p:sp>
+        <p:nvSpPr>
+          <p:cNvPr id="16" name="Diamond 15"/>
+          <p:cNvSpPr/>
+          <p:nvPr/>
+        </p:nvSpPr>
+        <p:spPr>
+          <a:xfrm>
+            <a:off x="4038600" y="3048000"/>
+            <a:ext cx="152400" cy="152400"/>
+          </a:xfrm>
+          <a:prstGeom prst="diamond">
+            <a:avLst/>
+          </a:prstGeom>
+          <a:noFill/>
+          <a:ln>
+            <a:solidFill>
+              <a:schemeClr val="tx1"/>
+            </a:solidFill>
+          </a:ln>
+        </p:spPr>
+        <p:style>
+          <a:lnRef idx="2">
+            <a:schemeClr val="accent1">
+              <a:shade val="50000"/>
+            </a:schemeClr>
+          </a:lnRef>
+          <a:fillRef idx="1">
+            <a:schemeClr val="accent1"/>
+          </a:fillRef>
+          <a:effectRef idx="0">
+            <a:schemeClr val="accent1"/>
+          </a:effectRef>
+          <a:fontRef idx="minor">
+            <a:schemeClr val="lt1"/>
+          </a:fontRef>
+        </p:style>
+        <p:txBody>
+          <a:bodyPr rtlCol="0" anchor="ctr"/>
+          <a:lstStyle/>
+          <a:p>
+            <a:pPr algn="ctr"/>
+            <a:endParaRPr lang="en-GB"/>
+          </a:p>
+        </p:txBody>
+      </p:sp>
+    </p:spTree>
+  </p:cSld>
+  <p:clrMapOvr>
+    <a:masterClrMapping/>
+  </p:clrMapOvr>
+</p:sld>
+</file>
+
+<file path=ppt/slides/slide36.xml><?xml version="1.0" encoding="utf-8"?>
+<p:sld xmlns:a="http://schemas.openxmlformats.org/drawingml/2006/main" xmlns:r="http://schemas.openxmlformats.org/officeDocument/2006/relationships" xmlns:p="http://schemas.openxmlformats.org/presentationml/2006/main">
+  <p:cSld>
+    <p:spTree>
+      <p:nvGrpSpPr>
+        <p:cNvPr id="1" name=""/>
+        <p:cNvGrpSpPr/>
+        <p:nvPr/>
+      </p:nvGrpSpPr>
+      <p:grpSpPr>
+        <a:xfrm>
+          <a:off x="0" y="0"/>
+          <a:ext cx="0" cy="0"/>
+          <a:chOff x="0" y="0"/>
+          <a:chExt cx="0" cy="0"/>
+        </a:xfrm>
+      </p:grpSpPr>
+      <p:sp>
+        <p:nvSpPr>
+          <p:cNvPr id="2" name="Title 1"/>
+          <p:cNvSpPr>
+            <a:spLocks noGrp="1"/>
+          </p:cNvSpPr>
+          <p:nvPr>
+            <p:ph type="title"/>
+          </p:nvPr>
+        </p:nvSpPr>
+        <p:spPr/>
+        <p:txBody>
+          <a:bodyPr>
+            <a:normAutofit fontScale="90000"/>
+          </a:bodyPr>
+          <a:lstStyle/>
+          <a:p>
+            <a:r>
+              <a:rPr lang="en-GB" dirty="0" smtClean="0"/>
+              <a:t>Signal coverage with subdivision and links</a:t>
+            </a:r>
+            <a:endParaRPr lang="en-GB" dirty="0"/>
+          </a:p>
+        </p:txBody>
+      </p:sp>
+      <p:sp>
+        <p:nvSpPr>
+          <p:cNvPr id="32" name="Rounded Rectangle 31"/>
+          <p:cNvSpPr/>
+          <p:nvPr/>
+        </p:nvSpPr>
+        <p:spPr>
+          <a:xfrm>
+            <a:off x="2209800" y="2286000"/>
+            <a:ext cx="1066800" cy="1676400"/>
+          </a:xfrm>
+          <a:prstGeom prst="roundRect">
+            <a:avLst/>
+          </a:prstGeom>
+          <a:solidFill>
+            <a:schemeClr val="bg1"/>
+          </a:solidFill>
+          <a:ln>
+            <a:solidFill>
+              <a:schemeClr val="tx1"/>
+            </a:solidFill>
+          </a:ln>
+        </p:spPr>
+        <p:style>
+          <a:lnRef idx="2">
+            <a:schemeClr val="accent1">
+              <a:shade val="50000"/>
+            </a:schemeClr>
+          </a:lnRef>
+          <a:fillRef idx="1">
+            <a:schemeClr val="accent1"/>
+          </a:fillRef>
+          <a:effectRef idx="0">
+            <a:schemeClr val="accent1"/>
+          </a:effectRef>
+          <a:fontRef idx="minor">
+            <a:schemeClr val="lt1"/>
+          </a:fontRef>
+        </p:style>
+        <p:txBody>
+          <a:bodyPr rtlCol="0" anchor="ctr"/>
+          <a:lstStyle/>
+          <a:p>
+            <a:pPr algn="ctr"/>
+            <a:endParaRPr lang="en-GB" dirty="0">
+              <a:solidFill>
+                <a:schemeClr val="tx1"/>
+              </a:solidFill>
+            </a:endParaRPr>
+          </a:p>
+        </p:txBody>
+      </p:sp>
+      <p:sp>
+        <p:nvSpPr>
+          <p:cNvPr id="33" name="Rectangle 32"/>
+          <p:cNvSpPr/>
+          <p:nvPr/>
+        </p:nvSpPr>
+        <p:spPr>
+          <a:xfrm>
+            <a:off x="2198023" y="1981200"/>
+            <a:ext cx="849977" cy="369332"/>
+          </a:xfrm>
+          <a:prstGeom prst="rect">
+            <a:avLst/>
+          </a:prstGeom>
+        </p:spPr>
+        <p:txBody>
+          <a:bodyPr wrap="none">
+            <a:spAutoFit/>
+          </a:bodyPr>
+          <a:lstStyle/>
+          <a:p>
+            <a:pPr algn="ctr"/>
+            <a:r>
+              <a:rPr lang="en-GB" dirty="0" smtClean="0"/>
+              <a:t>Room1</a:t>
+            </a:r>
+            <a:endParaRPr lang="en-GB" dirty="0"/>
+          </a:p>
+        </p:txBody>
+      </p:sp>
+      <p:sp>
+        <p:nvSpPr>
+          <p:cNvPr id="12" name="Rounded Rectangle 11"/>
+          <p:cNvSpPr/>
+          <p:nvPr/>
+        </p:nvSpPr>
+        <p:spPr>
+          <a:xfrm>
+            <a:off x="3408020" y="2286000"/>
+            <a:ext cx="1447800" cy="1676400"/>
+          </a:xfrm>
+          <a:prstGeom prst="roundRect">
+            <a:avLst/>
+          </a:prstGeom>
+          <a:solidFill>
+            <a:schemeClr val="bg1"/>
+          </a:solidFill>
+          <a:ln>
+            <a:solidFill>
+              <a:schemeClr val="tx1"/>
+            </a:solidFill>
+          </a:ln>
+        </p:spPr>
+        <p:style>
+          <a:lnRef idx="2">
+            <a:schemeClr val="accent1">
+              <a:shade val="50000"/>
+            </a:schemeClr>
+          </a:lnRef>
+          <a:fillRef idx="1">
+            <a:schemeClr val="accent1"/>
+          </a:fillRef>
+          <a:effectRef idx="0">
+            <a:schemeClr val="accent1"/>
+          </a:effectRef>
+          <a:fontRef idx="minor">
+            <a:schemeClr val="lt1"/>
+          </a:fontRef>
+        </p:style>
+        <p:txBody>
+          <a:bodyPr rtlCol="0" anchor="ctr"/>
+          <a:lstStyle/>
+          <a:p>
+            <a:pPr algn="ctr"/>
+            <a:endParaRPr lang="en-GB" dirty="0">
+              <a:solidFill>
+                <a:schemeClr val="tx1"/>
+              </a:solidFill>
+            </a:endParaRPr>
+          </a:p>
+        </p:txBody>
+      </p:sp>
+      <p:sp>
+        <p:nvSpPr>
+          <p:cNvPr id="13" name="Rectangle 12"/>
+          <p:cNvSpPr/>
+          <p:nvPr/>
+        </p:nvSpPr>
+        <p:spPr>
+          <a:xfrm>
+            <a:off x="3352800" y="1981200"/>
+            <a:ext cx="849977" cy="369332"/>
+          </a:xfrm>
+          <a:prstGeom prst="rect">
+            <a:avLst/>
+          </a:prstGeom>
+        </p:spPr>
+        <p:txBody>
+          <a:bodyPr wrap="none">
+            <a:spAutoFit/>
+          </a:bodyPr>
+          <a:lstStyle/>
+          <a:p>
+            <a:pPr algn="ctr"/>
+            <a:r>
+              <a:rPr lang="en-GB" dirty="0" smtClean="0"/>
+              <a:t>Room2</a:t>
+            </a:r>
+            <a:endParaRPr lang="en-GB" dirty="0"/>
+          </a:p>
+        </p:txBody>
+      </p:sp>
+      <p:sp>
+        <p:nvSpPr>
+          <p:cNvPr id="14" name="Rectangle 13"/>
+          <p:cNvSpPr/>
+          <p:nvPr/>
+        </p:nvSpPr>
+        <p:spPr>
+          <a:xfrm>
+            <a:off x="5103027" y="2133600"/>
+            <a:ext cx="737702" cy="369332"/>
+          </a:xfrm>
+          <a:prstGeom prst="rect">
+            <a:avLst/>
+          </a:prstGeom>
+        </p:spPr>
+        <p:txBody>
+          <a:bodyPr wrap="none">
+            <a:spAutoFit/>
+          </a:bodyPr>
+          <a:lstStyle/>
+          <a:p>
+            <a:pPr algn="ctr"/>
+            <a:r>
+              <a:rPr lang="en-GB" dirty="0" smtClean="0"/>
+              <a:t>Signal</a:t>
+            </a:r>
+            <a:endParaRPr lang="en-GB" dirty="0"/>
+          </a:p>
+        </p:txBody>
+      </p:sp>
+      <p:sp>
+        <p:nvSpPr>
+          <p:cNvPr id="17" name="Rounded Rectangle 16"/>
+          <p:cNvSpPr/>
+          <p:nvPr/>
+        </p:nvSpPr>
+        <p:spPr>
+          <a:xfrm>
+            <a:off x="3631290" y="3276600"/>
+            <a:ext cx="609600" cy="533400"/>
+          </a:xfrm>
+          <a:prstGeom prst="roundRect">
+            <a:avLst/>
+          </a:prstGeom>
+          <a:solidFill>
+            <a:schemeClr val="bg1"/>
+          </a:solidFill>
+          <a:ln>
+            <a:solidFill>
+              <a:schemeClr val="tx1"/>
+            </a:solidFill>
+          </a:ln>
+        </p:spPr>
+        <p:style>
+          <a:lnRef idx="2">
+            <a:schemeClr val="accent1">
+              <a:shade val="50000"/>
+            </a:schemeClr>
+          </a:lnRef>
+          <a:fillRef idx="1">
+            <a:schemeClr val="accent1"/>
+          </a:fillRef>
+          <a:effectRef idx="0">
+            <a:schemeClr val="accent1"/>
+          </a:effectRef>
+          <a:fontRef idx="minor">
+            <a:schemeClr val="lt1"/>
+          </a:fontRef>
+        </p:style>
+        <p:txBody>
+          <a:bodyPr rtlCol="0" anchor="ctr"/>
+          <a:lstStyle/>
+          <a:p>
+            <a:pPr algn="ctr"/>
+            <a:endParaRPr lang="en-GB" dirty="0">
+              <a:solidFill>
+                <a:schemeClr val="tx1"/>
+              </a:solidFill>
+            </a:endParaRPr>
+          </a:p>
+        </p:txBody>
+      </p:sp>
+      <p:sp>
+        <p:nvSpPr>
+          <p:cNvPr id="18" name="Rounded Rectangle 17"/>
+          <p:cNvSpPr/>
+          <p:nvPr/>
+        </p:nvSpPr>
+        <p:spPr>
+          <a:xfrm>
+            <a:off x="5160620" y="2514600"/>
+            <a:ext cx="533400" cy="533400"/>
+          </a:xfrm>
+          <a:prstGeom prst="roundRect">
+            <a:avLst/>
+          </a:prstGeom>
+          <a:noFill/>
+          <a:ln>
+            <a:solidFill>
+              <a:schemeClr val="tx1"/>
+            </a:solidFill>
+          </a:ln>
+        </p:spPr>
+        <p:style>
+          <a:lnRef idx="2">
+            <a:schemeClr val="accent1">
+              <a:shade val="50000"/>
+            </a:schemeClr>
+          </a:lnRef>
+          <a:fillRef idx="1">
+            <a:schemeClr val="accent1"/>
+          </a:fillRef>
+          <a:effectRef idx="0">
+            <a:schemeClr val="accent1"/>
+          </a:effectRef>
+          <a:fontRef idx="minor">
+            <a:schemeClr val="lt1"/>
+          </a:fontRef>
+        </p:style>
+        <p:txBody>
+          <a:bodyPr rtlCol="0" anchor="ctr"/>
+          <a:lstStyle/>
+          <a:p>
+            <a:pPr algn="ctr"/>
+            <a:endParaRPr lang="en-GB" dirty="0">
+              <a:solidFill>
+                <a:schemeClr val="tx1"/>
+              </a:solidFill>
+            </a:endParaRPr>
+          </a:p>
+        </p:txBody>
+      </p:sp>
+      <p:sp>
+        <p:nvSpPr>
+          <p:cNvPr id="19" name="Oval 18"/>
+          <p:cNvSpPr/>
+          <p:nvPr/>
+        </p:nvSpPr>
+        <p:spPr>
+          <a:xfrm>
+            <a:off x="5002529" y="2743200"/>
+            <a:ext cx="152400" cy="152400"/>
+          </a:xfrm>
+          <a:prstGeom prst="ellipse">
+            <a:avLst/>
+          </a:prstGeom>
+          <a:solidFill>
+            <a:schemeClr val="tx1"/>
+          </a:solidFill>
+          <a:ln>
+            <a:solidFill>
+              <a:schemeClr val="tx1"/>
+            </a:solidFill>
+          </a:ln>
+        </p:spPr>
+        <p:style>
+          <a:lnRef idx="2">
+            <a:schemeClr val="accent1">
+              <a:shade val="50000"/>
+            </a:schemeClr>
+          </a:lnRef>
+          <a:fillRef idx="1">
+            <a:schemeClr val="accent1"/>
+          </a:fillRef>
+          <a:effectRef idx="0">
+            <a:schemeClr val="accent1"/>
+          </a:effectRef>
+          <a:fontRef idx="minor">
+            <a:schemeClr val="lt1"/>
+          </a:fontRef>
+        </p:style>
+        <p:txBody>
+          <a:bodyPr rtlCol="0" anchor="ctr"/>
+          <a:lstStyle/>
+          <a:p>
+            <a:pPr algn="ctr"/>
+            <a:endParaRPr lang="en-GB"/>
+          </a:p>
+        </p:txBody>
+      </p:sp>
+      <p:cxnSp>
+        <p:nvCxnSpPr>
+          <p:cNvPr id="20" name="Curved Connector 10"/>
+          <p:cNvCxnSpPr>
+            <a:stCxn id="21" idx="3"/>
+            <a:endCxn id="19" idx="2"/>
+          </p:cNvCxnSpPr>
+          <p:nvPr/>
+        </p:nvCxnSpPr>
+        <p:spPr>
+          <a:xfrm>
+            <a:off x="4572000" y="2743200"/>
+            <a:ext cx="430529" cy="76200"/>
+          </a:xfrm>
+          <a:prstGeom prst="curvedConnector3">
+            <a:avLst>
+              <a:gd name="adj1" fmla="val 50000"/>
+            </a:avLst>
+          </a:prstGeom>
+          <a:ln>
+            <a:solidFill>
+              <a:schemeClr val="tx1"/>
+            </a:solidFill>
+          </a:ln>
+        </p:spPr>
+        <p:style>
+          <a:lnRef idx="1">
+            <a:schemeClr val="accent1"/>
+          </a:lnRef>
+          <a:fillRef idx="0">
+            <a:schemeClr val="accent1"/>
+          </a:fillRef>
+          <a:effectRef idx="0">
+            <a:schemeClr val="accent1"/>
+          </a:effectRef>
+          <a:fontRef idx="minor">
+            <a:schemeClr val="tx1"/>
+          </a:fontRef>
+        </p:style>
+      </p:cxnSp>
+      <p:sp>
+        <p:nvSpPr>
+          <p:cNvPr id="21" name="Diamond 20"/>
+          <p:cNvSpPr/>
+          <p:nvPr/>
+        </p:nvSpPr>
+        <p:spPr>
+          <a:xfrm>
+            <a:off x="4419600" y="2667000"/>
+            <a:ext cx="152400" cy="152400"/>
+          </a:xfrm>
+          <a:prstGeom prst="diamond">
+            <a:avLst/>
+          </a:prstGeom>
+          <a:noFill/>
+          <a:ln>
+            <a:solidFill>
+              <a:schemeClr val="tx1"/>
+            </a:solidFill>
+          </a:ln>
+        </p:spPr>
+        <p:style>
+          <a:lnRef idx="2">
+            <a:schemeClr val="accent1">
+              <a:shade val="50000"/>
+            </a:schemeClr>
+          </a:lnRef>
+          <a:fillRef idx="1">
+            <a:schemeClr val="accent1"/>
+          </a:fillRef>
+          <a:effectRef idx="0">
+            <a:schemeClr val="accent1"/>
+          </a:effectRef>
+          <a:fontRef idx="minor">
+            <a:schemeClr val="lt1"/>
+          </a:fontRef>
+        </p:style>
+        <p:txBody>
+          <a:bodyPr rtlCol="0" anchor="ctr"/>
+          <a:lstStyle/>
+          <a:p>
+            <a:pPr algn="ctr"/>
+            <a:endParaRPr lang="en-GB"/>
+          </a:p>
+        </p:txBody>
+      </p:sp>
+      <p:sp>
+        <p:nvSpPr>
+          <p:cNvPr id="22" name="Rectangle 21"/>
+          <p:cNvSpPr/>
+          <p:nvPr/>
+        </p:nvSpPr>
+        <p:spPr>
+          <a:xfrm>
+            <a:off x="3505200" y="2971800"/>
+            <a:ext cx="811890" cy="369332"/>
+          </a:xfrm>
+          <a:prstGeom prst="rect">
+            <a:avLst/>
+          </a:prstGeom>
+        </p:spPr>
+        <p:txBody>
+          <a:bodyPr wrap="none">
+            <a:spAutoFit/>
+          </a:bodyPr>
+          <a:lstStyle/>
+          <a:p>
+            <a:pPr algn="ctr"/>
+            <a:r>
+              <a:rPr lang="en-GB" dirty="0" smtClean="0"/>
+              <a:t>Device</a:t>
+            </a:r>
+            <a:endParaRPr lang="en-GB" dirty="0"/>
+          </a:p>
+        </p:txBody>
+      </p:sp>
+      <p:sp>
+        <p:nvSpPr>
+          <p:cNvPr id="15" name="Rounded Rectangle 14"/>
+          <p:cNvSpPr/>
+          <p:nvPr/>
+        </p:nvSpPr>
+        <p:spPr>
+          <a:xfrm>
+            <a:off x="3581400" y="2590800"/>
+            <a:ext cx="1066800" cy="381000"/>
+          </a:xfrm>
+          <a:prstGeom prst="roundRect">
+            <a:avLst/>
+          </a:prstGeom>
+          <a:noFill/>
+          <a:ln w="9525">
+            <a:solidFill>
+              <a:schemeClr val="tx1"/>
+            </a:solidFill>
+            <a:prstDash val="solid"/>
+          </a:ln>
+        </p:spPr>
+        <p:style>
+          <a:lnRef idx="2">
+            <a:schemeClr val="accent1">
+              <a:shade val="50000"/>
+            </a:schemeClr>
+          </a:lnRef>
+          <a:fillRef idx="1">
+            <a:schemeClr val="accent1"/>
+          </a:fillRef>
+          <a:effectRef idx="0">
+            <a:schemeClr val="accent1"/>
+          </a:effectRef>
+          <a:fontRef idx="minor">
+            <a:schemeClr val="lt1"/>
+          </a:fontRef>
+        </p:style>
+        <p:txBody>
+          <a:bodyPr rtlCol="0" anchor="ctr"/>
+          <a:lstStyle/>
+          <a:p>
+            <a:pPr algn="ctr"/>
+            <a:endParaRPr lang="en-GB" dirty="0">
+              <a:solidFill>
+                <a:schemeClr val="tx1"/>
+              </a:solidFill>
+            </a:endParaRPr>
+          </a:p>
+        </p:txBody>
+      </p:sp>
+      <p:sp>
+        <p:nvSpPr>
+          <p:cNvPr id="16" name="Rectangle 15"/>
+          <p:cNvSpPr/>
+          <p:nvPr/>
+        </p:nvSpPr>
+        <p:spPr>
+          <a:xfrm>
+            <a:off x="3521635" y="2297668"/>
+            <a:ext cx="1202765" cy="369332"/>
+          </a:xfrm>
+          <a:prstGeom prst="rect">
+            <a:avLst/>
+          </a:prstGeom>
+        </p:spPr>
+        <p:txBody>
+          <a:bodyPr wrap="none">
+            <a:spAutoFit/>
+          </a:bodyPr>
+          <a:lstStyle/>
+          <a:p>
+            <a:pPr algn="ctr"/>
+            <a:r>
+              <a:rPr lang="en-GB" dirty="0" smtClean="0"/>
+              <a:t>Sub-r</a:t>
+            </a:r>
+            <a:r>
+              <a:rPr lang="en-GB" dirty="0" smtClean="0"/>
+              <a:t>egion</a:t>
+            </a:r>
+            <a:endParaRPr lang="en-GB" dirty="0"/>
           </a:p>
         </p:txBody>
       </p:sp>

</xml_diff>